<commit_message>
drag and drop expt3-images
</commit_message>
<xml_diff>
--- a/Assets/Powerpoints/DC Chopper.pptx
+++ b/Assets/Powerpoints/DC Chopper.pptx
@@ -268,7 +268,7 @@
           <a:p>
             <a:fld id="{349876DB-90CB-4857-A9D0-B3C87AAB9427}" type="datetimeFigureOut">
               <a:rPr lang="en-IN" smtClean="0"/>
-              <a:t>17-12-2022</a:t>
+              <a:t>19-12-2022</a:t>
             </a:fld>
             <a:endParaRPr lang="en-IN"/>
           </a:p>
@@ -468,7 +468,7 @@
           <a:p>
             <a:fld id="{349876DB-90CB-4857-A9D0-B3C87AAB9427}" type="datetimeFigureOut">
               <a:rPr lang="en-IN" smtClean="0"/>
-              <a:t>17-12-2022</a:t>
+              <a:t>19-12-2022</a:t>
             </a:fld>
             <a:endParaRPr lang="en-IN"/>
           </a:p>
@@ -678,7 +678,7 @@
           <a:p>
             <a:fld id="{349876DB-90CB-4857-A9D0-B3C87AAB9427}" type="datetimeFigureOut">
               <a:rPr lang="en-IN" smtClean="0"/>
-              <a:t>17-12-2022</a:t>
+              <a:t>19-12-2022</a:t>
             </a:fld>
             <a:endParaRPr lang="en-IN"/>
           </a:p>
@@ -878,7 +878,7 @@
           <a:p>
             <a:fld id="{349876DB-90CB-4857-A9D0-B3C87AAB9427}" type="datetimeFigureOut">
               <a:rPr lang="en-IN" smtClean="0"/>
-              <a:t>17-12-2022</a:t>
+              <a:t>19-12-2022</a:t>
             </a:fld>
             <a:endParaRPr lang="en-IN"/>
           </a:p>
@@ -1154,7 +1154,7 @@
           <a:p>
             <a:fld id="{349876DB-90CB-4857-A9D0-B3C87AAB9427}" type="datetimeFigureOut">
               <a:rPr lang="en-IN" smtClean="0"/>
-              <a:t>17-12-2022</a:t>
+              <a:t>19-12-2022</a:t>
             </a:fld>
             <a:endParaRPr lang="en-IN"/>
           </a:p>
@@ -1422,7 +1422,7 @@
           <a:p>
             <a:fld id="{349876DB-90CB-4857-A9D0-B3C87AAB9427}" type="datetimeFigureOut">
               <a:rPr lang="en-IN" smtClean="0"/>
-              <a:t>17-12-2022</a:t>
+              <a:t>19-12-2022</a:t>
             </a:fld>
             <a:endParaRPr lang="en-IN"/>
           </a:p>
@@ -1837,7 +1837,7 @@
           <a:p>
             <a:fld id="{349876DB-90CB-4857-A9D0-B3C87AAB9427}" type="datetimeFigureOut">
               <a:rPr lang="en-IN" smtClean="0"/>
-              <a:t>17-12-2022</a:t>
+              <a:t>19-12-2022</a:t>
             </a:fld>
             <a:endParaRPr lang="en-IN"/>
           </a:p>
@@ -1979,7 +1979,7 @@
           <a:p>
             <a:fld id="{349876DB-90CB-4857-A9D0-B3C87AAB9427}" type="datetimeFigureOut">
               <a:rPr lang="en-IN" smtClean="0"/>
-              <a:t>17-12-2022</a:t>
+              <a:t>19-12-2022</a:t>
             </a:fld>
             <a:endParaRPr lang="en-IN"/>
           </a:p>
@@ -2092,7 +2092,7 @@
           <a:p>
             <a:fld id="{349876DB-90CB-4857-A9D0-B3C87AAB9427}" type="datetimeFigureOut">
               <a:rPr lang="en-IN" smtClean="0"/>
-              <a:t>17-12-2022</a:t>
+              <a:t>19-12-2022</a:t>
             </a:fld>
             <a:endParaRPr lang="en-IN"/>
           </a:p>
@@ -2405,7 +2405,7 @@
           <a:p>
             <a:fld id="{349876DB-90CB-4857-A9D0-B3C87AAB9427}" type="datetimeFigureOut">
               <a:rPr lang="en-IN" smtClean="0"/>
-              <a:t>17-12-2022</a:t>
+              <a:t>19-12-2022</a:t>
             </a:fld>
             <a:endParaRPr lang="en-IN"/>
           </a:p>
@@ -2694,7 +2694,7 @@
           <a:p>
             <a:fld id="{349876DB-90CB-4857-A9D0-B3C87AAB9427}" type="datetimeFigureOut">
               <a:rPr lang="en-IN" smtClean="0"/>
-              <a:t>17-12-2022</a:t>
+              <a:t>19-12-2022</a:t>
             </a:fld>
             <a:endParaRPr lang="en-IN"/>
           </a:p>
@@ -2937,7 +2937,7 @@
           <a:p>
             <a:fld id="{349876DB-90CB-4857-A9D0-B3C87AAB9427}" type="datetimeFigureOut">
               <a:rPr lang="en-IN" smtClean="0"/>
-              <a:t>17-12-2022</a:t>
+              <a:t>19-12-2022</a:t>
             </a:fld>
             <a:endParaRPr lang="en-IN"/>
           </a:p>
@@ -3397,12 +3397,64 @@
           </a:fontRef>
         </p:style>
       </p:cxnSp>
+      <p:sp>
+        <p:nvSpPr>
+          <p:cNvPr id="4" name="Oval 3">
+            <a:extLst>
+              <a:ext uri="{FF2B5EF4-FFF2-40B4-BE49-F238E27FC236}">
+                <a16:creationId xmlns:a16="http://schemas.microsoft.com/office/drawing/2014/main" id="{B5F38E8E-4675-ED73-0AAD-58957C6A7844}"/>
+              </a:ext>
+            </a:extLst>
+          </p:cNvPr>
+          <p:cNvSpPr/>
+          <p:nvPr/>
+        </p:nvSpPr>
+        <p:spPr>
+          <a:xfrm>
+            <a:off x="548733" y="2292595"/>
+            <a:ext cx="1042108" cy="993632"/>
+          </a:xfrm>
+          <a:prstGeom prst="ellipse">
+            <a:avLst/>
+          </a:prstGeom>
+          <a:solidFill>
+            <a:schemeClr val="bg1">
+              <a:lumMod val="95000"/>
+            </a:schemeClr>
+          </a:solidFill>
+          <a:ln w="38100"/>
+        </p:spPr>
+        <p:style>
+          <a:lnRef idx="2">
+            <a:schemeClr val="accent1">
+              <a:shade val="50000"/>
+            </a:schemeClr>
+          </a:lnRef>
+          <a:fillRef idx="1">
+            <a:schemeClr val="accent1"/>
+          </a:fillRef>
+          <a:effectRef idx="0">
+            <a:schemeClr val="accent1"/>
+          </a:effectRef>
+          <a:fontRef idx="minor">
+            <a:schemeClr val="lt1"/>
+          </a:fontRef>
+        </p:style>
+        <p:txBody>
+          <a:bodyPr rtlCol="0" anchor="ctr"/>
+          <a:lstStyle/>
+          <a:p>
+            <a:pPr algn="ctr"/>
+            <a:endParaRPr lang="en-IN" dirty="0"/>
+          </a:p>
+        </p:txBody>
+      </p:sp>
       <p:grpSp>
         <p:nvGrpSpPr>
-          <p:cNvPr id="14" name="Group 13">
+          <p:cNvPr id="12" name="Group 11">
             <a:extLst>
               <a:ext uri="{FF2B5EF4-FFF2-40B4-BE49-F238E27FC236}">
-                <a16:creationId xmlns:a16="http://schemas.microsoft.com/office/drawing/2014/main" id="{16EB91FE-4211-17CD-5D79-0213B529A7D6}"/>
+                <a16:creationId xmlns:a16="http://schemas.microsoft.com/office/drawing/2014/main" id="{16005FFF-0ED4-CAED-9BF4-18C631EFA383}"/>
               </a:ext>
             </a:extLst>
           </p:cNvPr>
@@ -3411,18 +3463,21 @@
         </p:nvGrpSpPr>
         <p:grpSpPr>
           <a:xfrm>
-            <a:off x="548733" y="2292595"/>
-            <a:ext cx="1042108" cy="993632"/>
-            <a:chOff x="5057339" y="2354902"/>
-            <a:chExt cx="1042108" cy="993632"/>
+            <a:off x="906888" y="2523234"/>
+            <a:ext cx="325797" cy="325797"/>
+            <a:chOff x="5941524" y="3249334"/>
+            <a:chExt cx="325797" cy="325797"/>
           </a:xfrm>
+          <a:solidFill>
+            <a:srgbClr val="FF0000"/>
+          </a:solidFill>
         </p:grpSpPr>
         <p:sp>
           <p:nvSpPr>
-            <p:cNvPr id="4" name="Oval 3">
+            <p:cNvPr id="7" name="Rectangle 6">
               <a:extLst>
                 <a:ext uri="{FF2B5EF4-FFF2-40B4-BE49-F238E27FC236}">
-                  <a16:creationId xmlns:a16="http://schemas.microsoft.com/office/drawing/2014/main" id="{B5F38E8E-4675-ED73-0AAD-58957C6A7844}"/>
+                  <a16:creationId xmlns:a16="http://schemas.microsoft.com/office/drawing/2014/main" id="{2641FC01-6412-5538-1A82-32D4000C9756}"/>
                 </a:ext>
               </a:extLst>
             </p:cNvPr>
@@ -3430,19 +3485,17 @@
             <p:nvPr/>
           </p:nvSpPr>
           <p:spPr>
-            <a:xfrm>
-              <a:off x="5057339" y="2354902"/>
-              <a:ext cx="1042108" cy="993632"/>
+            <a:xfrm rot="5400000">
+              <a:off x="5941523" y="3376482"/>
+              <a:ext cx="325797" cy="71501"/>
             </a:xfrm>
-            <a:prstGeom prst="ellipse">
+            <a:prstGeom prst="rect">
               <a:avLst/>
             </a:prstGeom>
-            <a:solidFill>
-              <a:schemeClr val="bg1">
-                <a:lumMod val="95000"/>
-              </a:schemeClr>
-            </a:solidFill>
-            <a:ln w="38100"/>
+            <a:grpFill/>
+            <a:ln>
+              <a:noFill/>
+            </a:ln>
           </p:spPr>
           <p:style>
             <a:lnRef idx="2">
@@ -3465,140 +3518,16 @@
             <a:lstStyle/>
             <a:p>
               <a:pPr algn="ctr"/>
-              <a:endParaRPr lang="en-IN" dirty="0"/>
+              <a:endParaRPr lang="en-IN"/>
             </a:p>
           </p:txBody>
         </p:sp>
-        <p:grpSp>
-          <p:nvGrpSpPr>
-            <p:cNvPr id="12" name="Group 11">
+        <p:sp>
+          <p:nvSpPr>
+            <p:cNvPr id="9" name="Rectangle 8">
               <a:extLst>
                 <a:ext uri="{FF2B5EF4-FFF2-40B4-BE49-F238E27FC236}">
-                  <a16:creationId xmlns:a16="http://schemas.microsoft.com/office/drawing/2014/main" id="{16005FFF-0ED4-CAED-9BF4-18C631EFA383}"/>
-                </a:ext>
-              </a:extLst>
-            </p:cNvPr>
-            <p:cNvGrpSpPr/>
-            <p:nvPr/>
-          </p:nvGrpSpPr>
-          <p:grpSpPr>
-            <a:xfrm>
-              <a:off x="5415494" y="2585541"/>
-              <a:ext cx="325797" cy="325797"/>
-              <a:chOff x="5941524" y="3249334"/>
-              <a:chExt cx="325797" cy="325797"/>
-            </a:xfrm>
-            <a:solidFill>
-              <a:srgbClr val="FF0000"/>
-            </a:solidFill>
-          </p:grpSpPr>
-          <p:sp>
-            <p:nvSpPr>
-              <p:cNvPr id="7" name="Rectangle 6">
-                <a:extLst>
-                  <a:ext uri="{FF2B5EF4-FFF2-40B4-BE49-F238E27FC236}">
-                    <a16:creationId xmlns:a16="http://schemas.microsoft.com/office/drawing/2014/main" id="{2641FC01-6412-5538-1A82-32D4000C9756}"/>
-                  </a:ext>
-                </a:extLst>
-              </p:cNvPr>
-              <p:cNvSpPr/>
-              <p:nvPr/>
-            </p:nvSpPr>
-            <p:spPr>
-              <a:xfrm rot="5400000">
-                <a:off x="5941523" y="3376482"/>
-                <a:ext cx="325797" cy="71501"/>
-              </a:xfrm>
-              <a:prstGeom prst="rect">
-                <a:avLst/>
-              </a:prstGeom>
-              <a:grpFill/>
-              <a:ln>
-                <a:noFill/>
-              </a:ln>
-            </p:spPr>
-            <p:style>
-              <a:lnRef idx="2">
-                <a:schemeClr val="accent1">
-                  <a:shade val="50000"/>
-                </a:schemeClr>
-              </a:lnRef>
-              <a:fillRef idx="1">
-                <a:schemeClr val="accent1"/>
-              </a:fillRef>
-              <a:effectRef idx="0">
-                <a:schemeClr val="accent1"/>
-              </a:effectRef>
-              <a:fontRef idx="minor">
-                <a:schemeClr val="lt1"/>
-              </a:fontRef>
-            </p:style>
-            <p:txBody>
-              <a:bodyPr rtlCol="0" anchor="ctr"/>
-              <a:lstStyle/>
-              <a:p>
-                <a:pPr algn="ctr"/>
-                <a:endParaRPr lang="en-IN"/>
-              </a:p>
-            </p:txBody>
-          </p:sp>
-          <p:sp>
-            <p:nvSpPr>
-              <p:cNvPr id="9" name="Rectangle 8">
-                <a:extLst>
-                  <a:ext uri="{FF2B5EF4-FFF2-40B4-BE49-F238E27FC236}">
-                    <a16:creationId xmlns:a16="http://schemas.microsoft.com/office/drawing/2014/main" id="{210BF49F-0680-5BAB-2892-AE06E4E26ABE}"/>
-                  </a:ext>
-                </a:extLst>
-              </p:cNvPr>
-              <p:cNvSpPr/>
-              <p:nvPr/>
-            </p:nvSpPr>
-            <p:spPr>
-              <a:xfrm>
-                <a:off x="5941524" y="3376391"/>
-                <a:ext cx="325797" cy="71501"/>
-              </a:xfrm>
-              <a:prstGeom prst="rect">
-                <a:avLst/>
-              </a:prstGeom>
-              <a:grpFill/>
-              <a:ln>
-                <a:noFill/>
-              </a:ln>
-            </p:spPr>
-            <p:style>
-              <a:lnRef idx="2">
-                <a:schemeClr val="accent1">
-                  <a:shade val="50000"/>
-                </a:schemeClr>
-              </a:lnRef>
-              <a:fillRef idx="1">
-                <a:schemeClr val="accent1"/>
-              </a:fillRef>
-              <a:effectRef idx="0">
-                <a:schemeClr val="accent1"/>
-              </a:effectRef>
-              <a:fontRef idx="minor">
-                <a:schemeClr val="lt1"/>
-              </a:fontRef>
-            </p:style>
-            <p:txBody>
-              <a:bodyPr rtlCol="0" anchor="ctr"/>
-              <a:lstStyle/>
-              <a:p>
-                <a:pPr algn="ctr"/>
-                <a:endParaRPr lang="en-IN"/>
-              </a:p>
-            </p:txBody>
-          </p:sp>
-        </p:grpSp>
-        <p:sp>
-          <p:nvSpPr>
-            <p:cNvPr id="11" name="Rectangle 10">
-              <a:extLst>
-                <a:ext uri="{FF2B5EF4-FFF2-40B4-BE49-F238E27FC236}">
-                  <a16:creationId xmlns:a16="http://schemas.microsoft.com/office/drawing/2014/main" id="{B6930E61-AE4E-C192-C193-A722836F27D8}"/>
+                  <a16:creationId xmlns:a16="http://schemas.microsoft.com/office/drawing/2014/main" id="{210BF49F-0680-5BAB-2892-AE06E4E26ABE}"/>
                 </a:ext>
               </a:extLst>
             </p:cNvPr>
@@ -3607,15 +3536,13 @@
           </p:nvSpPr>
           <p:spPr>
             <a:xfrm>
-              <a:off x="5415494" y="3080397"/>
+              <a:off x="5941524" y="3376391"/>
               <a:ext cx="325797" cy="71501"/>
             </a:xfrm>
             <a:prstGeom prst="rect">
               <a:avLst/>
             </a:prstGeom>
-            <a:solidFill>
-              <a:srgbClr val="FF0000"/>
-            </a:solidFill>
+            <a:grpFill/>
             <a:ln>
               <a:noFill/>
             </a:ln>
@@ -3662,8 +3589,8 @@
         </p:nvCxnSpPr>
         <p:spPr>
           <a:xfrm flipH="1">
-            <a:off x="1058027" y="846110"/>
-            <a:ext cx="9955261" cy="12321"/>
+            <a:off x="4645620" y="846110"/>
+            <a:ext cx="6367668" cy="13430"/>
           </a:xfrm>
           <a:prstGeom prst="line">
             <a:avLst/>
@@ -3689,374 +3616,6 @@
           </a:fontRef>
         </p:style>
       </p:cxnSp>
-      <p:grpSp>
-        <p:nvGrpSpPr>
-          <p:cNvPr id="141" name="Group 140">
-            <a:extLst>
-              <a:ext uri="{FF2B5EF4-FFF2-40B4-BE49-F238E27FC236}">
-                <a16:creationId xmlns:a16="http://schemas.microsoft.com/office/drawing/2014/main" id="{B80258A6-6E74-B06A-B384-80954C7BCEA7}"/>
-              </a:ext>
-            </a:extLst>
-          </p:cNvPr>
-          <p:cNvGrpSpPr/>
-          <p:nvPr/>
-        </p:nvGrpSpPr>
-        <p:grpSpPr>
-          <a:xfrm>
-            <a:off x="2885492" y="431634"/>
-            <a:ext cx="1310209" cy="806000"/>
-            <a:chOff x="2677704" y="366749"/>
-            <a:chExt cx="1461448" cy="943455"/>
-          </a:xfrm>
-        </p:grpSpPr>
-        <p:grpSp>
-          <p:nvGrpSpPr>
-            <p:cNvPr id="20" name="Group 19">
-              <a:extLst>
-                <a:ext uri="{FF2B5EF4-FFF2-40B4-BE49-F238E27FC236}">
-                  <a16:creationId xmlns:a16="http://schemas.microsoft.com/office/drawing/2014/main" id="{6FB7B51A-3408-A935-ED04-7F88FE64DACE}"/>
-                </a:ext>
-              </a:extLst>
-            </p:cNvPr>
-            <p:cNvGrpSpPr/>
-            <p:nvPr/>
-          </p:nvGrpSpPr>
-          <p:grpSpPr>
-            <a:xfrm>
-              <a:off x="2924321" y="366749"/>
-              <a:ext cx="947525" cy="943455"/>
-              <a:chOff x="5736068" y="1686622"/>
-              <a:chExt cx="1042108" cy="993632"/>
-            </a:xfrm>
-          </p:grpSpPr>
-          <p:sp>
-            <p:nvSpPr>
-              <p:cNvPr id="17" name="Oval 16">
-                <a:extLst>
-                  <a:ext uri="{FF2B5EF4-FFF2-40B4-BE49-F238E27FC236}">
-                    <a16:creationId xmlns:a16="http://schemas.microsoft.com/office/drawing/2014/main" id="{DBC6F374-CD07-9C96-4DAD-BB1815FE4356}"/>
-                  </a:ext>
-                </a:extLst>
-              </p:cNvPr>
-              <p:cNvSpPr/>
-              <p:nvPr/>
-            </p:nvSpPr>
-            <p:spPr>
-              <a:xfrm>
-                <a:off x="5736068" y="1686622"/>
-                <a:ext cx="1042108" cy="993632"/>
-              </a:xfrm>
-              <a:prstGeom prst="ellipse">
-                <a:avLst/>
-              </a:prstGeom>
-              <a:solidFill>
-                <a:schemeClr val="bg1">
-                  <a:lumMod val="95000"/>
-                </a:schemeClr>
-              </a:solidFill>
-              <a:ln w="38100"/>
-            </p:spPr>
-            <p:style>
-              <a:lnRef idx="2">
-                <a:schemeClr val="accent1">
-                  <a:shade val="50000"/>
-                </a:schemeClr>
-              </a:lnRef>
-              <a:fillRef idx="1">
-                <a:schemeClr val="accent1"/>
-              </a:fillRef>
-              <a:effectRef idx="0">
-                <a:schemeClr val="accent1"/>
-              </a:effectRef>
-              <a:fontRef idx="minor">
-                <a:schemeClr val="lt1"/>
-              </a:fontRef>
-            </p:style>
-            <p:txBody>
-              <a:bodyPr rtlCol="0" anchor="ctr"/>
-              <a:lstStyle/>
-              <a:p>
-                <a:pPr algn="ctr"/>
-                <a:endParaRPr lang="en-IN" sz="4000" dirty="0">
-                  <a:solidFill>
-                    <a:srgbClr val="FF0000"/>
-                  </a:solidFill>
-                </a:endParaRPr>
-              </a:p>
-            </p:txBody>
-          </p:sp>
-          <p:sp>
-            <p:nvSpPr>
-              <p:cNvPr id="18" name="TextBox 17">
-                <a:extLst>
-                  <a:ext uri="{FF2B5EF4-FFF2-40B4-BE49-F238E27FC236}">
-                    <a16:creationId xmlns:a16="http://schemas.microsoft.com/office/drawing/2014/main" id="{9103FC6C-0A35-A4EF-D5B7-E5F9BEDC2779}"/>
-                  </a:ext>
-                </a:extLst>
-              </p:cNvPr>
-              <p:cNvSpPr txBox="1"/>
-              <p:nvPr/>
-            </p:nvSpPr>
-            <p:spPr>
-              <a:xfrm>
-                <a:off x="5999025" y="1772239"/>
-                <a:ext cx="516193" cy="584775"/>
-              </a:xfrm>
-              <a:prstGeom prst="rect">
-                <a:avLst/>
-              </a:prstGeom>
-              <a:noFill/>
-            </p:spPr>
-            <p:txBody>
-              <a:bodyPr wrap="square" rtlCol="0">
-                <a:spAutoFit/>
-              </a:bodyPr>
-              <a:lstStyle/>
-              <a:p>
-                <a:pPr algn="ctr"/>
-                <a:r>
-                  <a:rPr lang="en-IN" sz="3200" b="1" dirty="0">
-                    <a:solidFill>
-                      <a:srgbClr val="FF0000"/>
-                    </a:solidFill>
-                    <a:latin typeface="Arial" panose="020B0604020202020204" pitchFamily="34" charset="0"/>
-                    <a:cs typeface="Arial" panose="020B0604020202020204" pitchFamily="34" charset="0"/>
-                  </a:rPr>
-                  <a:t>A</a:t>
-                </a:r>
-              </a:p>
-            </p:txBody>
-          </p:sp>
-          <p:sp>
-            <p:nvSpPr>
-              <p:cNvPr id="19" name="Rectangle 18">
-                <a:extLst>
-                  <a:ext uri="{FF2B5EF4-FFF2-40B4-BE49-F238E27FC236}">
-                    <a16:creationId xmlns:a16="http://schemas.microsoft.com/office/drawing/2014/main" id="{62DB162A-EC06-3684-C3A2-779EC1E447E7}"/>
-                  </a:ext>
-                </a:extLst>
-              </p:cNvPr>
-              <p:cNvSpPr/>
-              <p:nvPr/>
-            </p:nvSpPr>
-            <p:spPr>
-              <a:xfrm>
-                <a:off x="6096000" y="2357014"/>
-                <a:ext cx="325797" cy="71501"/>
-              </a:xfrm>
-              <a:prstGeom prst="rect">
-                <a:avLst/>
-              </a:prstGeom>
-              <a:solidFill>
-                <a:srgbClr val="FF0000"/>
-              </a:solidFill>
-              <a:ln>
-                <a:noFill/>
-              </a:ln>
-            </p:spPr>
-            <p:style>
-              <a:lnRef idx="2">
-                <a:schemeClr val="accent1">
-                  <a:shade val="50000"/>
-                </a:schemeClr>
-              </a:lnRef>
-              <a:fillRef idx="1">
-                <a:schemeClr val="accent1"/>
-              </a:fillRef>
-              <a:effectRef idx="0">
-                <a:schemeClr val="accent1"/>
-              </a:effectRef>
-              <a:fontRef idx="minor">
-                <a:schemeClr val="lt1"/>
-              </a:fontRef>
-            </p:style>
-            <p:txBody>
-              <a:bodyPr rtlCol="0" anchor="ctr"/>
-              <a:lstStyle/>
-              <a:p>
-                <a:pPr algn="ctr"/>
-                <a:endParaRPr lang="en-IN"/>
-              </a:p>
-            </p:txBody>
-          </p:sp>
-        </p:grpSp>
-        <p:grpSp>
-          <p:nvGrpSpPr>
-            <p:cNvPr id="85" name="Group 84">
-              <a:extLst>
-                <a:ext uri="{FF2B5EF4-FFF2-40B4-BE49-F238E27FC236}">
-                  <a16:creationId xmlns:a16="http://schemas.microsoft.com/office/drawing/2014/main" id="{57CA27D4-E219-0B8E-63F2-EE00571FCE46}"/>
-                </a:ext>
-              </a:extLst>
-            </p:cNvPr>
-            <p:cNvGrpSpPr/>
-            <p:nvPr/>
-          </p:nvGrpSpPr>
-          <p:grpSpPr>
-            <a:xfrm>
-              <a:off x="2677704" y="448042"/>
-              <a:ext cx="247026" cy="260732"/>
-              <a:chOff x="5941524" y="3192658"/>
-              <a:chExt cx="325797" cy="325797"/>
-            </a:xfrm>
-            <a:solidFill>
-              <a:srgbClr val="FF0000"/>
-            </a:solidFill>
-          </p:grpSpPr>
-          <p:sp>
-            <p:nvSpPr>
-              <p:cNvPr id="87" name="Rectangle 86">
-                <a:extLst>
-                  <a:ext uri="{FF2B5EF4-FFF2-40B4-BE49-F238E27FC236}">
-                    <a16:creationId xmlns:a16="http://schemas.microsoft.com/office/drawing/2014/main" id="{66A557F3-DB72-C1F3-6A60-EDFB199AADD5}"/>
-                  </a:ext>
-                </a:extLst>
-              </p:cNvPr>
-              <p:cNvSpPr/>
-              <p:nvPr/>
-            </p:nvSpPr>
-            <p:spPr>
-              <a:xfrm rot="5400000">
-                <a:off x="5941525" y="3319806"/>
-                <a:ext cx="325797" cy="71501"/>
-              </a:xfrm>
-              <a:prstGeom prst="rect">
-                <a:avLst/>
-              </a:prstGeom>
-              <a:grpFill/>
-              <a:ln>
-                <a:noFill/>
-              </a:ln>
-            </p:spPr>
-            <p:style>
-              <a:lnRef idx="2">
-                <a:schemeClr val="accent1">
-                  <a:shade val="50000"/>
-                </a:schemeClr>
-              </a:lnRef>
-              <a:fillRef idx="1">
-                <a:schemeClr val="accent1"/>
-              </a:fillRef>
-              <a:effectRef idx="0">
-                <a:schemeClr val="accent1"/>
-              </a:effectRef>
-              <a:fontRef idx="minor">
-                <a:schemeClr val="lt1"/>
-              </a:fontRef>
-            </p:style>
-            <p:txBody>
-              <a:bodyPr rtlCol="0" anchor="ctr"/>
-              <a:lstStyle/>
-              <a:p>
-                <a:pPr algn="ctr"/>
-                <a:endParaRPr lang="en-IN"/>
-              </a:p>
-            </p:txBody>
-          </p:sp>
-          <p:sp>
-            <p:nvSpPr>
-              <p:cNvPr id="88" name="Rectangle 87">
-                <a:extLst>
-                  <a:ext uri="{FF2B5EF4-FFF2-40B4-BE49-F238E27FC236}">
-                    <a16:creationId xmlns:a16="http://schemas.microsoft.com/office/drawing/2014/main" id="{BDEA8464-1097-8FF0-DEE5-CC6ED9718EE8}"/>
-                  </a:ext>
-                </a:extLst>
-              </p:cNvPr>
-              <p:cNvSpPr/>
-              <p:nvPr/>
-            </p:nvSpPr>
-            <p:spPr>
-              <a:xfrm>
-                <a:off x="5941524" y="3319805"/>
-                <a:ext cx="325797" cy="71501"/>
-              </a:xfrm>
-              <a:prstGeom prst="rect">
-                <a:avLst/>
-              </a:prstGeom>
-              <a:grpFill/>
-              <a:ln>
-                <a:noFill/>
-              </a:ln>
-            </p:spPr>
-            <p:style>
-              <a:lnRef idx="2">
-                <a:schemeClr val="accent1">
-                  <a:shade val="50000"/>
-                </a:schemeClr>
-              </a:lnRef>
-              <a:fillRef idx="1">
-                <a:schemeClr val="accent1"/>
-              </a:fillRef>
-              <a:effectRef idx="0">
-                <a:schemeClr val="accent1"/>
-              </a:effectRef>
-              <a:fontRef idx="minor">
-                <a:schemeClr val="lt1"/>
-              </a:fontRef>
-            </p:style>
-            <p:txBody>
-              <a:bodyPr rtlCol="0" anchor="ctr"/>
-              <a:lstStyle/>
-              <a:p>
-                <a:pPr algn="ctr"/>
-                <a:endParaRPr lang="en-IN"/>
-              </a:p>
-            </p:txBody>
-          </p:sp>
-        </p:grpSp>
-        <p:sp>
-          <p:nvSpPr>
-            <p:cNvPr id="89" name="Rectangle 88">
-              <a:extLst>
-                <a:ext uri="{FF2B5EF4-FFF2-40B4-BE49-F238E27FC236}">
-                  <a16:creationId xmlns:a16="http://schemas.microsoft.com/office/drawing/2014/main" id="{995791F1-FBE5-A29E-6659-2582BCEBEFD4}"/>
-                </a:ext>
-              </a:extLst>
-            </p:cNvPr>
-            <p:cNvSpPr/>
-            <p:nvPr/>
-          </p:nvSpPr>
-          <p:spPr>
-            <a:xfrm>
-              <a:off x="3892126" y="521185"/>
-              <a:ext cx="247026" cy="57222"/>
-            </a:xfrm>
-            <a:prstGeom prst="rect">
-              <a:avLst/>
-            </a:prstGeom>
-            <a:solidFill>
-              <a:srgbClr val="FF0000"/>
-            </a:solidFill>
-            <a:ln>
-              <a:noFill/>
-            </a:ln>
-          </p:spPr>
-          <p:style>
-            <a:lnRef idx="2">
-              <a:schemeClr val="accent1">
-                <a:shade val="50000"/>
-              </a:schemeClr>
-            </a:lnRef>
-            <a:fillRef idx="1">
-              <a:schemeClr val="accent1"/>
-            </a:fillRef>
-            <a:effectRef idx="0">
-              <a:schemeClr val="accent1"/>
-            </a:effectRef>
-            <a:fontRef idx="minor">
-              <a:schemeClr val="lt1"/>
-            </a:fontRef>
-          </p:style>
-          <p:txBody>
-            <a:bodyPr rtlCol="0" anchor="ctr"/>
-            <a:lstStyle/>
-            <a:p>
-              <a:pPr algn="ctr"/>
-              <a:endParaRPr lang="en-IN"/>
-            </a:p>
-          </p:txBody>
-        </p:sp>
-      </p:grpSp>
       <p:cxnSp>
         <p:nvCxnSpPr>
           <p:cNvPr id="98" name="Straight Connector 97">
@@ -4114,7 +3673,7 @@
         </p:nvGrpSpPr>
         <p:grpSpPr>
           <a:xfrm>
-            <a:off x="7583572" y="2129818"/>
+            <a:off x="9007018" y="5213302"/>
             <a:ext cx="512854" cy="561746"/>
             <a:chOff x="3610045" y="3464345"/>
             <a:chExt cx="693435" cy="575227"/>
@@ -4162,7 +3721,7 @@
             <a:lstStyle/>
             <a:p>
               <a:pPr algn="ctr"/>
-              <a:endParaRPr lang="en-IN"/>
+              <a:endParaRPr lang="en-IN" dirty="0"/>
             </a:p>
           </p:txBody>
         </p:sp>
@@ -4253,648 +3812,49 @@
           </a:fontRef>
         </p:style>
       </p:cxnSp>
-      <p:grpSp>
-        <p:nvGrpSpPr>
-          <p:cNvPr id="50" name="Group 49">
+      <p:cxnSp>
+        <p:nvCxnSpPr>
+          <p:cNvPr id="74" name="Straight Connector 73">
             <a:extLst>
               <a:ext uri="{FF2B5EF4-FFF2-40B4-BE49-F238E27FC236}">
-                <a16:creationId xmlns:a16="http://schemas.microsoft.com/office/drawing/2014/main" id="{5C1A4C46-466A-E7AA-325F-0568DEFCE1D2}"/>
+                <a16:creationId xmlns:a16="http://schemas.microsoft.com/office/drawing/2014/main" id="{F469474A-C8D2-893C-8016-DF894054655B}"/>
               </a:ext>
             </a:extLst>
           </p:cNvPr>
-          <p:cNvGrpSpPr/>
+          <p:cNvCxnSpPr>
+            <a:cxnSpLocks/>
+          </p:cNvCxnSpPr>
           <p:nvPr/>
-        </p:nvGrpSpPr>
-        <p:grpSpPr>
+        </p:nvCxnSpPr>
+        <p:spPr>
           <a:xfrm>
-            <a:off x="6096000" y="1092138"/>
-            <a:ext cx="439795" cy="2425224"/>
-            <a:chOff x="6096002" y="1241982"/>
-            <a:chExt cx="439795" cy="2425224"/>
+            <a:off x="11589091" y="5409210"/>
+            <a:ext cx="2300" cy="898927"/>
           </a:xfrm>
-        </p:grpSpPr>
-        <p:grpSp>
-          <p:nvGrpSpPr>
-            <p:cNvPr id="25" name="Group 24">
-              <a:extLst>
-                <a:ext uri="{FF2B5EF4-FFF2-40B4-BE49-F238E27FC236}">
-                  <a16:creationId xmlns:a16="http://schemas.microsoft.com/office/drawing/2014/main" id="{E561D21F-D852-DEE1-7855-4DCA5BFFBEE4}"/>
-                </a:ext>
-              </a:extLst>
-            </p:cNvPr>
-            <p:cNvGrpSpPr/>
-            <p:nvPr/>
-          </p:nvGrpSpPr>
-          <p:grpSpPr>
-            <a:xfrm rot="16200000">
-              <a:off x="5694916" y="2383113"/>
-              <a:ext cx="1241968" cy="439795"/>
-              <a:chOff x="2905113" y="3027281"/>
-              <a:chExt cx="1489971" cy="494935"/>
-            </a:xfrm>
-          </p:grpSpPr>
-          <p:cxnSp>
-            <p:nvCxnSpPr>
-              <p:cNvPr id="55" name="Straight Connector 54">
-                <a:extLst>
-                  <a:ext uri="{FF2B5EF4-FFF2-40B4-BE49-F238E27FC236}">
-                    <a16:creationId xmlns:a16="http://schemas.microsoft.com/office/drawing/2014/main" id="{BEA87DF1-57AD-E4C7-3CD9-0B94A03C21D1}"/>
-                  </a:ext>
-                </a:extLst>
-              </p:cNvPr>
-              <p:cNvCxnSpPr>
-                <a:cxnSpLocks/>
-              </p:cNvCxnSpPr>
-              <p:nvPr/>
-            </p:nvCxnSpPr>
-            <p:spPr>
-              <a:xfrm rot="5400000" flipH="1" flipV="1">
-                <a:off x="2786718" y="3145681"/>
-                <a:ext cx="394474" cy="157683"/>
-              </a:xfrm>
-              <a:prstGeom prst="line">
-                <a:avLst/>
-              </a:prstGeom>
-              <a:ln w="57150">
-                <a:solidFill>
-                  <a:srgbClr val="0070C0"/>
-                </a:solidFill>
-              </a:ln>
-            </p:spPr>
-            <p:style>
-              <a:lnRef idx="1">
-                <a:schemeClr val="accent1"/>
-              </a:lnRef>
-              <a:fillRef idx="0">
-                <a:schemeClr val="accent1"/>
-              </a:fillRef>
-              <a:effectRef idx="0">
-                <a:schemeClr val="accent1"/>
-              </a:effectRef>
-              <a:fontRef idx="minor">
-                <a:schemeClr val="tx1"/>
-              </a:fontRef>
-            </p:style>
-          </p:cxnSp>
-          <p:grpSp>
-            <p:nvGrpSpPr>
-              <p:cNvPr id="56" name="Group 55">
-                <a:extLst>
-                  <a:ext uri="{FF2B5EF4-FFF2-40B4-BE49-F238E27FC236}">
-                    <a16:creationId xmlns:a16="http://schemas.microsoft.com/office/drawing/2014/main" id="{D43E756B-62FF-DE0E-872C-754F4C263D16}"/>
-                  </a:ext>
-                </a:extLst>
-              </p:cNvPr>
-              <p:cNvGrpSpPr/>
-              <p:nvPr/>
-            </p:nvGrpSpPr>
-            <p:grpSpPr>
-              <a:xfrm>
-                <a:off x="3062796" y="3038382"/>
-                <a:ext cx="301842" cy="483834"/>
-                <a:chOff x="3062796" y="3027285"/>
-                <a:chExt cx="301842" cy="483834"/>
-              </a:xfrm>
-            </p:grpSpPr>
-            <p:cxnSp>
-              <p:nvCxnSpPr>
-                <p:cNvPr id="71" name="Straight Connector 70">
-                  <a:extLst>
-                    <a:ext uri="{FF2B5EF4-FFF2-40B4-BE49-F238E27FC236}">
-                      <a16:creationId xmlns:a16="http://schemas.microsoft.com/office/drawing/2014/main" id="{92228DA3-FC6A-1238-1AD1-06C06FC5707F}"/>
-                    </a:ext>
-                  </a:extLst>
-                </p:cNvPr>
-                <p:cNvCxnSpPr>
-                  <a:cxnSpLocks/>
-                </p:cNvCxnSpPr>
-                <p:nvPr/>
-              </p:nvCxnSpPr>
-              <p:spPr>
-                <a:xfrm flipH="1" flipV="1">
-                  <a:off x="3062796" y="3027285"/>
-                  <a:ext cx="150921" cy="483834"/>
-                </a:xfrm>
-                <a:prstGeom prst="line">
-                  <a:avLst/>
-                </a:prstGeom>
-                <a:ln w="57150">
-                  <a:solidFill>
-                    <a:srgbClr val="0070C0"/>
-                  </a:solidFill>
-                </a:ln>
-              </p:spPr>
-              <p:style>
-                <a:lnRef idx="1">
-                  <a:schemeClr val="accent1"/>
-                </a:lnRef>
-                <a:fillRef idx="0">
-                  <a:schemeClr val="accent1"/>
-                </a:fillRef>
-                <a:effectRef idx="0">
-                  <a:schemeClr val="accent1"/>
-                </a:effectRef>
-                <a:fontRef idx="minor">
-                  <a:schemeClr val="tx1"/>
-                </a:fontRef>
-              </p:style>
-            </p:cxnSp>
-            <p:cxnSp>
-              <p:nvCxnSpPr>
-                <p:cNvPr id="72" name="Straight Connector 71">
-                  <a:extLst>
-                    <a:ext uri="{FF2B5EF4-FFF2-40B4-BE49-F238E27FC236}">
-                      <a16:creationId xmlns:a16="http://schemas.microsoft.com/office/drawing/2014/main" id="{8E5028D4-6AE6-11C8-DA53-DEB32631038B}"/>
-                    </a:ext>
-                  </a:extLst>
-                </p:cNvPr>
-                <p:cNvCxnSpPr>
-                  <a:cxnSpLocks/>
-                </p:cNvCxnSpPr>
-                <p:nvPr/>
-              </p:nvCxnSpPr>
-              <p:spPr>
-                <a:xfrm flipV="1">
-                  <a:off x="3213717" y="3027285"/>
-                  <a:ext cx="150921" cy="483834"/>
-                </a:xfrm>
-                <a:prstGeom prst="line">
-                  <a:avLst/>
-                </a:prstGeom>
-                <a:ln w="57150">
-                  <a:solidFill>
-                    <a:srgbClr val="0070C0"/>
-                  </a:solidFill>
-                </a:ln>
-              </p:spPr>
-              <p:style>
-                <a:lnRef idx="1">
-                  <a:schemeClr val="accent1"/>
-                </a:lnRef>
-                <a:fillRef idx="0">
-                  <a:schemeClr val="accent1"/>
-                </a:fillRef>
-                <a:effectRef idx="0">
-                  <a:schemeClr val="accent1"/>
-                </a:effectRef>
-                <a:fontRef idx="minor">
-                  <a:schemeClr val="tx1"/>
-                </a:fontRef>
-              </p:style>
-            </p:cxnSp>
-          </p:grpSp>
-          <p:grpSp>
-            <p:nvGrpSpPr>
-              <p:cNvPr id="57" name="Group 56">
-                <a:extLst>
-                  <a:ext uri="{FF2B5EF4-FFF2-40B4-BE49-F238E27FC236}">
-                    <a16:creationId xmlns:a16="http://schemas.microsoft.com/office/drawing/2014/main" id="{B5F8BEB7-04AE-B2F5-A543-A030591E01EE}"/>
-                  </a:ext>
-                </a:extLst>
-              </p:cNvPr>
-              <p:cNvGrpSpPr/>
-              <p:nvPr/>
-            </p:nvGrpSpPr>
-            <p:grpSpPr>
-              <a:xfrm>
-                <a:off x="3366118" y="3027281"/>
-                <a:ext cx="301842" cy="483838"/>
-                <a:chOff x="3062796" y="3027281"/>
-                <a:chExt cx="301842" cy="483838"/>
-              </a:xfrm>
-            </p:grpSpPr>
-            <p:cxnSp>
-              <p:nvCxnSpPr>
-                <p:cNvPr id="69" name="Straight Connector 68">
-                  <a:extLst>
-                    <a:ext uri="{FF2B5EF4-FFF2-40B4-BE49-F238E27FC236}">
-                      <a16:creationId xmlns:a16="http://schemas.microsoft.com/office/drawing/2014/main" id="{2C9C69B8-FF13-D297-0559-05DE87949FA2}"/>
-                    </a:ext>
-                  </a:extLst>
-                </p:cNvPr>
-                <p:cNvCxnSpPr>
-                  <a:cxnSpLocks/>
-                </p:cNvCxnSpPr>
-                <p:nvPr/>
-              </p:nvCxnSpPr>
-              <p:spPr>
-                <a:xfrm flipH="1" flipV="1">
-                  <a:off x="3062796" y="3027281"/>
-                  <a:ext cx="150922" cy="483834"/>
-                </a:xfrm>
-                <a:prstGeom prst="line">
-                  <a:avLst/>
-                </a:prstGeom>
-                <a:ln w="57150">
-                  <a:solidFill>
-                    <a:srgbClr val="0070C0"/>
-                  </a:solidFill>
-                </a:ln>
-              </p:spPr>
-              <p:style>
-                <a:lnRef idx="1">
-                  <a:schemeClr val="accent1"/>
-                </a:lnRef>
-                <a:fillRef idx="0">
-                  <a:schemeClr val="accent1"/>
-                </a:fillRef>
-                <a:effectRef idx="0">
-                  <a:schemeClr val="accent1"/>
-                </a:effectRef>
-                <a:fontRef idx="minor">
-                  <a:schemeClr val="tx1"/>
-                </a:fontRef>
-              </p:style>
-            </p:cxnSp>
-            <p:cxnSp>
-              <p:nvCxnSpPr>
-                <p:cNvPr id="70" name="Straight Connector 69">
-                  <a:extLst>
-                    <a:ext uri="{FF2B5EF4-FFF2-40B4-BE49-F238E27FC236}">
-                      <a16:creationId xmlns:a16="http://schemas.microsoft.com/office/drawing/2014/main" id="{D06297FA-010D-932B-3DFB-CD0E33840BE6}"/>
-                    </a:ext>
-                  </a:extLst>
-                </p:cNvPr>
-                <p:cNvCxnSpPr>
-                  <a:cxnSpLocks/>
-                </p:cNvCxnSpPr>
-                <p:nvPr/>
-              </p:nvCxnSpPr>
-              <p:spPr>
-                <a:xfrm flipV="1">
-                  <a:off x="3213717" y="3027285"/>
-                  <a:ext cx="150921" cy="483834"/>
-                </a:xfrm>
-                <a:prstGeom prst="line">
-                  <a:avLst/>
-                </a:prstGeom>
-                <a:ln w="57150">
-                  <a:solidFill>
-                    <a:srgbClr val="0070C0"/>
-                  </a:solidFill>
-                </a:ln>
-              </p:spPr>
-              <p:style>
-                <a:lnRef idx="1">
-                  <a:schemeClr val="accent1"/>
-                </a:lnRef>
-                <a:fillRef idx="0">
-                  <a:schemeClr val="accent1"/>
-                </a:fillRef>
-                <a:effectRef idx="0">
-                  <a:schemeClr val="accent1"/>
-                </a:effectRef>
-                <a:fontRef idx="minor">
-                  <a:schemeClr val="tx1"/>
-                </a:fontRef>
-              </p:style>
-            </p:cxnSp>
-          </p:grpSp>
-          <p:grpSp>
-            <p:nvGrpSpPr>
-              <p:cNvPr id="58" name="Group 57">
-                <a:extLst>
-                  <a:ext uri="{FF2B5EF4-FFF2-40B4-BE49-F238E27FC236}">
-                    <a16:creationId xmlns:a16="http://schemas.microsoft.com/office/drawing/2014/main" id="{B33E3171-D02B-0281-CAC7-BBA5E420A046}"/>
-                  </a:ext>
-                </a:extLst>
-              </p:cNvPr>
-              <p:cNvGrpSpPr/>
-              <p:nvPr/>
-            </p:nvGrpSpPr>
-            <p:grpSpPr>
-              <a:xfrm>
-                <a:off x="3971282" y="3038382"/>
-                <a:ext cx="301842" cy="483834"/>
-                <a:chOff x="3062796" y="3027285"/>
-                <a:chExt cx="301842" cy="483834"/>
-              </a:xfrm>
-            </p:grpSpPr>
-            <p:cxnSp>
-              <p:nvCxnSpPr>
-                <p:cNvPr id="67" name="Straight Connector 66">
-                  <a:extLst>
-                    <a:ext uri="{FF2B5EF4-FFF2-40B4-BE49-F238E27FC236}">
-                      <a16:creationId xmlns:a16="http://schemas.microsoft.com/office/drawing/2014/main" id="{8D103C26-19B1-E709-A975-96744FB2C52F}"/>
-                    </a:ext>
-                  </a:extLst>
-                </p:cNvPr>
-                <p:cNvCxnSpPr>
-                  <a:cxnSpLocks/>
-                </p:cNvCxnSpPr>
-                <p:nvPr/>
-              </p:nvCxnSpPr>
-              <p:spPr>
-                <a:xfrm flipH="1" flipV="1">
-                  <a:off x="3062796" y="3027285"/>
-                  <a:ext cx="150921" cy="483834"/>
-                </a:xfrm>
-                <a:prstGeom prst="line">
-                  <a:avLst/>
-                </a:prstGeom>
-                <a:ln w="57150">
-                  <a:solidFill>
-                    <a:srgbClr val="0070C0"/>
-                  </a:solidFill>
-                </a:ln>
-              </p:spPr>
-              <p:style>
-                <a:lnRef idx="1">
-                  <a:schemeClr val="accent1"/>
-                </a:lnRef>
-                <a:fillRef idx="0">
-                  <a:schemeClr val="accent1"/>
-                </a:fillRef>
-                <a:effectRef idx="0">
-                  <a:schemeClr val="accent1"/>
-                </a:effectRef>
-                <a:fontRef idx="minor">
-                  <a:schemeClr val="tx1"/>
-                </a:fontRef>
-              </p:style>
-            </p:cxnSp>
-            <p:cxnSp>
-              <p:nvCxnSpPr>
-                <p:cNvPr id="68" name="Straight Connector 67">
-                  <a:extLst>
-                    <a:ext uri="{FF2B5EF4-FFF2-40B4-BE49-F238E27FC236}">
-                      <a16:creationId xmlns:a16="http://schemas.microsoft.com/office/drawing/2014/main" id="{A2F5C1A6-AC32-943F-2D2D-59FCA28625CC}"/>
-                    </a:ext>
-                  </a:extLst>
-                </p:cNvPr>
-                <p:cNvCxnSpPr>
-                  <a:cxnSpLocks/>
-                </p:cNvCxnSpPr>
-                <p:nvPr/>
-              </p:nvCxnSpPr>
-              <p:spPr>
-                <a:xfrm flipV="1">
-                  <a:off x="3213717" y="3027285"/>
-                  <a:ext cx="150921" cy="483834"/>
-                </a:xfrm>
-                <a:prstGeom prst="line">
-                  <a:avLst/>
-                </a:prstGeom>
-                <a:ln w="57150">
-                  <a:solidFill>
-                    <a:srgbClr val="0070C0"/>
-                  </a:solidFill>
-                </a:ln>
-              </p:spPr>
-              <p:style>
-                <a:lnRef idx="1">
-                  <a:schemeClr val="accent1"/>
-                </a:lnRef>
-                <a:fillRef idx="0">
-                  <a:schemeClr val="accent1"/>
-                </a:fillRef>
-                <a:effectRef idx="0">
-                  <a:schemeClr val="accent1"/>
-                </a:effectRef>
-                <a:fontRef idx="minor">
-                  <a:schemeClr val="tx1"/>
-                </a:fontRef>
-              </p:style>
-            </p:cxnSp>
-          </p:grpSp>
-          <p:grpSp>
-            <p:nvGrpSpPr>
-              <p:cNvPr id="59" name="Group 58">
-                <a:extLst>
-                  <a:ext uri="{FF2B5EF4-FFF2-40B4-BE49-F238E27FC236}">
-                    <a16:creationId xmlns:a16="http://schemas.microsoft.com/office/drawing/2014/main" id="{1E893E7A-6AF4-6D8F-466D-B3EAFD98DE09}"/>
-                  </a:ext>
-                </a:extLst>
-              </p:cNvPr>
-              <p:cNvGrpSpPr/>
-              <p:nvPr/>
-            </p:nvGrpSpPr>
-            <p:grpSpPr>
-              <a:xfrm>
-                <a:off x="3667960" y="3038382"/>
-                <a:ext cx="301842" cy="483834"/>
-                <a:chOff x="3062796" y="3027285"/>
-                <a:chExt cx="301842" cy="483834"/>
-              </a:xfrm>
-            </p:grpSpPr>
-            <p:cxnSp>
-              <p:nvCxnSpPr>
-                <p:cNvPr id="65" name="Straight Connector 64">
-                  <a:extLst>
-                    <a:ext uri="{FF2B5EF4-FFF2-40B4-BE49-F238E27FC236}">
-                      <a16:creationId xmlns:a16="http://schemas.microsoft.com/office/drawing/2014/main" id="{D12DF48F-5DF8-5E02-02E2-F226D40F2A8F}"/>
-                    </a:ext>
-                  </a:extLst>
-                </p:cNvPr>
-                <p:cNvCxnSpPr>
-                  <a:cxnSpLocks/>
-                </p:cNvCxnSpPr>
-                <p:nvPr/>
-              </p:nvCxnSpPr>
-              <p:spPr>
-                <a:xfrm flipH="1" flipV="1">
-                  <a:off x="3062796" y="3027285"/>
-                  <a:ext cx="150921" cy="483834"/>
-                </a:xfrm>
-                <a:prstGeom prst="line">
-                  <a:avLst/>
-                </a:prstGeom>
-                <a:ln w="57150">
-                  <a:solidFill>
-                    <a:srgbClr val="0070C0"/>
-                  </a:solidFill>
-                </a:ln>
-              </p:spPr>
-              <p:style>
-                <a:lnRef idx="1">
-                  <a:schemeClr val="accent1"/>
-                </a:lnRef>
-                <a:fillRef idx="0">
-                  <a:schemeClr val="accent1"/>
-                </a:fillRef>
-                <a:effectRef idx="0">
-                  <a:schemeClr val="accent1"/>
-                </a:effectRef>
-                <a:fontRef idx="minor">
-                  <a:schemeClr val="tx1"/>
-                </a:fontRef>
-              </p:style>
-            </p:cxnSp>
-            <p:cxnSp>
-              <p:nvCxnSpPr>
-                <p:cNvPr id="66" name="Straight Connector 65">
-                  <a:extLst>
-                    <a:ext uri="{FF2B5EF4-FFF2-40B4-BE49-F238E27FC236}">
-                      <a16:creationId xmlns:a16="http://schemas.microsoft.com/office/drawing/2014/main" id="{787990BD-CC35-8800-77CF-3EFF5F5A20CD}"/>
-                    </a:ext>
-                  </a:extLst>
-                </p:cNvPr>
-                <p:cNvCxnSpPr>
-                  <a:cxnSpLocks/>
-                </p:cNvCxnSpPr>
-                <p:nvPr/>
-              </p:nvCxnSpPr>
-              <p:spPr>
-                <a:xfrm flipV="1">
-                  <a:off x="3213717" y="3027285"/>
-                  <a:ext cx="150921" cy="483834"/>
-                </a:xfrm>
-                <a:prstGeom prst="line">
-                  <a:avLst/>
-                </a:prstGeom>
-                <a:ln w="57150">
-                  <a:solidFill>
-                    <a:srgbClr val="0070C0"/>
-                  </a:solidFill>
-                </a:ln>
-              </p:spPr>
-              <p:style>
-                <a:lnRef idx="1">
-                  <a:schemeClr val="accent1"/>
-                </a:lnRef>
-                <a:fillRef idx="0">
-                  <a:schemeClr val="accent1"/>
-                </a:fillRef>
-                <a:effectRef idx="0">
-                  <a:schemeClr val="accent1"/>
-                </a:effectRef>
-                <a:fontRef idx="minor">
-                  <a:schemeClr val="tx1"/>
-                </a:fontRef>
-              </p:style>
-            </p:cxnSp>
-          </p:grpSp>
-          <p:cxnSp>
-            <p:nvCxnSpPr>
-              <p:cNvPr id="63" name="Straight Connector 62">
-                <a:extLst>
-                  <a:ext uri="{FF2B5EF4-FFF2-40B4-BE49-F238E27FC236}">
-                    <a16:creationId xmlns:a16="http://schemas.microsoft.com/office/drawing/2014/main" id="{21037A3A-C159-F286-07D2-BC8B1B4ECE41}"/>
-                  </a:ext>
-                </a:extLst>
-              </p:cNvPr>
-              <p:cNvCxnSpPr>
-                <a:cxnSpLocks/>
-              </p:cNvCxnSpPr>
-              <p:nvPr/>
-            </p:nvCxnSpPr>
-            <p:spPr>
-              <a:xfrm rot="5400000" flipH="1">
-                <a:off x="4136867" y="3163543"/>
-                <a:ext cx="394475" cy="121959"/>
-              </a:xfrm>
-              <a:prstGeom prst="line">
-                <a:avLst/>
-              </a:prstGeom>
-              <a:ln w="57150">
-                <a:solidFill>
-                  <a:srgbClr val="0070C0"/>
-                </a:solidFill>
-              </a:ln>
-            </p:spPr>
-            <p:style>
-              <a:lnRef idx="1">
-                <a:schemeClr val="accent1"/>
-              </a:lnRef>
-              <a:fillRef idx="0">
-                <a:schemeClr val="accent1"/>
-              </a:fillRef>
-              <a:effectRef idx="0">
-                <a:schemeClr val="accent1"/>
-              </a:effectRef>
-              <a:fontRef idx="minor">
-                <a:schemeClr val="tx1"/>
-              </a:fontRef>
-            </p:style>
-          </p:cxnSp>
-        </p:grpSp>
-        <p:cxnSp>
-          <p:nvCxnSpPr>
-            <p:cNvPr id="74" name="Straight Connector 73">
-              <a:extLst>
-                <a:ext uri="{FF2B5EF4-FFF2-40B4-BE49-F238E27FC236}">
-                  <a16:creationId xmlns:a16="http://schemas.microsoft.com/office/drawing/2014/main" id="{F469474A-C8D2-893C-8016-DF894054655B}"/>
-                </a:ext>
-              </a:extLst>
-            </p:cNvPr>
-            <p:cNvCxnSpPr>
-              <a:cxnSpLocks/>
-            </p:cNvCxnSpPr>
-            <p:nvPr/>
-          </p:nvCxnSpPr>
-          <p:spPr>
-            <a:xfrm>
-              <a:off x="6434769" y="1241982"/>
-              <a:ext cx="11763" cy="740045"/>
-            </a:xfrm>
-            <a:prstGeom prst="line">
-              <a:avLst/>
-            </a:prstGeom>
-            <a:ln w="57150">
-              <a:solidFill>
-                <a:srgbClr val="0070C0"/>
-              </a:solidFill>
-            </a:ln>
-          </p:spPr>
-          <p:style>
-            <a:lnRef idx="1">
-              <a:schemeClr val="accent1"/>
-            </a:lnRef>
-            <a:fillRef idx="0">
-              <a:schemeClr val="accent1"/>
-            </a:fillRef>
-            <a:effectRef idx="0">
-              <a:schemeClr val="accent1"/>
-            </a:effectRef>
-            <a:fontRef idx="minor">
-              <a:schemeClr val="tx1"/>
-            </a:fontRef>
-          </p:style>
-        </p:cxnSp>
-        <p:cxnSp>
-          <p:nvCxnSpPr>
-            <p:cNvPr id="77" name="Straight Connector 76">
-              <a:extLst>
-                <a:ext uri="{FF2B5EF4-FFF2-40B4-BE49-F238E27FC236}">
-                  <a16:creationId xmlns:a16="http://schemas.microsoft.com/office/drawing/2014/main" id="{18975AC2-8EEC-FA3F-31AD-7C4C45038AF6}"/>
-                </a:ext>
-              </a:extLst>
-            </p:cNvPr>
-            <p:cNvCxnSpPr>
-              <a:cxnSpLocks/>
-            </p:cNvCxnSpPr>
-            <p:nvPr/>
-          </p:nvCxnSpPr>
-          <p:spPr>
-            <a:xfrm>
-              <a:off x="6434769" y="3188904"/>
-              <a:ext cx="0" cy="478302"/>
-            </a:xfrm>
-            <a:prstGeom prst="line">
-              <a:avLst/>
-            </a:prstGeom>
-            <a:ln w="57150">
-              <a:solidFill>
-                <a:srgbClr val="0070C0"/>
-              </a:solidFill>
-            </a:ln>
-          </p:spPr>
-          <p:style>
-            <a:lnRef idx="1">
-              <a:schemeClr val="accent1"/>
-            </a:lnRef>
-            <a:fillRef idx="0">
-              <a:schemeClr val="accent1"/>
-            </a:fillRef>
-            <a:effectRef idx="0">
-              <a:schemeClr val="accent1"/>
-            </a:effectRef>
-            <a:fontRef idx="minor">
-              <a:schemeClr val="tx1"/>
-            </a:fontRef>
-          </p:style>
-        </p:cxnSp>
-      </p:grpSp>
+          <a:prstGeom prst="line">
+            <a:avLst/>
+          </a:prstGeom>
+          <a:ln w="57150">
+            <a:solidFill>
+              <a:srgbClr val="0070C0"/>
+            </a:solidFill>
+          </a:ln>
+        </p:spPr>
+        <p:style>
+          <a:lnRef idx="1">
+            <a:schemeClr val="accent1"/>
+          </a:lnRef>
+          <a:fillRef idx="0">
+            <a:schemeClr val="accent1"/>
+          </a:fillRef>
+          <a:effectRef idx="0">
+            <a:schemeClr val="accent1"/>
+          </a:effectRef>
+          <a:fontRef idx="minor">
+            <a:schemeClr val="tx1"/>
+          </a:fontRef>
+        </p:style>
+      </p:cxnSp>
       <p:cxnSp>
         <p:nvCxnSpPr>
           <p:cNvPr id="120" name="Straight Connector 119">
@@ -4911,8 +3871,8 @@
         </p:nvCxnSpPr>
         <p:spPr>
           <a:xfrm flipH="1">
-            <a:off x="6433438" y="3435874"/>
-            <a:ext cx="7210" cy="1301496"/>
+            <a:off x="6433438" y="1308315"/>
+            <a:ext cx="6386" cy="3429055"/>
           </a:xfrm>
           <a:prstGeom prst="line">
             <a:avLst/>
@@ -4955,7 +3915,7 @@
         <p:spPr>
           <a:xfrm>
             <a:off x="6437004" y="846110"/>
-            <a:ext cx="9528" cy="635023"/>
+            <a:ext cx="12600" cy="541614"/>
           </a:xfrm>
           <a:prstGeom prst="line">
             <a:avLst/>
@@ -5236,374 +4196,6 @@
                 </a:rPr>
                 <a:t>C R O</a:t>
               </a:r>
-            </a:p>
-          </p:txBody>
-        </p:sp>
-      </p:grpSp>
-      <p:grpSp>
-        <p:nvGrpSpPr>
-          <p:cNvPr id="140" name="Group 139">
-            <a:extLst>
-              <a:ext uri="{FF2B5EF4-FFF2-40B4-BE49-F238E27FC236}">
-                <a16:creationId xmlns:a16="http://schemas.microsoft.com/office/drawing/2014/main" id="{C13A82B8-ACE7-13BE-1E10-0454166A55E3}"/>
-              </a:ext>
-            </a:extLst>
-          </p:cNvPr>
-          <p:cNvGrpSpPr/>
-          <p:nvPr/>
-        </p:nvGrpSpPr>
-        <p:grpSpPr>
-          <a:xfrm>
-            <a:off x="8923221" y="1707399"/>
-            <a:ext cx="852332" cy="1246162"/>
-            <a:chOff x="8831819" y="1851466"/>
-            <a:chExt cx="977326" cy="1438657"/>
-          </a:xfrm>
-        </p:grpSpPr>
-        <p:grpSp>
-          <p:nvGrpSpPr>
-            <p:cNvPr id="105" name="Group 104">
-              <a:extLst>
-                <a:ext uri="{FF2B5EF4-FFF2-40B4-BE49-F238E27FC236}">
-                  <a16:creationId xmlns:a16="http://schemas.microsoft.com/office/drawing/2014/main" id="{40C40F1B-A883-DD69-4BF2-07B8C31B20C9}"/>
-                </a:ext>
-              </a:extLst>
-            </p:cNvPr>
-            <p:cNvGrpSpPr/>
-            <p:nvPr/>
-          </p:nvGrpSpPr>
-          <p:grpSpPr>
-            <a:xfrm>
-              <a:off x="8861620" y="2184111"/>
-              <a:ext cx="947525" cy="943455"/>
-              <a:chOff x="5736068" y="1686622"/>
-              <a:chExt cx="1042108" cy="993632"/>
-            </a:xfrm>
-          </p:grpSpPr>
-          <p:sp>
-            <p:nvSpPr>
-              <p:cNvPr id="106" name="Oval 105">
-                <a:extLst>
-                  <a:ext uri="{FF2B5EF4-FFF2-40B4-BE49-F238E27FC236}">
-                    <a16:creationId xmlns:a16="http://schemas.microsoft.com/office/drawing/2014/main" id="{B42B74C3-F423-B0F1-DA21-A4C769B07ED2}"/>
-                  </a:ext>
-                </a:extLst>
-              </p:cNvPr>
-              <p:cNvSpPr/>
-              <p:nvPr/>
-            </p:nvSpPr>
-            <p:spPr>
-              <a:xfrm>
-                <a:off x="5736068" y="1686622"/>
-                <a:ext cx="1042108" cy="993632"/>
-              </a:xfrm>
-              <a:prstGeom prst="ellipse">
-                <a:avLst/>
-              </a:prstGeom>
-              <a:solidFill>
-                <a:schemeClr val="bg1">
-                  <a:lumMod val="95000"/>
-                </a:schemeClr>
-              </a:solidFill>
-              <a:ln w="38100"/>
-            </p:spPr>
-            <p:style>
-              <a:lnRef idx="2">
-                <a:schemeClr val="accent1">
-                  <a:shade val="50000"/>
-                </a:schemeClr>
-              </a:lnRef>
-              <a:fillRef idx="1">
-                <a:schemeClr val="accent1"/>
-              </a:fillRef>
-              <a:effectRef idx="0">
-                <a:schemeClr val="accent1"/>
-              </a:effectRef>
-              <a:fontRef idx="minor">
-                <a:schemeClr val="lt1"/>
-              </a:fontRef>
-            </p:style>
-            <p:txBody>
-              <a:bodyPr rtlCol="0" anchor="ctr"/>
-              <a:lstStyle/>
-              <a:p>
-                <a:pPr algn="ctr"/>
-                <a:endParaRPr lang="en-IN" sz="4000" dirty="0">
-                  <a:solidFill>
-                    <a:srgbClr val="FF0000"/>
-                  </a:solidFill>
-                </a:endParaRPr>
-              </a:p>
-            </p:txBody>
-          </p:sp>
-          <p:sp>
-            <p:nvSpPr>
-              <p:cNvPr id="107" name="TextBox 106">
-                <a:extLst>
-                  <a:ext uri="{FF2B5EF4-FFF2-40B4-BE49-F238E27FC236}">
-                    <a16:creationId xmlns:a16="http://schemas.microsoft.com/office/drawing/2014/main" id="{6C5F568E-1886-03DF-1AA8-37A3536F3794}"/>
-                  </a:ext>
-                </a:extLst>
-              </p:cNvPr>
-              <p:cNvSpPr txBox="1"/>
-              <p:nvPr/>
-            </p:nvSpPr>
-            <p:spPr>
-              <a:xfrm>
-                <a:off x="5999025" y="1772239"/>
-                <a:ext cx="516193" cy="615876"/>
-              </a:xfrm>
-              <a:prstGeom prst="rect">
-                <a:avLst/>
-              </a:prstGeom>
-              <a:noFill/>
-            </p:spPr>
-            <p:txBody>
-              <a:bodyPr wrap="square" rtlCol="0">
-                <a:spAutoFit/>
-              </a:bodyPr>
-              <a:lstStyle/>
-              <a:p>
-                <a:pPr algn="ctr"/>
-                <a:r>
-                  <a:rPr lang="en-IN" sz="3200" b="1" dirty="0">
-                    <a:solidFill>
-                      <a:srgbClr val="FF0000"/>
-                    </a:solidFill>
-                    <a:latin typeface="Arial" panose="020B0604020202020204" pitchFamily="34" charset="0"/>
-                    <a:cs typeface="Arial" panose="020B0604020202020204" pitchFamily="34" charset="0"/>
-                  </a:rPr>
-                  <a:t>V</a:t>
-                </a:r>
-              </a:p>
-            </p:txBody>
-          </p:sp>
-          <p:sp>
-            <p:nvSpPr>
-              <p:cNvPr id="108" name="Rectangle 107">
-                <a:extLst>
-                  <a:ext uri="{FF2B5EF4-FFF2-40B4-BE49-F238E27FC236}">
-                    <a16:creationId xmlns:a16="http://schemas.microsoft.com/office/drawing/2014/main" id="{744C6EE4-6822-2A43-C311-4425F012A53E}"/>
-                  </a:ext>
-                </a:extLst>
-              </p:cNvPr>
-              <p:cNvSpPr/>
-              <p:nvPr/>
-            </p:nvSpPr>
-            <p:spPr>
-              <a:xfrm>
-                <a:off x="6096000" y="2357014"/>
-                <a:ext cx="325797" cy="71501"/>
-              </a:xfrm>
-              <a:prstGeom prst="rect">
-                <a:avLst/>
-              </a:prstGeom>
-              <a:solidFill>
-                <a:srgbClr val="FF0000"/>
-              </a:solidFill>
-              <a:ln>
-                <a:noFill/>
-              </a:ln>
-            </p:spPr>
-            <p:style>
-              <a:lnRef idx="2">
-                <a:schemeClr val="accent1">
-                  <a:shade val="50000"/>
-                </a:schemeClr>
-              </a:lnRef>
-              <a:fillRef idx="1">
-                <a:schemeClr val="accent1"/>
-              </a:fillRef>
-              <a:effectRef idx="0">
-                <a:schemeClr val="accent1"/>
-              </a:effectRef>
-              <a:fontRef idx="minor">
-                <a:schemeClr val="lt1"/>
-              </a:fontRef>
-            </p:style>
-            <p:txBody>
-              <a:bodyPr rtlCol="0" anchor="ctr"/>
-              <a:lstStyle/>
-              <a:p>
-                <a:pPr algn="ctr"/>
-                <a:endParaRPr lang="en-IN"/>
-              </a:p>
-            </p:txBody>
-          </p:sp>
-        </p:grpSp>
-        <p:grpSp>
-          <p:nvGrpSpPr>
-            <p:cNvPr id="128" name="Group 127">
-              <a:extLst>
-                <a:ext uri="{FF2B5EF4-FFF2-40B4-BE49-F238E27FC236}">
-                  <a16:creationId xmlns:a16="http://schemas.microsoft.com/office/drawing/2014/main" id="{01A33D35-B4D0-1B01-2765-006A5D6A1118}"/>
-                </a:ext>
-              </a:extLst>
-            </p:cNvPr>
-            <p:cNvGrpSpPr/>
-            <p:nvPr/>
-          </p:nvGrpSpPr>
-          <p:grpSpPr>
-            <a:xfrm>
-              <a:off x="8915002" y="1851466"/>
-              <a:ext cx="247026" cy="260732"/>
-              <a:chOff x="5941524" y="3192658"/>
-              <a:chExt cx="325797" cy="325797"/>
-            </a:xfrm>
-            <a:solidFill>
-              <a:srgbClr val="FF0000"/>
-            </a:solidFill>
-          </p:grpSpPr>
-          <p:sp>
-            <p:nvSpPr>
-              <p:cNvPr id="129" name="Rectangle 128">
-                <a:extLst>
-                  <a:ext uri="{FF2B5EF4-FFF2-40B4-BE49-F238E27FC236}">
-                    <a16:creationId xmlns:a16="http://schemas.microsoft.com/office/drawing/2014/main" id="{6A5AE874-58C6-1FD6-0C0D-B73170FF3EF1}"/>
-                  </a:ext>
-                </a:extLst>
-              </p:cNvPr>
-              <p:cNvSpPr/>
-              <p:nvPr/>
-            </p:nvSpPr>
-            <p:spPr>
-              <a:xfrm rot="5400000">
-                <a:off x="5941525" y="3319806"/>
-                <a:ext cx="325797" cy="71501"/>
-              </a:xfrm>
-              <a:prstGeom prst="rect">
-                <a:avLst/>
-              </a:prstGeom>
-              <a:grpFill/>
-              <a:ln>
-                <a:noFill/>
-              </a:ln>
-            </p:spPr>
-            <p:style>
-              <a:lnRef idx="2">
-                <a:schemeClr val="accent1">
-                  <a:shade val="50000"/>
-                </a:schemeClr>
-              </a:lnRef>
-              <a:fillRef idx="1">
-                <a:schemeClr val="accent1"/>
-              </a:fillRef>
-              <a:effectRef idx="0">
-                <a:schemeClr val="accent1"/>
-              </a:effectRef>
-              <a:fontRef idx="minor">
-                <a:schemeClr val="lt1"/>
-              </a:fontRef>
-            </p:style>
-            <p:txBody>
-              <a:bodyPr rtlCol="0" anchor="ctr"/>
-              <a:lstStyle/>
-              <a:p>
-                <a:pPr algn="ctr"/>
-                <a:endParaRPr lang="en-IN"/>
-              </a:p>
-            </p:txBody>
-          </p:sp>
-          <p:sp>
-            <p:nvSpPr>
-              <p:cNvPr id="130" name="Rectangle 129">
-                <a:extLst>
-                  <a:ext uri="{FF2B5EF4-FFF2-40B4-BE49-F238E27FC236}">
-                    <a16:creationId xmlns:a16="http://schemas.microsoft.com/office/drawing/2014/main" id="{844E17A6-0AFA-45CB-B6C3-80F31020DC12}"/>
-                  </a:ext>
-                </a:extLst>
-              </p:cNvPr>
-              <p:cNvSpPr/>
-              <p:nvPr/>
-            </p:nvSpPr>
-            <p:spPr>
-              <a:xfrm>
-                <a:off x="5941524" y="3319805"/>
-                <a:ext cx="325797" cy="71501"/>
-              </a:xfrm>
-              <a:prstGeom prst="rect">
-                <a:avLst/>
-              </a:prstGeom>
-              <a:grpFill/>
-              <a:ln>
-                <a:noFill/>
-              </a:ln>
-            </p:spPr>
-            <p:style>
-              <a:lnRef idx="2">
-                <a:schemeClr val="accent1">
-                  <a:shade val="50000"/>
-                </a:schemeClr>
-              </a:lnRef>
-              <a:fillRef idx="1">
-                <a:schemeClr val="accent1"/>
-              </a:fillRef>
-              <a:effectRef idx="0">
-                <a:schemeClr val="accent1"/>
-              </a:effectRef>
-              <a:fontRef idx="minor">
-                <a:schemeClr val="lt1"/>
-              </a:fontRef>
-            </p:style>
-            <p:txBody>
-              <a:bodyPr rtlCol="0" anchor="ctr"/>
-              <a:lstStyle/>
-              <a:p>
-                <a:pPr algn="ctr"/>
-                <a:endParaRPr lang="en-IN"/>
-              </a:p>
-            </p:txBody>
-          </p:sp>
-        </p:grpSp>
-        <p:sp>
-          <p:nvSpPr>
-            <p:cNvPr id="131" name="Rectangle 130">
-              <a:extLst>
-                <a:ext uri="{FF2B5EF4-FFF2-40B4-BE49-F238E27FC236}">
-                  <a16:creationId xmlns:a16="http://schemas.microsoft.com/office/drawing/2014/main" id="{A1EABB28-AE35-9FA6-8752-C666795F70FE}"/>
-                </a:ext>
-              </a:extLst>
-            </p:cNvPr>
-            <p:cNvSpPr/>
-            <p:nvPr/>
-          </p:nvSpPr>
-          <p:spPr>
-            <a:xfrm>
-              <a:off x="8831819" y="3232901"/>
-              <a:ext cx="247026" cy="57222"/>
-            </a:xfrm>
-            <a:prstGeom prst="rect">
-              <a:avLst/>
-            </a:prstGeom>
-            <a:solidFill>
-              <a:srgbClr val="FF0000"/>
-            </a:solidFill>
-            <a:ln>
-              <a:noFill/>
-            </a:ln>
-          </p:spPr>
-          <p:style>
-            <a:lnRef idx="2">
-              <a:schemeClr val="accent1">
-                <a:shade val="50000"/>
-              </a:schemeClr>
-            </a:lnRef>
-            <a:fillRef idx="1">
-              <a:schemeClr val="accent1"/>
-            </a:fillRef>
-            <a:effectRef idx="0">
-              <a:schemeClr val="accent1"/>
-            </a:effectRef>
-            <a:fontRef idx="minor">
-              <a:schemeClr val="lt1"/>
-            </a:fontRef>
-          </p:style>
-          <p:txBody>
-            <a:bodyPr rtlCol="0" anchor="ctr"/>
-            <a:lstStyle/>
-            <a:p>
-              <a:pPr algn="ctr"/>
-              <a:endParaRPr lang="en-IN"/>
             </a:p>
           </p:txBody>
         </p:sp>
@@ -7542,86 +6134,6 @@
           </p:style>
         </p:cxnSp>
       </p:grpSp>
-      <p:sp>
-        <p:nvSpPr>
-          <p:cNvPr id="257" name="TextBox 256">
-            <a:extLst>
-              <a:ext uri="{FF2B5EF4-FFF2-40B4-BE49-F238E27FC236}">
-                <a16:creationId xmlns:a16="http://schemas.microsoft.com/office/drawing/2014/main" id="{7206AC1D-7534-79A5-6D9C-2DD9FED7AFCB}"/>
-              </a:ext>
-            </a:extLst>
-          </p:cNvPr>
-          <p:cNvSpPr txBox="1"/>
-          <p:nvPr/>
-        </p:nvSpPr>
-        <p:spPr>
-          <a:xfrm>
-            <a:off x="7471466" y="2723408"/>
-            <a:ext cx="338766" cy="307777"/>
-          </a:xfrm>
-          <a:prstGeom prst="rect">
-            <a:avLst/>
-          </a:prstGeom>
-          <a:noFill/>
-        </p:spPr>
-        <p:txBody>
-          <a:bodyPr wrap="square" rtlCol="0">
-            <a:spAutoFit/>
-          </a:bodyPr>
-          <a:lstStyle/>
-          <a:p>
-            <a:pPr algn="ctr"/>
-            <a:r>
-              <a:rPr lang="en-IN" sz="1400" b="1" dirty="0">
-                <a:solidFill>
-                  <a:srgbClr val="FF0000"/>
-                </a:solidFill>
-              </a:rPr>
-              <a:t>A</a:t>
-            </a:r>
-          </a:p>
-        </p:txBody>
-      </p:sp>
-      <p:sp>
-        <p:nvSpPr>
-          <p:cNvPr id="264" name="TextBox 263">
-            <a:extLst>
-              <a:ext uri="{FF2B5EF4-FFF2-40B4-BE49-F238E27FC236}">
-                <a16:creationId xmlns:a16="http://schemas.microsoft.com/office/drawing/2014/main" id="{67023588-4053-9C02-E007-CC37F2F5AE92}"/>
-              </a:ext>
-            </a:extLst>
-          </p:cNvPr>
-          <p:cNvSpPr txBox="1"/>
-          <p:nvPr/>
-        </p:nvSpPr>
-        <p:spPr>
-          <a:xfrm>
-            <a:off x="7470996" y="1806773"/>
-            <a:ext cx="338766" cy="307777"/>
-          </a:xfrm>
-          <a:prstGeom prst="rect">
-            <a:avLst/>
-          </a:prstGeom>
-          <a:noFill/>
-        </p:spPr>
-        <p:txBody>
-          <a:bodyPr wrap="square" rtlCol="0">
-            <a:spAutoFit/>
-          </a:bodyPr>
-          <a:lstStyle/>
-          <a:p>
-            <a:pPr algn="ctr"/>
-            <a:r>
-              <a:rPr lang="en-IN" sz="1400" b="1" dirty="0">
-                <a:solidFill>
-                  <a:srgbClr val="FF0000"/>
-                </a:solidFill>
-              </a:rPr>
-              <a:t>K</a:t>
-            </a:r>
-          </a:p>
-        </p:txBody>
-      </p:sp>
       <p:cxnSp>
         <p:nvCxnSpPr>
           <p:cNvPr id="8" name="Straight Connector 7">
@@ -7824,7 +6336,7 @@
         </p:nvCxnSpPr>
         <p:spPr>
           <a:xfrm>
-            <a:off x="4645620" y="185057"/>
+            <a:off x="4645620" y="182570"/>
             <a:ext cx="0" cy="1224480"/>
           </a:xfrm>
           <a:prstGeom prst="line">
@@ -8324,6 +6836,2561 @@
           </a:fontRef>
         </p:style>
       </p:cxnSp>
+      <p:grpSp>
+        <p:nvGrpSpPr>
+          <p:cNvPr id="2" name="Group 1">
+            <a:extLst>
+              <a:ext uri="{FF2B5EF4-FFF2-40B4-BE49-F238E27FC236}">
+                <a16:creationId xmlns:a16="http://schemas.microsoft.com/office/drawing/2014/main" id="{7CC04C98-00D7-14FE-1956-FA048898A941}"/>
+              </a:ext>
+            </a:extLst>
+          </p:cNvPr>
+          <p:cNvGrpSpPr/>
+          <p:nvPr/>
+        </p:nvGrpSpPr>
+        <p:grpSpPr>
+          <a:xfrm>
+            <a:off x="9536106" y="6010750"/>
+            <a:ext cx="826342" cy="817219"/>
+            <a:chOff x="8949211" y="1995535"/>
+            <a:chExt cx="826342" cy="817219"/>
+          </a:xfrm>
+        </p:grpSpPr>
+        <p:sp>
+          <p:nvSpPr>
+            <p:cNvPr id="106" name="Oval 105">
+              <a:extLst>
+                <a:ext uri="{FF2B5EF4-FFF2-40B4-BE49-F238E27FC236}">
+                  <a16:creationId xmlns:a16="http://schemas.microsoft.com/office/drawing/2014/main" id="{B42B74C3-F423-B0F1-DA21-A4C769B07ED2}"/>
+                </a:ext>
+              </a:extLst>
+            </p:cNvPr>
+            <p:cNvSpPr/>
+            <p:nvPr/>
+          </p:nvSpPr>
+          <p:spPr>
+            <a:xfrm>
+              <a:off x="8949211" y="1995535"/>
+              <a:ext cx="826342" cy="817219"/>
+            </a:xfrm>
+            <a:prstGeom prst="ellipse">
+              <a:avLst/>
+            </a:prstGeom>
+            <a:solidFill>
+              <a:schemeClr val="bg1">
+                <a:lumMod val="95000"/>
+              </a:schemeClr>
+            </a:solidFill>
+            <a:ln w="38100"/>
+          </p:spPr>
+          <p:style>
+            <a:lnRef idx="2">
+              <a:schemeClr val="accent1">
+                <a:shade val="50000"/>
+              </a:schemeClr>
+            </a:lnRef>
+            <a:fillRef idx="1">
+              <a:schemeClr val="accent1"/>
+            </a:fillRef>
+            <a:effectRef idx="0">
+              <a:schemeClr val="accent1"/>
+            </a:effectRef>
+            <a:fontRef idx="minor">
+              <a:schemeClr val="lt1"/>
+            </a:fontRef>
+          </p:style>
+          <p:txBody>
+            <a:bodyPr rtlCol="0" anchor="ctr"/>
+            <a:lstStyle/>
+            <a:p>
+              <a:pPr algn="ctr"/>
+              <a:endParaRPr lang="en-IN" sz="4000" dirty="0">
+                <a:solidFill>
+                  <a:srgbClr val="FF0000"/>
+                </a:solidFill>
+              </a:endParaRPr>
+            </a:p>
+          </p:txBody>
+        </p:sp>
+        <p:sp>
+          <p:nvSpPr>
+            <p:cNvPr id="107" name="TextBox 106">
+              <a:extLst>
+                <a:ext uri="{FF2B5EF4-FFF2-40B4-BE49-F238E27FC236}">
+                  <a16:creationId xmlns:a16="http://schemas.microsoft.com/office/drawing/2014/main" id="{6C5F568E-1886-03DF-1AA8-37A3536F3794}"/>
+                </a:ext>
+              </a:extLst>
+            </p:cNvPr>
+            <p:cNvSpPr txBox="1"/>
+            <p:nvPr/>
+          </p:nvSpPr>
+          <p:spPr>
+            <a:xfrm>
+              <a:off x="9157723" y="2065951"/>
+              <a:ext cx="409316" cy="584775"/>
+            </a:xfrm>
+            <a:prstGeom prst="rect">
+              <a:avLst/>
+            </a:prstGeom>
+            <a:noFill/>
+          </p:spPr>
+          <p:txBody>
+            <a:bodyPr wrap="square" rtlCol="0">
+              <a:spAutoFit/>
+            </a:bodyPr>
+            <a:lstStyle/>
+            <a:p>
+              <a:pPr algn="ctr"/>
+              <a:r>
+                <a:rPr lang="en-IN" sz="3200" b="1" dirty="0">
+                  <a:solidFill>
+                    <a:srgbClr val="FF0000"/>
+                  </a:solidFill>
+                  <a:latin typeface="Arial" panose="020B0604020202020204" pitchFamily="34" charset="0"/>
+                  <a:cs typeface="Arial" panose="020B0604020202020204" pitchFamily="34" charset="0"/>
+                </a:rPr>
+                <a:t>V</a:t>
+              </a:r>
+            </a:p>
+          </p:txBody>
+        </p:sp>
+        <p:grpSp>
+          <p:nvGrpSpPr>
+            <p:cNvPr id="3" name="Group 2">
+              <a:extLst>
+                <a:ext uri="{FF2B5EF4-FFF2-40B4-BE49-F238E27FC236}">
+                  <a16:creationId xmlns:a16="http://schemas.microsoft.com/office/drawing/2014/main" id="{03AB76EC-EA80-8C19-02C4-8D8A1E4EC896}"/>
+                </a:ext>
+              </a:extLst>
+            </p:cNvPr>
+            <p:cNvGrpSpPr/>
+            <p:nvPr/>
+          </p:nvGrpSpPr>
+          <p:grpSpPr>
+            <a:xfrm rot="4449706" flipV="1">
+              <a:off x="9284656" y="2474965"/>
+              <a:ext cx="131685" cy="304028"/>
+              <a:chOff x="3898812" y="2986773"/>
+              <a:chExt cx="232509" cy="554879"/>
+            </a:xfrm>
+          </p:grpSpPr>
+          <p:sp>
+            <p:nvSpPr>
+              <p:cNvPr id="5" name="Arc 4">
+                <a:extLst>
+                  <a:ext uri="{FF2B5EF4-FFF2-40B4-BE49-F238E27FC236}">
+                    <a16:creationId xmlns:a16="http://schemas.microsoft.com/office/drawing/2014/main" id="{DC492F46-0EA8-42F6-CFD6-BB95DA802EB5}"/>
+                  </a:ext>
+                </a:extLst>
+              </p:cNvPr>
+              <p:cNvSpPr/>
+              <p:nvPr/>
+            </p:nvSpPr>
+            <p:spPr>
+              <a:xfrm rot="16200000">
+                <a:off x="3877316" y="3010463"/>
+                <a:ext cx="277695" cy="230315"/>
+              </a:xfrm>
+              <a:prstGeom prst="arc">
+                <a:avLst>
+                  <a:gd name="adj1" fmla="val 10739696"/>
+                  <a:gd name="adj2" fmla="val 0"/>
+                </a:avLst>
+              </a:prstGeom>
+              <a:ln w="38100">
+                <a:solidFill>
+                  <a:srgbClr val="FF0000"/>
+                </a:solidFill>
+              </a:ln>
+            </p:spPr>
+            <p:style>
+              <a:lnRef idx="1">
+                <a:schemeClr val="dk1"/>
+              </a:lnRef>
+              <a:fillRef idx="0">
+                <a:schemeClr val="dk1"/>
+              </a:fillRef>
+              <a:effectRef idx="0">
+                <a:schemeClr val="dk1"/>
+              </a:effectRef>
+              <a:fontRef idx="minor">
+                <a:schemeClr val="tx1"/>
+              </a:fontRef>
+            </p:style>
+            <p:txBody>
+              <a:bodyPr rtlCol="0" anchor="ctr"/>
+              <a:lstStyle/>
+              <a:p>
+                <a:pPr algn="ctr"/>
+                <a:endParaRPr lang="en-IN"/>
+              </a:p>
+            </p:txBody>
+          </p:sp>
+          <p:sp>
+            <p:nvSpPr>
+              <p:cNvPr id="6" name="Arc 5">
+                <a:extLst>
+                  <a:ext uri="{FF2B5EF4-FFF2-40B4-BE49-F238E27FC236}">
+                    <a16:creationId xmlns:a16="http://schemas.microsoft.com/office/drawing/2014/main" id="{7263D755-EF93-5274-EC86-F603FA2F1A8F}"/>
+                  </a:ext>
+                </a:extLst>
+              </p:cNvPr>
+              <p:cNvSpPr/>
+              <p:nvPr/>
+            </p:nvSpPr>
+            <p:spPr>
+              <a:xfrm rot="5400000" flipH="1">
+                <a:off x="3875122" y="3287647"/>
+                <a:ext cx="277695" cy="230315"/>
+              </a:xfrm>
+              <a:prstGeom prst="arc">
+                <a:avLst>
+                  <a:gd name="adj1" fmla="val 10739696"/>
+                  <a:gd name="adj2" fmla="val 0"/>
+                </a:avLst>
+              </a:prstGeom>
+              <a:ln w="38100">
+                <a:solidFill>
+                  <a:srgbClr val="FF0000"/>
+                </a:solidFill>
+              </a:ln>
+            </p:spPr>
+            <p:style>
+              <a:lnRef idx="1">
+                <a:schemeClr val="dk1"/>
+              </a:lnRef>
+              <a:fillRef idx="0">
+                <a:schemeClr val="dk1"/>
+              </a:fillRef>
+              <a:effectRef idx="0">
+                <a:schemeClr val="dk1"/>
+              </a:effectRef>
+              <a:fontRef idx="minor">
+                <a:schemeClr val="tx1"/>
+              </a:fontRef>
+            </p:style>
+            <p:txBody>
+              <a:bodyPr rtlCol="0" anchor="ctr"/>
+              <a:lstStyle/>
+              <a:p>
+                <a:pPr algn="ctr"/>
+                <a:endParaRPr lang="en-IN"/>
+              </a:p>
+            </p:txBody>
+          </p:sp>
+        </p:grpSp>
+      </p:grpSp>
+      <p:sp>
+        <p:nvSpPr>
+          <p:cNvPr id="17" name="Oval 16">
+            <a:extLst>
+              <a:ext uri="{FF2B5EF4-FFF2-40B4-BE49-F238E27FC236}">
+                <a16:creationId xmlns:a16="http://schemas.microsoft.com/office/drawing/2014/main" id="{DBC6F374-CD07-9C96-4DAD-BB1815FE4356}"/>
+              </a:ext>
+            </a:extLst>
+          </p:cNvPr>
+          <p:cNvSpPr/>
+          <p:nvPr/>
+        </p:nvSpPr>
+        <p:spPr>
+          <a:xfrm>
+            <a:off x="6003464" y="2164966"/>
+            <a:ext cx="849470" cy="806000"/>
+          </a:xfrm>
+          <a:prstGeom prst="ellipse">
+            <a:avLst/>
+          </a:prstGeom>
+          <a:solidFill>
+            <a:schemeClr val="bg1">
+              <a:lumMod val="95000"/>
+            </a:schemeClr>
+          </a:solidFill>
+          <a:ln w="38100"/>
+        </p:spPr>
+        <p:style>
+          <a:lnRef idx="2">
+            <a:schemeClr val="accent1">
+              <a:shade val="50000"/>
+            </a:schemeClr>
+          </a:lnRef>
+          <a:fillRef idx="1">
+            <a:schemeClr val="accent1"/>
+          </a:fillRef>
+          <a:effectRef idx="0">
+            <a:schemeClr val="accent1"/>
+          </a:effectRef>
+          <a:fontRef idx="minor">
+            <a:schemeClr val="lt1"/>
+          </a:fontRef>
+        </p:style>
+        <p:txBody>
+          <a:bodyPr rtlCol="0" anchor="ctr"/>
+          <a:lstStyle/>
+          <a:p>
+            <a:pPr algn="ctr"/>
+            <a:endParaRPr lang="en-IN" sz="4000" dirty="0">
+              <a:solidFill>
+                <a:srgbClr val="FF0000"/>
+              </a:solidFill>
+            </a:endParaRPr>
+          </a:p>
+        </p:txBody>
+      </p:sp>
+      <p:sp>
+        <p:nvSpPr>
+          <p:cNvPr id="18" name="TextBox 17">
+            <a:extLst>
+              <a:ext uri="{FF2B5EF4-FFF2-40B4-BE49-F238E27FC236}">
+                <a16:creationId xmlns:a16="http://schemas.microsoft.com/office/drawing/2014/main" id="{9103FC6C-0A35-A4EF-D5B7-E5F9BEDC2779}"/>
+              </a:ext>
+            </a:extLst>
+          </p:cNvPr>
+          <p:cNvSpPr txBox="1"/>
+          <p:nvPr/>
+        </p:nvSpPr>
+        <p:spPr>
+          <a:xfrm>
+            <a:off x="6217812" y="2234416"/>
+            <a:ext cx="420773" cy="584775"/>
+          </a:xfrm>
+          <a:prstGeom prst="rect">
+            <a:avLst/>
+          </a:prstGeom>
+          <a:noFill/>
+        </p:spPr>
+        <p:txBody>
+          <a:bodyPr wrap="square" rtlCol="0">
+            <a:spAutoFit/>
+          </a:bodyPr>
+          <a:lstStyle/>
+          <a:p>
+            <a:pPr algn="ctr"/>
+            <a:r>
+              <a:rPr lang="en-US" sz="3200" b="1" dirty="0">
+                <a:solidFill>
+                  <a:srgbClr val="FF0000"/>
+                </a:solidFill>
+                <a:latin typeface="Arial" panose="020B0604020202020204" pitchFamily="34" charset="0"/>
+                <a:cs typeface="Arial" panose="020B0604020202020204" pitchFamily="34" charset="0"/>
+              </a:rPr>
+              <a:t>V</a:t>
+            </a:r>
+            <a:endParaRPr lang="en-IN" sz="3200" b="1" dirty="0">
+              <a:solidFill>
+                <a:srgbClr val="FF0000"/>
+              </a:solidFill>
+              <a:latin typeface="Arial" panose="020B0604020202020204" pitchFamily="34" charset="0"/>
+              <a:cs typeface="Arial" panose="020B0604020202020204" pitchFamily="34" charset="0"/>
+            </a:endParaRPr>
+          </a:p>
+        </p:txBody>
+      </p:sp>
+      <p:grpSp>
+        <p:nvGrpSpPr>
+          <p:cNvPr id="13" name="Group 12">
+            <a:extLst>
+              <a:ext uri="{FF2B5EF4-FFF2-40B4-BE49-F238E27FC236}">
+                <a16:creationId xmlns:a16="http://schemas.microsoft.com/office/drawing/2014/main" id="{EDEEE604-ADEE-04E7-FB62-8CA7670A0D00}"/>
+              </a:ext>
+            </a:extLst>
+          </p:cNvPr>
+          <p:cNvGrpSpPr/>
+          <p:nvPr/>
+        </p:nvGrpSpPr>
+        <p:grpSpPr>
+          <a:xfrm rot="4449706" flipV="1">
+            <a:off x="7243653" y="5538954"/>
+            <a:ext cx="131685" cy="304028"/>
+            <a:chOff x="3898812" y="2986773"/>
+            <a:chExt cx="232509" cy="554879"/>
+          </a:xfrm>
+        </p:grpSpPr>
+        <p:sp>
+          <p:nvSpPr>
+            <p:cNvPr id="21" name="Arc 20">
+              <a:extLst>
+                <a:ext uri="{FF2B5EF4-FFF2-40B4-BE49-F238E27FC236}">
+                  <a16:creationId xmlns:a16="http://schemas.microsoft.com/office/drawing/2014/main" id="{42AF7C96-57A8-92C2-A6D8-F3F8B5505579}"/>
+                </a:ext>
+              </a:extLst>
+            </p:cNvPr>
+            <p:cNvSpPr/>
+            <p:nvPr/>
+          </p:nvSpPr>
+          <p:spPr>
+            <a:xfrm rot="16200000">
+              <a:off x="3877316" y="3010463"/>
+              <a:ext cx="277695" cy="230315"/>
+            </a:xfrm>
+            <a:prstGeom prst="arc">
+              <a:avLst>
+                <a:gd name="adj1" fmla="val 10739696"/>
+                <a:gd name="adj2" fmla="val 0"/>
+              </a:avLst>
+            </a:prstGeom>
+            <a:ln w="38100">
+              <a:solidFill>
+                <a:srgbClr val="FF0000"/>
+              </a:solidFill>
+            </a:ln>
+          </p:spPr>
+          <p:style>
+            <a:lnRef idx="1">
+              <a:schemeClr val="dk1"/>
+            </a:lnRef>
+            <a:fillRef idx="0">
+              <a:schemeClr val="dk1"/>
+            </a:fillRef>
+            <a:effectRef idx="0">
+              <a:schemeClr val="dk1"/>
+            </a:effectRef>
+            <a:fontRef idx="minor">
+              <a:schemeClr val="tx1"/>
+            </a:fontRef>
+          </p:style>
+          <p:txBody>
+            <a:bodyPr rtlCol="0" anchor="ctr"/>
+            <a:lstStyle/>
+            <a:p>
+              <a:pPr algn="ctr"/>
+              <a:endParaRPr lang="en-IN"/>
+            </a:p>
+          </p:txBody>
+        </p:sp>
+        <p:sp>
+          <p:nvSpPr>
+            <p:cNvPr id="22" name="Arc 21">
+              <a:extLst>
+                <a:ext uri="{FF2B5EF4-FFF2-40B4-BE49-F238E27FC236}">
+                  <a16:creationId xmlns:a16="http://schemas.microsoft.com/office/drawing/2014/main" id="{59E56584-F05D-C45A-43CC-440694F8D7B0}"/>
+                </a:ext>
+              </a:extLst>
+            </p:cNvPr>
+            <p:cNvSpPr/>
+            <p:nvPr/>
+          </p:nvSpPr>
+          <p:spPr>
+            <a:xfrm rot="5400000" flipH="1">
+              <a:off x="3875122" y="3287647"/>
+              <a:ext cx="277695" cy="230315"/>
+            </a:xfrm>
+            <a:prstGeom prst="arc">
+              <a:avLst>
+                <a:gd name="adj1" fmla="val 10739696"/>
+                <a:gd name="adj2" fmla="val 0"/>
+              </a:avLst>
+            </a:prstGeom>
+            <a:ln w="38100">
+              <a:solidFill>
+                <a:srgbClr val="FF0000"/>
+              </a:solidFill>
+            </a:ln>
+          </p:spPr>
+          <p:style>
+            <a:lnRef idx="1">
+              <a:schemeClr val="dk1"/>
+            </a:lnRef>
+            <a:fillRef idx="0">
+              <a:schemeClr val="dk1"/>
+            </a:fillRef>
+            <a:effectRef idx="0">
+              <a:schemeClr val="dk1"/>
+            </a:effectRef>
+            <a:fontRef idx="minor">
+              <a:schemeClr val="tx1"/>
+            </a:fontRef>
+          </p:style>
+          <p:txBody>
+            <a:bodyPr rtlCol="0" anchor="ctr"/>
+            <a:lstStyle/>
+            <a:p>
+              <a:pPr algn="ctr"/>
+              <a:endParaRPr lang="en-IN"/>
+            </a:p>
+          </p:txBody>
+        </p:sp>
+      </p:grpSp>
+      <p:cxnSp>
+        <p:nvCxnSpPr>
+          <p:cNvPr id="42" name="Straight Connector 41">
+            <a:extLst>
+              <a:ext uri="{FF2B5EF4-FFF2-40B4-BE49-F238E27FC236}">
+                <a16:creationId xmlns:a16="http://schemas.microsoft.com/office/drawing/2014/main" id="{DA2EE021-FACE-F923-5CC0-D78ECBFFA679}"/>
+              </a:ext>
+            </a:extLst>
+          </p:cNvPr>
+          <p:cNvCxnSpPr>
+            <a:cxnSpLocks/>
+          </p:cNvCxnSpPr>
+          <p:nvPr/>
+        </p:nvCxnSpPr>
+        <p:spPr>
+          <a:xfrm flipH="1">
+            <a:off x="11045332" y="5721482"/>
+            <a:ext cx="7811" cy="227345"/>
+          </a:xfrm>
+          <a:prstGeom prst="line">
+            <a:avLst/>
+          </a:prstGeom>
+          <a:ln w="57150">
+            <a:solidFill>
+              <a:srgbClr val="0070C0"/>
+            </a:solidFill>
+          </a:ln>
+        </p:spPr>
+        <p:style>
+          <a:lnRef idx="1">
+            <a:schemeClr val="accent1"/>
+          </a:lnRef>
+          <a:fillRef idx="0">
+            <a:schemeClr val="accent1"/>
+          </a:fillRef>
+          <a:effectRef idx="0">
+            <a:schemeClr val="accent1"/>
+          </a:effectRef>
+          <a:fontRef idx="minor">
+            <a:schemeClr val="tx1"/>
+          </a:fontRef>
+        </p:style>
+      </p:cxnSp>
+      <p:grpSp>
+        <p:nvGrpSpPr>
+          <p:cNvPr id="45" name="Group 44">
+            <a:extLst>
+              <a:ext uri="{FF2B5EF4-FFF2-40B4-BE49-F238E27FC236}">
+                <a16:creationId xmlns:a16="http://schemas.microsoft.com/office/drawing/2014/main" id="{7D3097BA-DBAA-C1B8-F0F9-6B936068C4ED}"/>
+              </a:ext>
+            </a:extLst>
+          </p:cNvPr>
+          <p:cNvGrpSpPr/>
+          <p:nvPr/>
+        </p:nvGrpSpPr>
+        <p:grpSpPr>
+          <a:xfrm>
+            <a:off x="7857079" y="4874249"/>
+            <a:ext cx="526643" cy="1746023"/>
+            <a:chOff x="6164423" y="1843810"/>
+            <a:chExt cx="526643" cy="1746023"/>
+          </a:xfrm>
+        </p:grpSpPr>
+        <p:grpSp>
+          <p:nvGrpSpPr>
+            <p:cNvPr id="46" name="Group 45">
+              <a:extLst>
+                <a:ext uri="{FF2B5EF4-FFF2-40B4-BE49-F238E27FC236}">
+                  <a16:creationId xmlns:a16="http://schemas.microsoft.com/office/drawing/2014/main" id="{36C20C7A-8541-3729-2A77-D5AA5C7AB056}"/>
+                </a:ext>
+              </a:extLst>
+            </p:cNvPr>
+            <p:cNvGrpSpPr/>
+            <p:nvPr/>
+          </p:nvGrpSpPr>
+          <p:grpSpPr>
+            <a:xfrm>
+              <a:off x="6164423" y="1843810"/>
+              <a:ext cx="376458" cy="802297"/>
+              <a:chOff x="6164364" y="1541879"/>
+              <a:chExt cx="376458" cy="802297"/>
+            </a:xfrm>
+          </p:grpSpPr>
+          <p:cxnSp>
+            <p:nvCxnSpPr>
+              <p:cNvPr id="62" name="Straight Connector 61">
+                <a:extLst>
+                  <a:ext uri="{FF2B5EF4-FFF2-40B4-BE49-F238E27FC236}">
+                    <a16:creationId xmlns:a16="http://schemas.microsoft.com/office/drawing/2014/main" id="{9ADFFD96-DF2B-1B7E-A4D8-DE75C46A26A2}"/>
+                  </a:ext>
+                </a:extLst>
+              </p:cNvPr>
+              <p:cNvCxnSpPr>
+                <a:cxnSpLocks/>
+              </p:cNvCxnSpPr>
+              <p:nvPr/>
+            </p:nvCxnSpPr>
+            <p:spPr>
+              <a:xfrm flipH="1" flipV="1">
+                <a:off x="6164364" y="2235537"/>
+                <a:ext cx="299871" cy="108639"/>
+              </a:xfrm>
+              <a:prstGeom prst="line">
+                <a:avLst/>
+              </a:prstGeom>
+              <a:ln w="57150">
+                <a:solidFill>
+                  <a:srgbClr val="0070C0"/>
+                </a:solidFill>
+              </a:ln>
+            </p:spPr>
+            <p:style>
+              <a:lnRef idx="1">
+                <a:schemeClr val="accent1"/>
+              </a:lnRef>
+              <a:fillRef idx="0">
+                <a:schemeClr val="accent1"/>
+              </a:fillRef>
+              <a:effectRef idx="0">
+                <a:schemeClr val="accent1"/>
+              </a:effectRef>
+              <a:fontRef idx="minor">
+                <a:schemeClr val="tx1"/>
+              </a:fontRef>
+            </p:style>
+          </p:cxnSp>
+          <p:cxnSp>
+            <p:nvCxnSpPr>
+              <p:cNvPr id="64" name="Straight Connector 63">
+                <a:extLst>
+                  <a:ext uri="{FF2B5EF4-FFF2-40B4-BE49-F238E27FC236}">
+                    <a16:creationId xmlns:a16="http://schemas.microsoft.com/office/drawing/2014/main" id="{66375E62-088D-0006-7901-DAA54DE61177}"/>
+                  </a:ext>
+                </a:extLst>
+              </p:cNvPr>
+              <p:cNvCxnSpPr>
+                <a:cxnSpLocks/>
+              </p:cNvCxnSpPr>
+              <p:nvPr/>
+            </p:nvCxnSpPr>
+            <p:spPr>
+              <a:xfrm rot="16200000" flipH="1" flipV="1">
+                <a:off x="6297519" y="2015686"/>
+                <a:ext cx="103981" cy="367801"/>
+              </a:xfrm>
+              <a:prstGeom prst="line">
+                <a:avLst/>
+              </a:prstGeom>
+              <a:ln w="57150">
+                <a:solidFill>
+                  <a:srgbClr val="0070C0"/>
+                </a:solidFill>
+              </a:ln>
+            </p:spPr>
+            <p:style>
+              <a:lnRef idx="1">
+                <a:schemeClr val="accent1"/>
+              </a:lnRef>
+              <a:fillRef idx="0">
+                <a:schemeClr val="accent1"/>
+              </a:fillRef>
+              <a:effectRef idx="0">
+                <a:schemeClr val="accent1"/>
+              </a:effectRef>
+              <a:fontRef idx="minor">
+                <a:schemeClr val="tx1"/>
+              </a:fontRef>
+            </p:style>
+          </p:cxnSp>
+          <p:cxnSp>
+            <p:nvCxnSpPr>
+              <p:cNvPr id="73" name="Straight Connector 72">
+                <a:extLst>
+                  <a:ext uri="{FF2B5EF4-FFF2-40B4-BE49-F238E27FC236}">
+                    <a16:creationId xmlns:a16="http://schemas.microsoft.com/office/drawing/2014/main" id="{169F7A37-E7A6-248D-BB71-D40C6BEC8DC7}"/>
+                  </a:ext>
+                </a:extLst>
+              </p:cNvPr>
+              <p:cNvCxnSpPr>
+                <a:cxnSpLocks/>
+              </p:cNvCxnSpPr>
+              <p:nvPr/>
+            </p:nvCxnSpPr>
+            <p:spPr>
+              <a:xfrm rot="16200000" flipV="1">
+                <a:off x="6296496" y="1910937"/>
+                <a:ext cx="103981" cy="367801"/>
+              </a:xfrm>
+              <a:prstGeom prst="line">
+                <a:avLst/>
+              </a:prstGeom>
+              <a:ln w="57150">
+                <a:solidFill>
+                  <a:srgbClr val="0070C0"/>
+                </a:solidFill>
+              </a:ln>
+            </p:spPr>
+            <p:style>
+              <a:lnRef idx="1">
+                <a:schemeClr val="accent1"/>
+              </a:lnRef>
+              <a:fillRef idx="0">
+                <a:schemeClr val="accent1"/>
+              </a:fillRef>
+              <a:effectRef idx="0">
+                <a:schemeClr val="accent1"/>
+              </a:effectRef>
+              <a:fontRef idx="minor">
+                <a:schemeClr val="tx1"/>
+              </a:fontRef>
+            </p:style>
+          </p:cxnSp>
+          <p:cxnSp>
+            <p:nvCxnSpPr>
+              <p:cNvPr id="76" name="Straight Connector 75">
+                <a:extLst>
+                  <a:ext uri="{FF2B5EF4-FFF2-40B4-BE49-F238E27FC236}">
+                    <a16:creationId xmlns:a16="http://schemas.microsoft.com/office/drawing/2014/main" id="{CB36C364-BDEE-F568-672E-17397957EBEF}"/>
+                  </a:ext>
+                </a:extLst>
+              </p:cNvPr>
+              <p:cNvCxnSpPr>
+                <a:cxnSpLocks/>
+              </p:cNvCxnSpPr>
+              <p:nvPr/>
+            </p:nvCxnSpPr>
+            <p:spPr>
+              <a:xfrm rot="16200000" flipH="1" flipV="1">
+                <a:off x="6304931" y="1597976"/>
+                <a:ext cx="103981" cy="367801"/>
+              </a:xfrm>
+              <a:prstGeom prst="line">
+                <a:avLst/>
+              </a:prstGeom>
+              <a:ln w="57150">
+                <a:solidFill>
+                  <a:srgbClr val="0070C0"/>
+                </a:solidFill>
+              </a:ln>
+            </p:spPr>
+            <p:style>
+              <a:lnRef idx="1">
+                <a:schemeClr val="accent1"/>
+              </a:lnRef>
+              <a:fillRef idx="0">
+                <a:schemeClr val="accent1"/>
+              </a:fillRef>
+              <a:effectRef idx="0">
+                <a:schemeClr val="accent1"/>
+              </a:effectRef>
+              <a:fontRef idx="minor">
+                <a:schemeClr val="tx1"/>
+              </a:fontRef>
+            </p:style>
+          </p:cxnSp>
+          <p:cxnSp>
+            <p:nvCxnSpPr>
+              <p:cNvPr id="78" name="Straight Connector 77">
+                <a:extLst>
+                  <a:ext uri="{FF2B5EF4-FFF2-40B4-BE49-F238E27FC236}">
+                    <a16:creationId xmlns:a16="http://schemas.microsoft.com/office/drawing/2014/main" id="{7D8470AC-3AA6-5096-A3F9-6C0E9E737552}"/>
+                  </a:ext>
+                </a:extLst>
+              </p:cNvPr>
+              <p:cNvCxnSpPr>
+                <a:cxnSpLocks/>
+              </p:cNvCxnSpPr>
+              <p:nvPr/>
+            </p:nvCxnSpPr>
+            <p:spPr>
+              <a:xfrm rot="16200000" flipV="1">
+                <a:off x="6304931" y="1493996"/>
+                <a:ext cx="103981" cy="367801"/>
+              </a:xfrm>
+              <a:prstGeom prst="line">
+                <a:avLst/>
+              </a:prstGeom>
+              <a:ln w="57150">
+                <a:solidFill>
+                  <a:srgbClr val="0070C0"/>
+                </a:solidFill>
+              </a:ln>
+            </p:spPr>
+            <p:style>
+              <a:lnRef idx="1">
+                <a:schemeClr val="accent1"/>
+              </a:lnRef>
+              <a:fillRef idx="0">
+                <a:schemeClr val="accent1"/>
+              </a:fillRef>
+              <a:effectRef idx="0">
+                <a:schemeClr val="accent1"/>
+              </a:effectRef>
+              <a:fontRef idx="minor">
+                <a:schemeClr val="tx1"/>
+              </a:fontRef>
+            </p:style>
+          </p:cxnSp>
+          <p:cxnSp>
+            <p:nvCxnSpPr>
+              <p:cNvPr id="80" name="Straight Connector 79">
+                <a:extLst>
+                  <a:ext uri="{FF2B5EF4-FFF2-40B4-BE49-F238E27FC236}">
+                    <a16:creationId xmlns:a16="http://schemas.microsoft.com/office/drawing/2014/main" id="{D21FE356-BE65-58CD-3789-3F66C0E0FBC7}"/>
+                  </a:ext>
+                </a:extLst>
+              </p:cNvPr>
+              <p:cNvCxnSpPr>
+                <a:cxnSpLocks/>
+              </p:cNvCxnSpPr>
+              <p:nvPr/>
+            </p:nvCxnSpPr>
+            <p:spPr>
+              <a:xfrm rot="16200000" flipH="1" flipV="1">
+                <a:off x="6304931" y="1806957"/>
+                <a:ext cx="103981" cy="367801"/>
+              </a:xfrm>
+              <a:prstGeom prst="line">
+                <a:avLst/>
+              </a:prstGeom>
+              <a:ln w="57150">
+                <a:solidFill>
+                  <a:srgbClr val="0070C0"/>
+                </a:solidFill>
+              </a:ln>
+            </p:spPr>
+            <p:style>
+              <a:lnRef idx="1">
+                <a:schemeClr val="accent1"/>
+              </a:lnRef>
+              <a:fillRef idx="0">
+                <a:schemeClr val="accent1"/>
+              </a:fillRef>
+              <a:effectRef idx="0">
+                <a:schemeClr val="accent1"/>
+              </a:effectRef>
+              <a:fontRef idx="minor">
+                <a:schemeClr val="tx1"/>
+              </a:fontRef>
+            </p:style>
+          </p:cxnSp>
+          <p:cxnSp>
+            <p:nvCxnSpPr>
+              <p:cNvPr id="82" name="Straight Connector 81">
+                <a:extLst>
+                  <a:ext uri="{FF2B5EF4-FFF2-40B4-BE49-F238E27FC236}">
+                    <a16:creationId xmlns:a16="http://schemas.microsoft.com/office/drawing/2014/main" id="{CE5791DC-AA00-3067-D86D-EFB67FF5C989}"/>
+                  </a:ext>
+                </a:extLst>
+              </p:cNvPr>
+              <p:cNvCxnSpPr>
+                <a:cxnSpLocks/>
+              </p:cNvCxnSpPr>
+              <p:nvPr/>
+            </p:nvCxnSpPr>
+            <p:spPr>
+              <a:xfrm rot="16200000" flipV="1">
+                <a:off x="6304931" y="1702977"/>
+                <a:ext cx="103981" cy="367801"/>
+              </a:xfrm>
+              <a:prstGeom prst="line">
+                <a:avLst/>
+              </a:prstGeom>
+              <a:ln w="57150">
+                <a:solidFill>
+                  <a:srgbClr val="0070C0"/>
+                </a:solidFill>
+              </a:ln>
+            </p:spPr>
+            <p:style>
+              <a:lnRef idx="1">
+                <a:schemeClr val="accent1"/>
+              </a:lnRef>
+              <a:fillRef idx="0">
+                <a:schemeClr val="accent1"/>
+              </a:fillRef>
+              <a:effectRef idx="0">
+                <a:schemeClr val="accent1"/>
+              </a:effectRef>
+              <a:fontRef idx="minor">
+                <a:schemeClr val="tx1"/>
+              </a:fontRef>
+            </p:style>
+          </p:cxnSp>
+          <p:cxnSp>
+            <p:nvCxnSpPr>
+              <p:cNvPr id="83" name="Straight Connector 82">
+                <a:extLst>
+                  <a:ext uri="{FF2B5EF4-FFF2-40B4-BE49-F238E27FC236}">
+                    <a16:creationId xmlns:a16="http://schemas.microsoft.com/office/drawing/2014/main" id="{5F0849F8-56C2-13A7-D79A-567C2B7F1678}"/>
+                  </a:ext>
+                </a:extLst>
+              </p:cNvPr>
+              <p:cNvCxnSpPr>
+                <a:cxnSpLocks/>
+              </p:cNvCxnSpPr>
+              <p:nvPr/>
+            </p:nvCxnSpPr>
+            <p:spPr>
+              <a:xfrm flipH="1">
+                <a:off x="6164585" y="1541879"/>
+                <a:ext cx="299872" cy="84026"/>
+              </a:xfrm>
+              <a:prstGeom prst="line">
+                <a:avLst/>
+              </a:prstGeom>
+              <a:ln w="57150">
+                <a:solidFill>
+                  <a:srgbClr val="0070C0"/>
+                </a:solidFill>
+              </a:ln>
+            </p:spPr>
+            <p:style>
+              <a:lnRef idx="1">
+                <a:schemeClr val="accent1"/>
+              </a:lnRef>
+              <a:fillRef idx="0">
+                <a:schemeClr val="accent1"/>
+              </a:fillRef>
+              <a:effectRef idx="0">
+                <a:schemeClr val="accent1"/>
+              </a:effectRef>
+              <a:fontRef idx="minor">
+                <a:schemeClr val="tx1"/>
+              </a:fontRef>
+            </p:style>
+          </p:cxnSp>
+        </p:grpSp>
+        <p:grpSp>
+          <p:nvGrpSpPr>
+            <p:cNvPr id="47" name="Group 46">
+              <a:extLst>
+                <a:ext uri="{FF2B5EF4-FFF2-40B4-BE49-F238E27FC236}">
+                  <a16:creationId xmlns:a16="http://schemas.microsoft.com/office/drawing/2014/main" id="{3A45A6E8-0513-5D36-1BCD-6B7AEBB7AAE9}"/>
+                </a:ext>
+              </a:extLst>
+            </p:cNvPr>
+            <p:cNvGrpSpPr/>
+            <p:nvPr/>
+          </p:nvGrpSpPr>
+          <p:grpSpPr>
+            <a:xfrm>
+              <a:off x="6222339" y="2653833"/>
+              <a:ext cx="468727" cy="936000"/>
+              <a:chOff x="2101955" y="3255544"/>
+              <a:chExt cx="261023" cy="803557"/>
+            </a:xfrm>
+          </p:grpSpPr>
+          <p:sp>
+            <p:nvSpPr>
+              <p:cNvPr id="48" name="Arc 47">
+                <a:extLst>
+                  <a:ext uri="{FF2B5EF4-FFF2-40B4-BE49-F238E27FC236}">
+                    <a16:creationId xmlns:a16="http://schemas.microsoft.com/office/drawing/2014/main" id="{4814D403-7DEB-CCB3-4D5A-D87DB28A6052}"/>
+                  </a:ext>
+                </a:extLst>
+              </p:cNvPr>
+              <p:cNvSpPr/>
+              <p:nvPr/>
+            </p:nvSpPr>
+            <p:spPr>
+              <a:xfrm rot="16200000">
+                <a:off x="2108973" y="3805096"/>
+                <a:ext cx="277695" cy="230315"/>
+              </a:xfrm>
+              <a:prstGeom prst="arc">
+                <a:avLst>
+                  <a:gd name="adj1" fmla="val 10739696"/>
+                  <a:gd name="adj2" fmla="val 0"/>
+                </a:avLst>
+              </a:prstGeom>
+              <a:ln w="57150"/>
+            </p:spPr>
+            <p:style>
+              <a:lnRef idx="3">
+                <a:schemeClr val="accent1"/>
+              </a:lnRef>
+              <a:fillRef idx="0">
+                <a:schemeClr val="accent1"/>
+              </a:fillRef>
+              <a:effectRef idx="2">
+                <a:schemeClr val="accent1"/>
+              </a:effectRef>
+              <a:fontRef idx="minor">
+                <a:schemeClr val="tx1"/>
+              </a:fontRef>
+            </p:style>
+            <p:txBody>
+              <a:bodyPr rtlCol="0" anchor="ctr"/>
+              <a:lstStyle/>
+              <a:p>
+                <a:pPr algn="ctr"/>
+                <a:endParaRPr lang="en-IN"/>
+              </a:p>
+            </p:txBody>
+          </p:sp>
+          <p:sp>
+            <p:nvSpPr>
+              <p:cNvPr id="49" name="Arc 48">
+                <a:extLst>
+                  <a:ext uri="{FF2B5EF4-FFF2-40B4-BE49-F238E27FC236}">
+                    <a16:creationId xmlns:a16="http://schemas.microsoft.com/office/drawing/2014/main" id="{9ABDD28F-7EFA-9099-E4B1-FB7DEABC5A07}"/>
+                  </a:ext>
+                </a:extLst>
+              </p:cNvPr>
+              <p:cNvSpPr/>
+              <p:nvPr/>
+            </p:nvSpPr>
+            <p:spPr>
+              <a:xfrm rot="16200000" flipV="1">
+                <a:off x="2185344" y="3724337"/>
+                <a:ext cx="105212" cy="219349"/>
+              </a:xfrm>
+              <a:prstGeom prst="arc">
+                <a:avLst>
+                  <a:gd name="adj1" fmla="val 10739696"/>
+                  <a:gd name="adj2" fmla="val 0"/>
+                </a:avLst>
+              </a:prstGeom>
+              <a:ln w="57150"/>
+            </p:spPr>
+            <p:style>
+              <a:lnRef idx="3">
+                <a:schemeClr val="accent1"/>
+              </a:lnRef>
+              <a:fillRef idx="0">
+                <a:schemeClr val="accent1"/>
+              </a:fillRef>
+              <a:effectRef idx="2">
+                <a:schemeClr val="accent1"/>
+              </a:effectRef>
+              <a:fontRef idx="minor">
+                <a:schemeClr val="tx1"/>
+              </a:fontRef>
+            </p:style>
+            <p:txBody>
+              <a:bodyPr rtlCol="0" anchor="ctr"/>
+              <a:lstStyle/>
+              <a:p>
+                <a:pPr algn="ctr"/>
+                <a:endParaRPr lang="en-IN"/>
+              </a:p>
+            </p:txBody>
+          </p:sp>
+          <p:sp>
+            <p:nvSpPr>
+              <p:cNvPr id="51" name="Arc 50">
+                <a:extLst>
+                  <a:ext uri="{FF2B5EF4-FFF2-40B4-BE49-F238E27FC236}">
+                    <a16:creationId xmlns:a16="http://schemas.microsoft.com/office/drawing/2014/main" id="{8F8F414F-CE0D-45B8-B96D-747F38982DAD}"/>
+                  </a:ext>
+                </a:extLst>
+              </p:cNvPr>
+              <p:cNvSpPr/>
+              <p:nvPr/>
+            </p:nvSpPr>
+            <p:spPr>
+              <a:xfrm rot="16200000">
+                <a:off x="2106779" y="3632613"/>
+                <a:ext cx="277695" cy="230315"/>
+              </a:xfrm>
+              <a:prstGeom prst="arc">
+                <a:avLst>
+                  <a:gd name="adj1" fmla="val 10739696"/>
+                  <a:gd name="adj2" fmla="val 0"/>
+                </a:avLst>
+              </a:prstGeom>
+              <a:ln w="57150"/>
+            </p:spPr>
+            <p:style>
+              <a:lnRef idx="3">
+                <a:schemeClr val="accent1"/>
+              </a:lnRef>
+              <a:fillRef idx="0">
+                <a:schemeClr val="accent1"/>
+              </a:fillRef>
+              <a:effectRef idx="2">
+                <a:schemeClr val="accent1"/>
+              </a:effectRef>
+              <a:fontRef idx="minor">
+                <a:schemeClr val="tx1"/>
+              </a:fontRef>
+            </p:style>
+            <p:txBody>
+              <a:bodyPr rtlCol="0" anchor="ctr"/>
+              <a:lstStyle/>
+              <a:p>
+                <a:pPr algn="ctr"/>
+                <a:endParaRPr lang="en-IN"/>
+              </a:p>
+            </p:txBody>
+          </p:sp>
+          <p:sp>
+            <p:nvSpPr>
+              <p:cNvPr id="52" name="Arc 51">
+                <a:extLst>
+                  <a:ext uri="{FF2B5EF4-FFF2-40B4-BE49-F238E27FC236}">
+                    <a16:creationId xmlns:a16="http://schemas.microsoft.com/office/drawing/2014/main" id="{BA03A805-0C63-98FE-1016-E7299EF055A6}"/>
+                  </a:ext>
+                </a:extLst>
+              </p:cNvPr>
+              <p:cNvSpPr/>
+              <p:nvPr/>
+            </p:nvSpPr>
+            <p:spPr>
+              <a:xfrm rot="16200000" flipV="1">
+                <a:off x="2193569" y="3562274"/>
+                <a:ext cx="105212" cy="198510"/>
+              </a:xfrm>
+              <a:prstGeom prst="arc">
+                <a:avLst>
+                  <a:gd name="adj1" fmla="val 10739696"/>
+                  <a:gd name="adj2" fmla="val 0"/>
+                </a:avLst>
+              </a:prstGeom>
+              <a:ln w="57150"/>
+            </p:spPr>
+            <p:style>
+              <a:lnRef idx="3">
+                <a:schemeClr val="accent1"/>
+              </a:lnRef>
+              <a:fillRef idx="0">
+                <a:schemeClr val="accent1"/>
+              </a:fillRef>
+              <a:effectRef idx="2">
+                <a:schemeClr val="accent1"/>
+              </a:effectRef>
+              <a:fontRef idx="minor">
+                <a:schemeClr val="tx1"/>
+              </a:fontRef>
+            </p:style>
+            <p:txBody>
+              <a:bodyPr rtlCol="0" anchor="ctr"/>
+              <a:lstStyle/>
+              <a:p>
+                <a:pPr algn="ctr"/>
+                <a:endParaRPr lang="en-IN"/>
+              </a:p>
+            </p:txBody>
+          </p:sp>
+          <p:sp>
+            <p:nvSpPr>
+              <p:cNvPr id="53" name="Arc 52">
+                <a:extLst>
+                  <a:ext uri="{FF2B5EF4-FFF2-40B4-BE49-F238E27FC236}">
+                    <a16:creationId xmlns:a16="http://schemas.microsoft.com/office/drawing/2014/main" id="{DA431A5D-AF2F-80E7-DFDC-6FFB42D1E80D}"/>
+                  </a:ext>
+                </a:extLst>
+              </p:cNvPr>
+              <p:cNvSpPr/>
+              <p:nvPr/>
+            </p:nvSpPr>
+            <p:spPr>
+              <a:xfrm rot="16200000">
+                <a:off x="2104585" y="3460130"/>
+                <a:ext cx="277695" cy="230315"/>
+              </a:xfrm>
+              <a:prstGeom prst="arc">
+                <a:avLst>
+                  <a:gd name="adj1" fmla="val 10739696"/>
+                  <a:gd name="adj2" fmla="val 0"/>
+                </a:avLst>
+              </a:prstGeom>
+              <a:ln w="57150"/>
+            </p:spPr>
+            <p:style>
+              <a:lnRef idx="3">
+                <a:schemeClr val="accent1"/>
+              </a:lnRef>
+              <a:fillRef idx="0">
+                <a:schemeClr val="accent1"/>
+              </a:fillRef>
+              <a:effectRef idx="2">
+                <a:schemeClr val="accent1"/>
+              </a:effectRef>
+              <a:fontRef idx="minor">
+                <a:schemeClr val="tx1"/>
+              </a:fontRef>
+            </p:style>
+            <p:txBody>
+              <a:bodyPr rtlCol="0" anchor="ctr"/>
+              <a:lstStyle/>
+              <a:p>
+                <a:pPr algn="ctr"/>
+                <a:endParaRPr lang="en-IN"/>
+              </a:p>
+            </p:txBody>
+          </p:sp>
+          <p:sp>
+            <p:nvSpPr>
+              <p:cNvPr id="60" name="Arc 59">
+                <a:extLst>
+                  <a:ext uri="{FF2B5EF4-FFF2-40B4-BE49-F238E27FC236}">
+                    <a16:creationId xmlns:a16="http://schemas.microsoft.com/office/drawing/2014/main" id="{F7F8CFDC-56F5-5C8A-57DC-BC70C9418CB6}"/>
+                  </a:ext>
+                </a:extLst>
+              </p:cNvPr>
+              <p:cNvSpPr/>
+              <p:nvPr/>
+            </p:nvSpPr>
+            <p:spPr>
+              <a:xfrm rot="16200000" flipV="1">
+                <a:off x="2173754" y="3364640"/>
+                <a:ext cx="96800" cy="240397"/>
+              </a:xfrm>
+              <a:prstGeom prst="arc">
+                <a:avLst>
+                  <a:gd name="adj1" fmla="val 10739696"/>
+                  <a:gd name="adj2" fmla="val 0"/>
+                </a:avLst>
+              </a:prstGeom>
+              <a:ln w="57150"/>
+            </p:spPr>
+            <p:style>
+              <a:lnRef idx="3">
+                <a:schemeClr val="accent1"/>
+              </a:lnRef>
+              <a:fillRef idx="0">
+                <a:schemeClr val="accent1"/>
+              </a:fillRef>
+              <a:effectRef idx="2">
+                <a:schemeClr val="accent1"/>
+              </a:effectRef>
+              <a:fontRef idx="minor">
+                <a:schemeClr val="tx1"/>
+              </a:fontRef>
+            </p:style>
+            <p:txBody>
+              <a:bodyPr rtlCol="0" anchor="ctr"/>
+              <a:lstStyle/>
+              <a:p>
+                <a:pPr algn="ctr"/>
+                <a:endParaRPr lang="en-IN"/>
+              </a:p>
+            </p:txBody>
+          </p:sp>
+          <p:sp>
+            <p:nvSpPr>
+              <p:cNvPr id="61" name="Arc 60">
+                <a:extLst>
+                  <a:ext uri="{FF2B5EF4-FFF2-40B4-BE49-F238E27FC236}">
+                    <a16:creationId xmlns:a16="http://schemas.microsoft.com/office/drawing/2014/main" id="{C1053A17-2AFF-2382-201E-3A639766A669}"/>
+                  </a:ext>
+                </a:extLst>
+              </p:cNvPr>
+              <p:cNvSpPr/>
+              <p:nvPr/>
+            </p:nvSpPr>
+            <p:spPr>
+              <a:xfrm rot="16200000">
+                <a:off x="2091425" y="3279234"/>
+                <a:ext cx="277695" cy="230315"/>
+              </a:xfrm>
+              <a:prstGeom prst="arc">
+                <a:avLst>
+                  <a:gd name="adj1" fmla="val 10739696"/>
+                  <a:gd name="adj2" fmla="val 0"/>
+                </a:avLst>
+              </a:prstGeom>
+              <a:ln w="57150"/>
+            </p:spPr>
+            <p:style>
+              <a:lnRef idx="3">
+                <a:schemeClr val="accent1"/>
+              </a:lnRef>
+              <a:fillRef idx="0">
+                <a:schemeClr val="accent1"/>
+              </a:fillRef>
+              <a:effectRef idx="2">
+                <a:schemeClr val="accent1"/>
+              </a:effectRef>
+              <a:fontRef idx="minor">
+                <a:schemeClr val="tx1"/>
+              </a:fontRef>
+            </p:style>
+            <p:txBody>
+              <a:bodyPr rtlCol="0" anchor="ctr"/>
+              <a:lstStyle/>
+              <a:p>
+                <a:pPr algn="ctr"/>
+                <a:endParaRPr lang="en-IN"/>
+              </a:p>
+            </p:txBody>
+          </p:sp>
+        </p:grpSp>
+      </p:grpSp>
+      <p:cxnSp>
+        <p:nvCxnSpPr>
+          <p:cNvPr id="90" name="Straight Connector 89">
+            <a:extLst>
+              <a:ext uri="{FF2B5EF4-FFF2-40B4-BE49-F238E27FC236}">
+                <a16:creationId xmlns:a16="http://schemas.microsoft.com/office/drawing/2014/main" id="{90B5804D-2E3D-106E-033C-B9DEC52D8F3A}"/>
+              </a:ext>
+            </a:extLst>
+          </p:cNvPr>
+          <p:cNvCxnSpPr>
+            <a:cxnSpLocks/>
+          </p:cNvCxnSpPr>
+          <p:nvPr/>
+        </p:nvCxnSpPr>
+        <p:spPr>
+          <a:xfrm flipH="1" flipV="1">
+            <a:off x="1043459" y="855747"/>
+            <a:ext cx="1460255" cy="14916"/>
+          </a:xfrm>
+          <a:prstGeom prst="line">
+            <a:avLst/>
+          </a:prstGeom>
+          <a:ln w="57150">
+            <a:solidFill>
+              <a:schemeClr val="tx1"/>
+            </a:solidFill>
+          </a:ln>
+        </p:spPr>
+        <p:style>
+          <a:lnRef idx="1">
+            <a:schemeClr val="accent1"/>
+          </a:lnRef>
+          <a:fillRef idx="0">
+            <a:schemeClr val="accent1"/>
+          </a:fillRef>
+          <a:effectRef idx="0">
+            <a:schemeClr val="accent1"/>
+          </a:effectRef>
+          <a:fontRef idx="minor">
+            <a:schemeClr val="tx1"/>
+          </a:fontRef>
+        </p:style>
+      </p:cxnSp>
+      <p:cxnSp>
+        <p:nvCxnSpPr>
+          <p:cNvPr id="99" name="Straight Connector 98">
+            <a:extLst>
+              <a:ext uri="{FF2B5EF4-FFF2-40B4-BE49-F238E27FC236}">
+                <a16:creationId xmlns:a16="http://schemas.microsoft.com/office/drawing/2014/main" id="{CB0C7175-F35D-483C-44DF-F2B42C0E0E9A}"/>
+              </a:ext>
+            </a:extLst>
+          </p:cNvPr>
+          <p:cNvCxnSpPr>
+            <a:cxnSpLocks/>
+          </p:cNvCxnSpPr>
+          <p:nvPr/>
+        </p:nvCxnSpPr>
+        <p:spPr>
+          <a:xfrm flipV="1">
+            <a:off x="4220545" y="851956"/>
+            <a:ext cx="815660" cy="7584"/>
+          </a:xfrm>
+          <a:prstGeom prst="line">
+            <a:avLst/>
+          </a:prstGeom>
+          <a:ln w="57150">
+            <a:solidFill>
+              <a:srgbClr val="0070C0"/>
+            </a:solidFill>
+          </a:ln>
+        </p:spPr>
+        <p:style>
+          <a:lnRef idx="1">
+            <a:schemeClr val="accent1"/>
+          </a:lnRef>
+          <a:fillRef idx="0">
+            <a:schemeClr val="accent1"/>
+          </a:fillRef>
+          <a:effectRef idx="0">
+            <a:schemeClr val="accent1"/>
+          </a:effectRef>
+          <a:fontRef idx="minor">
+            <a:schemeClr val="tx1"/>
+          </a:fontRef>
+        </p:style>
+      </p:cxnSp>
+      <p:cxnSp>
+        <p:nvCxnSpPr>
+          <p:cNvPr id="119" name="Straight Connector 118">
+            <a:extLst>
+              <a:ext uri="{FF2B5EF4-FFF2-40B4-BE49-F238E27FC236}">
+                <a16:creationId xmlns:a16="http://schemas.microsoft.com/office/drawing/2014/main" id="{B023F214-6544-BE9D-D463-4F3BF2523DBB}"/>
+              </a:ext>
+            </a:extLst>
+          </p:cNvPr>
+          <p:cNvCxnSpPr>
+            <a:cxnSpLocks/>
+          </p:cNvCxnSpPr>
+          <p:nvPr/>
+        </p:nvCxnSpPr>
+        <p:spPr>
+          <a:xfrm>
+            <a:off x="2137258" y="866864"/>
+            <a:ext cx="936529" cy="20409"/>
+          </a:xfrm>
+          <a:prstGeom prst="line">
+            <a:avLst/>
+          </a:prstGeom>
+          <a:ln w="57150">
+            <a:solidFill>
+              <a:srgbClr val="0070C0"/>
+            </a:solidFill>
+          </a:ln>
+        </p:spPr>
+        <p:style>
+          <a:lnRef idx="1">
+            <a:schemeClr val="accent1"/>
+          </a:lnRef>
+          <a:fillRef idx="0">
+            <a:schemeClr val="accent1"/>
+          </a:fillRef>
+          <a:effectRef idx="0">
+            <a:schemeClr val="accent1"/>
+          </a:effectRef>
+          <a:fontRef idx="minor">
+            <a:schemeClr val="tx1"/>
+          </a:fontRef>
+        </p:style>
+      </p:cxnSp>
+      <p:grpSp>
+        <p:nvGrpSpPr>
+          <p:cNvPr id="182" name="Group 181">
+            <a:extLst>
+              <a:ext uri="{FF2B5EF4-FFF2-40B4-BE49-F238E27FC236}">
+                <a16:creationId xmlns:a16="http://schemas.microsoft.com/office/drawing/2014/main" id="{C63BA097-84D0-4271-5CEE-05570CD57909}"/>
+              </a:ext>
+            </a:extLst>
+          </p:cNvPr>
+          <p:cNvGrpSpPr/>
+          <p:nvPr/>
+        </p:nvGrpSpPr>
+        <p:grpSpPr>
+          <a:xfrm>
+            <a:off x="3025067" y="602594"/>
+            <a:ext cx="1211294" cy="348272"/>
+            <a:chOff x="3207311" y="599364"/>
+            <a:chExt cx="1211294" cy="348272"/>
+          </a:xfrm>
+        </p:grpSpPr>
+        <p:cxnSp>
+          <p:nvCxnSpPr>
+            <p:cNvPr id="70" name="Straight Connector 69">
+              <a:extLst>
+                <a:ext uri="{FF2B5EF4-FFF2-40B4-BE49-F238E27FC236}">
+                  <a16:creationId xmlns:a16="http://schemas.microsoft.com/office/drawing/2014/main" id="{D06297FA-010D-932B-3DFB-CD0E33840BE6}"/>
+                </a:ext>
+              </a:extLst>
+            </p:cNvPr>
+            <p:cNvCxnSpPr>
+              <a:cxnSpLocks/>
+            </p:cNvCxnSpPr>
+            <p:nvPr/>
+          </p:nvCxnSpPr>
+          <p:spPr>
+            <a:xfrm rot="185876" flipV="1">
+              <a:off x="3839558" y="610178"/>
+              <a:ext cx="99387" cy="308849"/>
+            </a:xfrm>
+            <a:prstGeom prst="line">
+              <a:avLst/>
+            </a:prstGeom>
+            <a:ln w="57150">
+              <a:solidFill>
+                <a:srgbClr val="0070C0"/>
+              </a:solidFill>
+            </a:ln>
+          </p:spPr>
+          <p:style>
+            <a:lnRef idx="1">
+              <a:schemeClr val="accent1"/>
+            </a:lnRef>
+            <a:fillRef idx="0">
+              <a:schemeClr val="accent1"/>
+            </a:fillRef>
+            <a:effectRef idx="0">
+              <a:schemeClr val="accent1"/>
+            </a:effectRef>
+            <a:fontRef idx="minor">
+              <a:schemeClr val="tx1"/>
+            </a:fontRef>
+          </p:style>
+        </p:cxnSp>
+        <p:cxnSp>
+          <p:nvCxnSpPr>
+            <p:cNvPr id="67" name="Straight Connector 66">
+              <a:extLst>
+                <a:ext uri="{FF2B5EF4-FFF2-40B4-BE49-F238E27FC236}">
+                  <a16:creationId xmlns:a16="http://schemas.microsoft.com/office/drawing/2014/main" id="{8D103C26-19B1-E709-A975-96744FB2C52F}"/>
+                </a:ext>
+              </a:extLst>
+            </p:cNvPr>
+            <p:cNvCxnSpPr>
+              <a:cxnSpLocks/>
+            </p:cNvCxnSpPr>
+            <p:nvPr/>
+          </p:nvCxnSpPr>
+          <p:spPr>
+            <a:xfrm rot="185876" flipH="1" flipV="1">
+              <a:off x="4137871" y="633416"/>
+              <a:ext cx="99387" cy="308849"/>
+            </a:xfrm>
+            <a:prstGeom prst="line">
+              <a:avLst/>
+            </a:prstGeom>
+            <a:ln w="57150">
+              <a:solidFill>
+                <a:srgbClr val="0070C0"/>
+              </a:solidFill>
+            </a:ln>
+          </p:spPr>
+          <p:style>
+            <a:lnRef idx="1">
+              <a:schemeClr val="accent1"/>
+            </a:lnRef>
+            <a:fillRef idx="0">
+              <a:schemeClr val="accent1"/>
+            </a:fillRef>
+            <a:effectRef idx="0">
+              <a:schemeClr val="accent1"/>
+            </a:effectRef>
+            <a:fontRef idx="minor">
+              <a:schemeClr val="tx1"/>
+            </a:fontRef>
+          </p:style>
+        </p:cxnSp>
+        <p:cxnSp>
+          <p:nvCxnSpPr>
+            <p:cNvPr id="68" name="Straight Connector 67">
+              <a:extLst>
+                <a:ext uri="{FF2B5EF4-FFF2-40B4-BE49-F238E27FC236}">
+                  <a16:creationId xmlns:a16="http://schemas.microsoft.com/office/drawing/2014/main" id="{A2F5C1A6-AC32-943F-2D2D-59FCA28625CC}"/>
+                </a:ext>
+              </a:extLst>
+            </p:cNvPr>
+            <p:cNvCxnSpPr>
+              <a:cxnSpLocks/>
+            </p:cNvCxnSpPr>
+            <p:nvPr/>
+          </p:nvCxnSpPr>
+          <p:spPr>
+            <a:xfrm rot="185876" flipV="1">
+              <a:off x="4237111" y="638787"/>
+              <a:ext cx="99387" cy="308849"/>
+            </a:xfrm>
+            <a:prstGeom prst="line">
+              <a:avLst/>
+            </a:prstGeom>
+            <a:ln w="57150">
+              <a:solidFill>
+                <a:srgbClr val="0070C0"/>
+              </a:solidFill>
+            </a:ln>
+          </p:spPr>
+          <p:style>
+            <a:lnRef idx="1">
+              <a:schemeClr val="accent1"/>
+            </a:lnRef>
+            <a:fillRef idx="0">
+              <a:schemeClr val="accent1"/>
+            </a:fillRef>
+            <a:effectRef idx="0">
+              <a:schemeClr val="accent1"/>
+            </a:effectRef>
+            <a:fontRef idx="minor">
+              <a:schemeClr val="tx1"/>
+            </a:fontRef>
+          </p:style>
+        </p:cxnSp>
+        <p:cxnSp>
+          <p:nvCxnSpPr>
+            <p:cNvPr id="65" name="Straight Connector 64">
+              <a:extLst>
+                <a:ext uri="{FF2B5EF4-FFF2-40B4-BE49-F238E27FC236}">
+                  <a16:creationId xmlns:a16="http://schemas.microsoft.com/office/drawing/2014/main" id="{D12DF48F-5DF8-5E02-02E2-F226D40F2A8F}"/>
+                </a:ext>
+              </a:extLst>
+            </p:cNvPr>
+            <p:cNvCxnSpPr>
+              <a:cxnSpLocks/>
+            </p:cNvCxnSpPr>
+            <p:nvPr/>
+          </p:nvCxnSpPr>
+          <p:spPr>
+            <a:xfrm rot="185876" flipH="1" flipV="1">
+              <a:off x="3938415" y="622621"/>
+              <a:ext cx="99387" cy="308849"/>
+            </a:xfrm>
+            <a:prstGeom prst="line">
+              <a:avLst/>
+            </a:prstGeom>
+            <a:ln w="57150">
+              <a:solidFill>
+                <a:srgbClr val="0070C0"/>
+              </a:solidFill>
+            </a:ln>
+          </p:spPr>
+          <p:style>
+            <a:lnRef idx="1">
+              <a:schemeClr val="accent1"/>
+            </a:lnRef>
+            <a:fillRef idx="0">
+              <a:schemeClr val="accent1"/>
+            </a:fillRef>
+            <a:effectRef idx="0">
+              <a:schemeClr val="accent1"/>
+            </a:effectRef>
+            <a:fontRef idx="minor">
+              <a:schemeClr val="tx1"/>
+            </a:fontRef>
+          </p:style>
+        </p:cxnSp>
+        <p:cxnSp>
+          <p:nvCxnSpPr>
+            <p:cNvPr id="66" name="Straight Connector 65">
+              <a:extLst>
+                <a:ext uri="{FF2B5EF4-FFF2-40B4-BE49-F238E27FC236}">
+                  <a16:creationId xmlns:a16="http://schemas.microsoft.com/office/drawing/2014/main" id="{787990BD-CC35-8800-77CF-3EFF5F5A20CD}"/>
+                </a:ext>
+              </a:extLst>
+            </p:cNvPr>
+            <p:cNvCxnSpPr>
+              <a:cxnSpLocks/>
+            </p:cNvCxnSpPr>
+            <p:nvPr/>
+          </p:nvCxnSpPr>
+          <p:spPr>
+            <a:xfrm rot="185876" flipV="1">
+              <a:off x="4037656" y="627993"/>
+              <a:ext cx="99387" cy="308849"/>
+            </a:xfrm>
+            <a:prstGeom prst="line">
+              <a:avLst/>
+            </a:prstGeom>
+            <a:ln w="57150">
+              <a:solidFill>
+                <a:srgbClr val="0070C0"/>
+              </a:solidFill>
+            </a:ln>
+          </p:spPr>
+          <p:style>
+            <a:lnRef idx="1">
+              <a:schemeClr val="accent1"/>
+            </a:lnRef>
+            <a:fillRef idx="0">
+              <a:schemeClr val="accent1"/>
+            </a:fillRef>
+            <a:effectRef idx="0">
+              <a:schemeClr val="accent1"/>
+            </a:effectRef>
+            <a:fontRef idx="minor">
+              <a:schemeClr val="tx1"/>
+            </a:fontRef>
+          </p:style>
+        </p:cxnSp>
+        <p:cxnSp>
+          <p:nvCxnSpPr>
+            <p:cNvPr id="63" name="Straight Connector 62">
+              <a:extLst>
+                <a:ext uri="{FF2B5EF4-FFF2-40B4-BE49-F238E27FC236}">
+                  <a16:creationId xmlns:a16="http://schemas.microsoft.com/office/drawing/2014/main" id="{21037A3A-C159-F286-07D2-BC8B1B4ECE41}"/>
+                </a:ext>
+              </a:extLst>
+            </p:cNvPr>
+            <p:cNvCxnSpPr>
+              <a:cxnSpLocks/>
+            </p:cNvCxnSpPr>
+            <p:nvPr/>
+          </p:nvCxnSpPr>
+          <p:spPr>
+            <a:xfrm rot="5585876" flipH="1">
+              <a:off x="4252545" y="722358"/>
+              <a:ext cx="251807" cy="80313"/>
+            </a:xfrm>
+            <a:prstGeom prst="line">
+              <a:avLst/>
+            </a:prstGeom>
+            <a:ln w="57150">
+              <a:solidFill>
+                <a:srgbClr val="0070C0"/>
+              </a:solidFill>
+            </a:ln>
+          </p:spPr>
+          <p:style>
+            <a:lnRef idx="1">
+              <a:schemeClr val="accent1"/>
+            </a:lnRef>
+            <a:fillRef idx="0">
+              <a:schemeClr val="accent1"/>
+            </a:fillRef>
+            <a:effectRef idx="0">
+              <a:schemeClr val="accent1"/>
+            </a:effectRef>
+            <a:fontRef idx="minor">
+              <a:schemeClr val="tx1"/>
+            </a:fontRef>
+          </p:style>
+        </p:cxnSp>
+        <p:cxnSp>
+          <p:nvCxnSpPr>
+            <p:cNvPr id="151" name="Straight Connector 150">
+              <a:extLst>
+                <a:ext uri="{FF2B5EF4-FFF2-40B4-BE49-F238E27FC236}">
+                  <a16:creationId xmlns:a16="http://schemas.microsoft.com/office/drawing/2014/main" id="{923F212D-41F2-0049-E0C0-954F7B6369AA}"/>
+                </a:ext>
+              </a:extLst>
+            </p:cNvPr>
+            <p:cNvCxnSpPr>
+              <a:cxnSpLocks/>
+            </p:cNvCxnSpPr>
+            <p:nvPr/>
+          </p:nvCxnSpPr>
+          <p:spPr>
+            <a:xfrm flipV="1">
+              <a:off x="3207311" y="599364"/>
+              <a:ext cx="115933" cy="303027"/>
+            </a:xfrm>
+            <a:prstGeom prst="line">
+              <a:avLst/>
+            </a:prstGeom>
+            <a:ln w="57150">
+              <a:solidFill>
+                <a:srgbClr val="0070C0"/>
+              </a:solidFill>
+            </a:ln>
+          </p:spPr>
+          <p:style>
+            <a:lnRef idx="1">
+              <a:schemeClr val="accent1"/>
+            </a:lnRef>
+            <a:fillRef idx="0">
+              <a:schemeClr val="accent1"/>
+            </a:fillRef>
+            <a:effectRef idx="0">
+              <a:schemeClr val="accent1"/>
+            </a:effectRef>
+            <a:fontRef idx="minor">
+              <a:schemeClr val="tx1"/>
+            </a:fontRef>
+          </p:style>
+        </p:cxnSp>
+        <p:cxnSp>
+          <p:nvCxnSpPr>
+            <p:cNvPr id="152" name="Straight Connector 151">
+              <a:extLst>
+                <a:ext uri="{FF2B5EF4-FFF2-40B4-BE49-F238E27FC236}">
+                  <a16:creationId xmlns:a16="http://schemas.microsoft.com/office/drawing/2014/main" id="{0067CCB9-74E4-CE46-F7A3-FE489D6C683F}"/>
+                </a:ext>
+              </a:extLst>
+            </p:cNvPr>
+            <p:cNvCxnSpPr>
+              <a:cxnSpLocks/>
+            </p:cNvCxnSpPr>
+            <p:nvPr/>
+          </p:nvCxnSpPr>
+          <p:spPr>
+            <a:xfrm flipH="1" flipV="1">
+              <a:off x="3522315" y="617231"/>
+              <a:ext cx="82551" cy="313769"/>
+            </a:xfrm>
+            <a:prstGeom prst="line">
+              <a:avLst/>
+            </a:prstGeom>
+            <a:ln w="57150">
+              <a:solidFill>
+                <a:srgbClr val="0070C0"/>
+              </a:solidFill>
+            </a:ln>
+          </p:spPr>
+          <p:style>
+            <a:lnRef idx="1">
+              <a:schemeClr val="accent1"/>
+            </a:lnRef>
+            <a:fillRef idx="0">
+              <a:schemeClr val="accent1"/>
+            </a:fillRef>
+            <a:effectRef idx="0">
+              <a:schemeClr val="accent1"/>
+            </a:effectRef>
+            <a:fontRef idx="minor">
+              <a:schemeClr val="tx1"/>
+            </a:fontRef>
+          </p:style>
+        </p:cxnSp>
+        <p:cxnSp>
+          <p:nvCxnSpPr>
+            <p:cNvPr id="153" name="Straight Connector 152">
+              <a:extLst>
+                <a:ext uri="{FF2B5EF4-FFF2-40B4-BE49-F238E27FC236}">
+                  <a16:creationId xmlns:a16="http://schemas.microsoft.com/office/drawing/2014/main" id="{6FC6B883-AD83-8506-7BEF-88D7C01BFC6C}"/>
+                </a:ext>
+              </a:extLst>
+            </p:cNvPr>
+            <p:cNvCxnSpPr>
+              <a:cxnSpLocks/>
+            </p:cNvCxnSpPr>
+            <p:nvPr/>
+          </p:nvCxnSpPr>
+          <p:spPr>
+            <a:xfrm flipV="1">
+              <a:off x="3604864" y="627973"/>
+              <a:ext cx="115933" cy="303027"/>
+            </a:xfrm>
+            <a:prstGeom prst="line">
+              <a:avLst/>
+            </a:prstGeom>
+            <a:ln w="57150">
+              <a:solidFill>
+                <a:srgbClr val="0070C0"/>
+              </a:solidFill>
+            </a:ln>
+          </p:spPr>
+          <p:style>
+            <a:lnRef idx="1">
+              <a:schemeClr val="accent1"/>
+            </a:lnRef>
+            <a:fillRef idx="0">
+              <a:schemeClr val="accent1"/>
+            </a:fillRef>
+            <a:effectRef idx="0">
+              <a:schemeClr val="accent1"/>
+            </a:effectRef>
+            <a:fontRef idx="minor">
+              <a:schemeClr val="tx1"/>
+            </a:fontRef>
+          </p:style>
+        </p:cxnSp>
+        <p:cxnSp>
+          <p:nvCxnSpPr>
+            <p:cNvPr id="154" name="Straight Connector 153">
+              <a:extLst>
+                <a:ext uri="{FF2B5EF4-FFF2-40B4-BE49-F238E27FC236}">
+                  <a16:creationId xmlns:a16="http://schemas.microsoft.com/office/drawing/2014/main" id="{54121B11-ADED-EDF1-7DF7-FB860D3E2671}"/>
+                </a:ext>
+              </a:extLst>
+            </p:cNvPr>
+            <p:cNvCxnSpPr>
+              <a:cxnSpLocks/>
+            </p:cNvCxnSpPr>
+            <p:nvPr/>
+          </p:nvCxnSpPr>
+          <p:spPr>
+            <a:xfrm flipH="1" flipV="1">
+              <a:off x="3322859" y="606436"/>
+              <a:ext cx="82551" cy="313769"/>
+            </a:xfrm>
+            <a:prstGeom prst="line">
+              <a:avLst/>
+            </a:prstGeom>
+            <a:ln w="57150">
+              <a:solidFill>
+                <a:srgbClr val="0070C0"/>
+              </a:solidFill>
+            </a:ln>
+          </p:spPr>
+          <p:style>
+            <a:lnRef idx="1">
+              <a:schemeClr val="accent1"/>
+            </a:lnRef>
+            <a:fillRef idx="0">
+              <a:schemeClr val="accent1"/>
+            </a:fillRef>
+            <a:effectRef idx="0">
+              <a:schemeClr val="accent1"/>
+            </a:effectRef>
+            <a:fontRef idx="minor">
+              <a:schemeClr val="tx1"/>
+            </a:fontRef>
+          </p:style>
+        </p:cxnSp>
+        <p:cxnSp>
+          <p:nvCxnSpPr>
+            <p:cNvPr id="155" name="Straight Connector 154">
+              <a:extLst>
+                <a:ext uri="{FF2B5EF4-FFF2-40B4-BE49-F238E27FC236}">
+                  <a16:creationId xmlns:a16="http://schemas.microsoft.com/office/drawing/2014/main" id="{7BB21D10-6B18-2671-A041-BAD7142A4A09}"/>
+                </a:ext>
+              </a:extLst>
+            </p:cNvPr>
+            <p:cNvCxnSpPr>
+              <a:cxnSpLocks/>
+            </p:cNvCxnSpPr>
+            <p:nvPr/>
+          </p:nvCxnSpPr>
+          <p:spPr>
+            <a:xfrm flipV="1">
+              <a:off x="3405409" y="617179"/>
+              <a:ext cx="115933" cy="303027"/>
+            </a:xfrm>
+            <a:prstGeom prst="line">
+              <a:avLst/>
+            </a:prstGeom>
+            <a:ln w="57150">
+              <a:solidFill>
+                <a:srgbClr val="0070C0"/>
+              </a:solidFill>
+            </a:ln>
+          </p:spPr>
+          <p:style>
+            <a:lnRef idx="1">
+              <a:schemeClr val="accent1"/>
+            </a:lnRef>
+            <a:fillRef idx="0">
+              <a:schemeClr val="accent1"/>
+            </a:fillRef>
+            <a:effectRef idx="0">
+              <a:schemeClr val="accent1"/>
+            </a:effectRef>
+            <a:fontRef idx="minor">
+              <a:schemeClr val="tx1"/>
+            </a:fontRef>
+          </p:style>
+        </p:cxnSp>
+        <p:cxnSp>
+          <p:nvCxnSpPr>
+            <p:cNvPr id="156" name="Straight Connector 155">
+              <a:extLst>
+                <a:ext uri="{FF2B5EF4-FFF2-40B4-BE49-F238E27FC236}">
+                  <a16:creationId xmlns:a16="http://schemas.microsoft.com/office/drawing/2014/main" id="{D2C74002-FA04-91E5-3516-BE96B805FC6A}"/>
+                </a:ext>
+              </a:extLst>
+            </p:cNvPr>
+            <p:cNvCxnSpPr>
+              <a:cxnSpLocks/>
+            </p:cNvCxnSpPr>
+            <p:nvPr/>
+          </p:nvCxnSpPr>
+          <p:spPr>
+            <a:xfrm flipH="1" flipV="1">
+              <a:off x="3721181" y="620901"/>
+              <a:ext cx="114095" cy="294912"/>
+            </a:xfrm>
+            <a:prstGeom prst="line">
+              <a:avLst/>
+            </a:prstGeom>
+            <a:ln w="57150">
+              <a:solidFill>
+                <a:srgbClr val="0070C0"/>
+              </a:solidFill>
+            </a:ln>
+          </p:spPr>
+          <p:style>
+            <a:lnRef idx="1">
+              <a:schemeClr val="accent1"/>
+            </a:lnRef>
+            <a:fillRef idx="0">
+              <a:schemeClr val="accent1"/>
+            </a:fillRef>
+            <a:effectRef idx="0">
+              <a:schemeClr val="accent1"/>
+            </a:effectRef>
+            <a:fontRef idx="minor">
+              <a:schemeClr val="tx1"/>
+            </a:fontRef>
+          </p:style>
+        </p:cxnSp>
+      </p:grpSp>
+      <p:grpSp>
+        <p:nvGrpSpPr>
+          <p:cNvPr id="40" name="Group 39">
+            <a:extLst>
+              <a:ext uri="{FF2B5EF4-FFF2-40B4-BE49-F238E27FC236}">
+                <a16:creationId xmlns:a16="http://schemas.microsoft.com/office/drawing/2014/main" id="{66577571-224E-F722-00F7-82DD98D1D291}"/>
+              </a:ext>
+            </a:extLst>
+          </p:cNvPr>
+          <p:cNvGrpSpPr/>
+          <p:nvPr/>
+        </p:nvGrpSpPr>
+        <p:grpSpPr>
+          <a:xfrm>
+            <a:off x="9848490" y="4495758"/>
+            <a:ext cx="849470" cy="806000"/>
+            <a:chOff x="3106588" y="431634"/>
+            <a:chExt cx="849470" cy="806000"/>
+          </a:xfrm>
+        </p:grpSpPr>
+        <p:sp>
+          <p:nvSpPr>
+            <p:cNvPr id="41" name="Oval 40">
+              <a:extLst>
+                <a:ext uri="{FF2B5EF4-FFF2-40B4-BE49-F238E27FC236}">
+                  <a16:creationId xmlns:a16="http://schemas.microsoft.com/office/drawing/2014/main" id="{9C2E47AE-D2FA-EB08-ABD3-5658E47AF5C0}"/>
+                </a:ext>
+              </a:extLst>
+            </p:cNvPr>
+            <p:cNvSpPr/>
+            <p:nvPr/>
+          </p:nvSpPr>
+          <p:spPr>
+            <a:xfrm>
+              <a:off x="3106588" y="431634"/>
+              <a:ext cx="849470" cy="806000"/>
+            </a:xfrm>
+            <a:prstGeom prst="ellipse">
+              <a:avLst/>
+            </a:prstGeom>
+            <a:solidFill>
+              <a:schemeClr val="bg1">
+                <a:lumMod val="95000"/>
+              </a:schemeClr>
+            </a:solidFill>
+            <a:ln w="38100"/>
+          </p:spPr>
+          <p:style>
+            <a:lnRef idx="2">
+              <a:schemeClr val="accent1">
+                <a:shade val="50000"/>
+              </a:schemeClr>
+            </a:lnRef>
+            <a:fillRef idx="1">
+              <a:schemeClr val="accent1"/>
+            </a:fillRef>
+            <a:effectRef idx="0">
+              <a:schemeClr val="accent1"/>
+            </a:effectRef>
+            <a:fontRef idx="minor">
+              <a:schemeClr val="lt1"/>
+            </a:fontRef>
+          </p:style>
+          <p:txBody>
+            <a:bodyPr rtlCol="0" anchor="ctr"/>
+            <a:lstStyle/>
+            <a:p>
+              <a:pPr algn="ctr"/>
+              <a:endParaRPr lang="en-IN" sz="4000" dirty="0">
+                <a:solidFill>
+                  <a:srgbClr val="FF0000"/>
+                </a:solidFill>
+              </a:endParaRPr>
+            </a:p>
+          </p:txBody>
+        </p:sp>
+        <p:sp>
+          <p:nvSpPr>
+            <p:cNvPr id="43" name="TextBox 42">
+              <a:extLst>
+                <a:ext uri="{FF2B5EF4-FFF2-40B4-BE49-F238E27FC236}">
+                  <a16:creationId xmlns:a16="http://schemas.microsoft.com/office/drawing/2014/main" id="{CC05D0F7-D263-2618-63EA-F6990F0AAF67}"/>
+                </a:ext>
+              </a:extLst>
+            </p:cNvPr>
+            <p:cNvSpPr txBox="1"/>
+            <p:nvPr/>
+          </p:nvSpPr>
+          <p:spPr>
+            <a:xfrm>
+              <a:off x="3320936" y="501084"/>
+              <a:ext cx="420773" cy="584775"/>
+            </a:xfrm>
+            <a:prstGeom prst="rect">
+              <a:avLst/>
+            </a:prstGeom>
+            <a:noFill/>
+          </p:spPr>
+          <p:txBody>
+            <a:bodyPr wrap="square" rtlCol="0">
+              <a:spAutoFit/>
+            </a:bodyPr>
+            <a:lstStyle/>
+            <a:p>
+              <a:pPr algn="ctr"/>
+              <a:r>
+                <a:rPr lang="en-IN" sz="3200" b="1" dirty="0">
+                  <a:solidFill>
+                    <a:srgbClr val="FF0000"/>
+                  </a:solidFill>
+                  <a:latin typeface="Arial" panose="020B0604020202020204" pitchFamily="34" charset="0"/>
+                  <a:cs typeface="Arial" panose="020B0604020202020204" pitchFamily="34" charset="0"/>
+                </a:rPr>
+                <a:t>A</a:t>
+              </a:r>
+            </a:p>
+          </p:txBody>
+        </p:sp>
+        <p:grpSp>
+          <p:nvGrpSpPr>
+            <p:cNvPr id="44" name="Group 43">
+              <a:extLst>
+                <a:ext uri="{FF2B5EF4-FFF2-40B4-BE49-F238E27FC236}">
+                  <a16:creationId xmlns:a16="http://schemas.microsoft.com/office/drawing/2014/main" id="{FC8E6DAD-F93D-66A6-FFFE-63DE7DA0E83C}"/>
+                </a:ext>
+              </a:extLst>
+            </p:cNvPr>
+            <p:cNvGrpSpPr/>
+            <p:nvPr/>
+          </p:nvGrpSpPr>
+          <p:grpSpPr>
+            <a:xfrm rot="4449706" flipV="1">
+              <a:off x="3450034" y="911084"/>
+              <a:ext cx="131685" cy="304028"/>
+              <a:chOff x="3898812" y="2986773"/>
+              <a:chExt cx="232509" cy="554879"/>
+            </a:xfrm>
+          </p:grpSpPr>
+          <p:sp>
+            <p:nvSpPr>
+              <p:cNvPr id="50" name="Arc 49">
+                <a:extLst>
+                  <a:ext uri="{FF2B5EF4-FFF2-40B4-BE49-F238E27FC236}">
+                    <a16:creationId xmlns:a16="http://schemas.microsoft.com/office/drawing/2014/main" id="{38162556-4F58-372E-66A9-025F6167FA5E}"/>
+                  </a:ext>
+                </a:extLst>
+              </p:cNvPr>
+              <p:cNvSpPr/>
+              <p:nvPr/>
+            </p:nvSpPr>
+            <p:spPr>
+              <a:xfrm rot="16200000">
+                <a:off x="3877316" y="3010463"/>
+                <a:ext cx="277695" cy="230315"/>
+              </a:xfrm>
+              <a:prstGeom prst="arc">
+                <a:avLst>
+                  <a:gd name="adj1" fmla="val 10739696"/>
+                  <a:gd name="adj2" fmla="val 0"/>
+                </a:avLst>
+              </a:prstGeom>
+              <a:ln w="38100">
+                <a:solidFill>
+                  <a:srgbClr val="FF0000"/>
+                </a:solidFill>
+              </a:ln>
+            </p:spPr>
+            <p:style>
+              <a:lnRef idx="1">
+                <a:schemeClr val="dk1"/>
+              </a:lnRef>
+              <a:fillRef idx="0">
+                <a:schemeClr val="dk1"/>
+              </a:fillRef>
+              <a:effectRef idx="0">
+                <a:schemeClr val="dk1"/>
+              </a:effectRef>
+              <a:fontRef idx="minor">
+                <a:schemeClr val="tx1"/>
+              </a:fontRef>
+            </p:style>
+            <p:txBody>
+              <a:bodyPr rtlCol="0" anchor="ctr"/>
+              <a:lstStyle/>
+              <a:p>
+                <a:pPr algn="ctr"/>
+                <a:endParaRPr lang="en-IN"/>
+              </a:p>
+            </p:txBody>
+          </p:sp>
+          <p:sp>
+            <p:nvSpPr>
+              <p:cNvPr id="55" name="Arc 54">
+                <a:extLst>
+                  <a:ext uri="{FF2B5EF4-FFF2-40B4-BE49-F238E27FC236}">
+                    <a16:creationId xmlns:a16="http://schemas.microsoft.com/office/drawing/2014/main" id="{4FB9EBEE-6E3F-4943-B1CF-47BC85EDA200}"/>
+                  </a:ext>
+                </a:extLst>
+              </p:cNvPr>
+              <p:cNvSpPr/>
+              <p:nvPr/>
+            </p:nvSpPr>
+            <p:spPr>
+              <a:xfrm rot="5400000" flipH="1">
+                <a:off x="3875122" y="3287647"/>
+                <a:ext cx="277695" cy="230315"/>
+              </a:xfrm>
+              <a:prstGeom prst="arc">
+                <a:avLst>
+                  <a:gd name="adj1" fmla="val 10739696"/>
+                  <a:gd name="adj2" fmla="val 0"/>
+                </a:avLst>
+              </a:prstGeom>
+              <a:ln w="38100">
+                <a:solidFill>
+                  <a:srgbClr val="FF0000"/>
+                </a:solidFill>
+              </a:ln>
+            </p:spPr>
+            <p:style>
+              <a:lnRef idx="1">
+                <a:schemeClr val="dk1"/>
+              </a:lnRef>
+              <a:fillRef idx="0">
+                <a:schemeClr val="dk1"/>
+              </a:fillRef>
+              <a:effectRef idx="0">
+                <a:schemeClr val="dk1"/>
+              </a:effectRef>
+              <a:fontRef idx="minor">
+                <a:schemeClr val="tx1"/>
+              </a:fontRef>
+            </p:style>
+            <p:txBody>
+              <a:bodyPr rtlCol="0" anchor="ctr"/>
+              <a:lstStyle/>
+              <a:p>
+                <a:pPr algn="ctr"/>
+                <a:endParaRPr lang="en-IN"/>
+              </a:p>
+            </p:txBody>
+          </p:sp>
+        </p:grpSp>
+      </p:grpSp>
+      <p:sp>
+        <p:nvSpPr>
+          <p:cNvPr id="56" name="Oval 55">
+            <a:extLst>
+              <a:ext uri="{FF2B5EF4-FFF2-40B4-BE49-F238E27FC236}">
+                <a16:creationId xmlns:a16="http://schemas.microsoft.com/office/drawing/2014/main" id="{52CF07DF-B166-A580-6BC6-71AA3BADCCFB}"/>
+              </a:ext>
+            </a:extLst>
+          </p:cNvPr>
+          <p:cNvSpPr/>
+          <p:nvPr/>
+        </p:nvSpPr>
+        <p:spPr>
+          <a:xfrm>
+            <a:off x="7371958" y="2150319"/>
+            <a:ext cx="849470" cy="806000"/>
+          </a:xfrm>
+          <a:prstGeom prst="ellipse">
+            <a:avLst/>
+          </a:prstGeom>
+          <a:solidFill>
+            <a:schemeClr val="bg1">
+              <a:lumMod val="95000"/>
+            </a:schemeClr>
+          </a:solidFill>
+          <a:ln w="38100"/>
+        </p:spPr>
+        <p:style>
+          <a:lnRef idx="2">
+            <a:schemeClr val="accent1">
+              <a:shade val="50000"/>
+            </a:schemeClr>
+          </a:lnRef>
+          <a:fillRef idx="1">
+            <a:schemeClr val="accent1"/>
+          </a:fillRef>
+          <a:effectRef idx="0">
+            <a:schemeClr val="accent1"/>
+          </a:effectRef>
+          <a:fontRef idx="minor">
+            <a:schemeClr val="lt1"/>
+          </a:fontRef>
+        </p:style>
+        <p:txBody>
+          <a:bodyPr rtlCol="0" anchor="ctr"/>
+          <a:lstStyle/>
+          <a:p>
+            <a:pPr algn="ctr"/>
+            <a:endParaRPr lang="en-IN" sz="4000" dirty="0">
+              <a:solidFill>
+                <a:srgbClr val="FF0000"/>
+              </a:solidFill>
+            </a:endParaRPr>
+          </a:p>
+        </p:txBody>
+      </p:sp>
+      <p:sp>
+        <p:nvSpPr>
+          <p:cNvPr id="57" name="TextBox 56">
+            <a:extLst>
+              <a:ext uri="{FF2B5EF4-FFF2-40B4-BE49-F238E27FC236}">
+                <a16:creationId xmlns:a16="http://schemas.microsoft.com/office/drawing/2014/main" id="{8BA57E40-1394-BC24-4530-ECF3319D3872}"/>
+              </a:ext>
+            </a:extLst>
+          </p:cNvPr>
+          <p:cNvSpPr txBox="1"/>
+          <p:nvPr/>
+        </p:nvSpPr>
+        <p:spPr>
+          <a:xfrm>
+            <a:off x="7586306" y="2219769"/>
+            <a:ext cx="420773" cy="584775"/>
+          </a:xfrm>
+          <a:prstGeom prst="rect">
+            <a:avLst/>
+          </a:prstGeom>
+          <a:noFill/>
+        </p:spPr>
+        <p:txBody>
+          <a:bodyPr wrap="square" rtlCol="0">
+            <a:spAutoFit/>
+          </a:bodyPr>
+          <a:lstStyle/>
+          <a:p>
+            <a:pPr algn="ctr"/>
+            <a:r>
+              <a:rPr lang="en-US" sz="3200" b="1" dirty="0">
+                <a:solidFill>
+                  <a:srgbClr val="FF0000"/>
+                </a:solidFill>
+                <a:latin typeface="Arial" panose="020B0604020202020204" pitchFamily="34" charset="0"/>
+                <a:cs typeface="Arial" panose="020B0604020202020204" pitchFamily="34" charset="0"/>
+              </a:rPr>
+              <a:t>V</a:t>
+            </a:r>
+            <a:endParaRPr lang="en-IN" sz="3200" b="1" dirty="0">
+              <a:solidFill>
+                <a:srgbClr val="FF0000"/>
+              </a:solidFill>
+              <a:latin typeface="Arial" panose="020B0604020202020204" pitchFamily="34" charset="0"/>
+              <a:cs typeface="Arial" panose="020B0604020202020204" pitchFamily="34" charset="0"/>
+            </a:endParaRPr>
+          </a:p>
+        </p:txBody>
+      </p:sp>
+      <p:sp>
+        <p:nvSpPr>
+          <p:cNvPr id="11" name="Rectangle 10">
+            <a:extLst>
+              <a:ext uri="{FF2B5EF4-FFF2-40B4-BE49-F238E27FC236}">
+                <a16:creationId xmlns:a16="http://schemas.microsoft.com/office/drawing/2014/main" id="{B6930E61-AE4E-C192-C193-A722836F27D8}"/>
+              </a:ext>
+            </a:extLst>
+          </p:cNvPr>
+          <p:cNvSpPr/>
+          <p:nvPr/>
+        </p:nvSpPr>
+        <p:spPr>
+          <a:xfrm>
+            <a:off x="6261315" y="2733043"/>
+            <a:ext cx="325797" cy="71501"/>
+          </a:xfrm>
+          <a:prstGeom prst="rect">
+            <a:avLst/>
+          </a:prstGeom>
+          <a:solidFill>
+            <a:srgbClr val="FF0000"/>
+          </a:solidFill>
+          <a:ln>
+            <a:noFill/>
+          </a:ln>
+        </p:spPr>
+        <p:style>
+          <a:lnRef idx="2">
+            <a:schemeClr val="accent1">
+              <a:shade val="50000"/>
+            </a:schemeClr>
+          </a:lnRef>
+          <a:fillRef idx="1">
+            <a:schemeClr val="accent1"/>
+          </a:fillRef>
+          <a:effectRef idx="0">
+            <a:schemeClr val="accent1"/>
+          </a:effectRef>
+          <a:fontRef idx="minor">
+            <a:schemeClr val="lt1"/>
+          </a:fontRef>
+        </p:style>
+        <p:txBody>
+          <a:bodyPr rtlCol="0" anchor="ctr"/>
+          <a:lstStyle/>
+          <a:p>
+            <a:pPr algn="ctr"/>
+            <a:endParaRPr lang="en-IN"/>
+          </a:p>
+        </p:txBody>
+      </p:sp>
+      <p:sp>
+        <p:nvSpPr>
+          <p:cNvPr id="58" name="Rectangle 57">
+            <a:extLst>
+              <a:ext uri="{FF2B5EF4-FFF2-40B4-BE49-F238E27FC236}">
+                <a16:creationId xmlns:a16="http://schemas.microsoft.com/office/drawing/2014/main" id="{5D7BB52D-90C2-EE35-497B-C425C4C0D890}"/>
+              </a:ext>
+            </a:extLst>
+          </p:cNvPr>
+          <p:cNvSpPr/>
+          <p:nvPr/>
+        </p:nvSpPr>
+        <p:spPr>
+          <a:xfrm>
+            <a:off x="7629569" y="2733426"/>
+            <a:ext cx="325797" cy="71501"/>
+          </a:xfrm>
+          <a:prstGeom prst="rect">
+            <a:avLst/>
+          </a:prstGeom>
+          <a:solidFill>
+            <a:srgbClr val="FF0000"/>
+          </a:solidFill>
+          <a:ln>
+            <a:noFill/>
+          </a:ln>
+        </p:spPr>
+        <p:style>
+          <a:lnRef idx="2">
+            <a:schemeClr val="accent1">
+              <a:shade val="50000"/>
+            </a:schemeClr>
+          </a:lnRef>
+          <a:fillRef idx="1">
+            <a:schemeClr val="accent1"/>
+          </a:fillRef>
+          <a:effectRef idx="0">
+            <a:schemeClr val="accent1"/>
+          </a:effectRef>
+          <a:fontRef idx="minor">
+            <a:schemeClr val="lt1"/>
+          </a:fontRef>
+        </p:style>
+        <p:txBody>
+          <a:bodyPr rtlCol="0" anchor="ctr"/>
+          <a:lstStyle/>
+          <a:p>
+            <a:pPr algn="ctr"/>
+            <a:endParaRPr lang="en-IN"/>
+          </a:p>
+        </p:txBody>
+      </p:sp>
+      <p:sp>
+        <p:nvSpPr>
+          <p:cNvPr id="69" name="TextBox 68">
+            <a:extLst>
+              <a:ext uri="{FF2B5EF4-FFF2-40B4-BE49-F238E27FC236}">
+                <a16:creationId xmlns:a16="http://schemas.microsoft.com/office/drawing/2014/main" id="{67ADCA89-0222-AC01-76AD-765EEF9B34C7}"/>
+              </a:ext>
+            </a:extLst>
+          </p:cNvPr>
+          <p:cNvSpPr txBox="1"/>
+          <p:nvPr/>
+        </p:nvSpPr>
+        <p:spPr>
+          <a:xfrm>
+            <a:off x="5970757" y="1917845"/>
+            <a:ext cx="272828" cy="400110"/>
+          </a:xfrm>
+          <a:prstGeom prst="rect">
+            <a:avLst/>
+          </a:prstGeom>
+          <a:noFill/>
+        </p:spPr>
+        <p:txBody>
+          <a:bodyPr wrap="square" rtlCol="0">
+            <a:spAutoFit/>
+          </a:bodyPr>
+          <a:lstStyle/>
+          <a:p>
+            <a:r>
+              <a:rPr lang="en-US" sz="2000" b="1" dirty="0">
+                <a:solidFill>
+                  <a:srgbClr val="FF0000"/>
+                </a:solidFill>
+              </a:rPr>
+              <a:t>+</a:t>
+            </a:r>
+            <a:endParaRPr lang="en-IN" sz="2000" b="1" dirty="0">
+              <a:solidFill>
+                <a:srgbClr val="FF0000"/>
+              </a:solidFill>
+            </a:endParaRPr>
+          </a:p>
+        </p:txBody>
+      </p:sp>
+      <p:sp>
+        <p:nvSpPr>
+          <p:cNvPr id="71" name="TextBox 70">
+            <a:extLst>
+              <a:ext uri="{FF2B5EF4-FFF2-40B4-BE49-F238E27FC236}">
+                <a16:creationId xmlns:a16="http://schemas.microsoft.com/office/drawing/2014/main" id="{8FB05540-C04D-4AC8-9783-977AA758B117}"/>
+              </a:ext>
+            </a:extLst>
+          </p:cNvPr>
+          <p:cNvSpPr txBox="1"/>
+          <p:nvPr/>
+        </p:nvSpPr>
+        <p:spPr>
+          <a:xfrm>
+            <a:off x="7356741" y="1876543"/>
+            <a:ext cx="272828" cy="400110"/>
+          </a:xfrm>
+          <a:prstGeom prst="rect">
+            <a:avLst/>
+          </a:prstGeom>
+          <a:noFill/>
+        </p:spPr>
+        <p:txBody>
+          <a:bodyPr wrap="square" rtlCol="0">
+            <a:spAutoFit/>
+          </a:bodyPr>
+          <a:lstStyle/>
+          <a:p>
+            <a:r>
+              <a:rPr lang="en-US" sz="2000" b="1" dirty="0">
+                <a:solidFill>
+                  <a:srgbClr val="FF0000"/>
+                </a:solidFill>
+              </a:rPr>
+              <a:t>+</a:t>
+            </a:r>
+            <a:endParaRPr lang="en-IN" sz="2000" b="1" dirty="0">
+              <a:solidFill>
+                <a:srgbClr val="FF0000"/>
+              </a:solidFill>
+            </a:endParaRPr>
+          </a:p>
+        </p:txBody>
+      </p:sp>
+      <p:sp>
+        <p:nvSpPr>
+          <p:cNvPr id="72" name="TextBox 71">
+            <a:extLst>
+              <a:ext uri="{FF2B5EF4-FFF2-40B4-BE49-F238E27FC236}">
+                <a16:creationId xmlns:a16="http://schemas.microsoft.com/office/drawing/2014/main" id="{F600A541-A97C-7ABB-6692-83D2CBE4B866}"/>
+              </a:ext>
+            </a:extLst>
+          </p:cNvPr>
+          <p:cNvSpPr txBox="1"/>
+          <p:nvPr/>
+        </p:nvSpPr>
+        <p:spPr>
+          <a:xfrm>
+            <a:off x="5970757" y="2902097"/>
+            <a:ext cx="272828" cy="400110"/>
+          </a:xfrm>
+          <a:prstGeom prst="rect">
+            <a:avLst/>
+          </a:prstGeom>
+          <a:noFill/>
+        </p:spPr>
+        <p:txBody>
+          <a:bodyPr wrap="square" rtlCol="0">
+            <a:spAutoFit/>
+          </a:bodyPr>
+          <a:lstStyle/>
+          <a:p>
+            <a:r>
+              <a:rPr lang="en-US" sz="2000" b="1" dirty="0">
+                <a:solidFill>
+                  <a:srgbClr val="FF0000"/>
+                </a:solidFill>
+              </a:rPr>
+              <a:t>-</a:t>
+            </a:r>
+            <a:endParaRPr lang="en-IN" sz="2000" b="1" dirty="0">
+              <a:solidFill>
+                <a:srgbClr val="FF0000"/>
+              </a:solidFill>
+            </a:endParaRPr>
+          </a:p>
+        </p:txBody>
+      </p:sp>
+      <p:sp>
+        <p:nvSpPr>
+          <p:cNvPr id="77" name="TextBox 76">
+            <a:extLst>
+              <a:ext uri="{FF2B5EF4-FFF2-40B4-BE49-F238E27FC236}">
+                <a16:creationId xmlns:a16="http://schemas.microsoft.com/office/drawing/2014/main" id="{610124ED-7700-538D-0A84-FFBF5042129F}"/>
+              </a:ext>
+            </a:extLst>
+          </p:cNvPr>
+          <p:cNvSpPr txBox="1"/>
+          <p:nvPr/>
+        </p:nvSpPr>
+        <p:spPr>
+          <a:xfrm>
+            <a:off x="7366181" y="2833046"/>
+            <a:ext cx="272828" cy="400110"/>
+          </a:xfrm>
+          <a:prstGeom prst="rect">
+            <a:avLst/>
+          </a:prstGeom>
+          <a:noFill/>
+        </p:spPr>
+        <p:txBody>
+          <a:bodyPr wrap="square" rtlCol="0">
+            <a:spAutoFit/>
+          </a:bodyPr>
+          <a:lstStyle/>
+          <a:p>
+            <a:r>
+              <a:rPr lang="en-US" sz="2000" b="1" dirty="0">
+                <a:solidFill>
+                  <a:srgbClr val="FF0000"/>
+                </a:solidFill>
+              </a:rPr>
+              <a:t>-</a:t>
+            </a:r>
+            <a:endParaRPr lang="en-IN" sz="2000" b="1" dirty="0">
+              <a:solidFill>
+                <a:srgbClr val="FF0000"/>
+              </a:solidFill>
+            </a:endParaRPr>
+          </a:p>
+        </p:txBody>
+      </p:sp>
     </p:spTree>
     <p:extLst>
       <p:ext uri="{BB962C8B-B14F-4D97-AF65-F5344CB8AC3E}">

</xml_diff>

<commit_message>
expt 3 simulation page graph
</commit_message>
<xml_diff>
--- a/Assets/Powerpoints/DC Chopper.pptx
+++ b/Assets/Powerpoints/DC Chopper.pptx
@@ -3632,8 +3632,8 @@
         </p:nvCxnSpPr>
         <p:spPr>
           <a:xfrm>
-            <a:off x="7814986" y="858431"/>
-            <a:ext cx="25013" cy="3281109"/>
+            <a:off x="7839999" y="3800374"/>
+            <a:ext cx="0" cy="339166"/>
           </a:xfrm>
           <a:prstGeom prst="line">
             <a:avLst/>
@@ -3814,49 +3814,6 @@
       </p:cxnSp>
       <p:cxnSp>
         <p:nvCxnSpPr>
-          <p:cNvPr id="74" name="Straight Connector 73">
-            <a:extLst>
-              <a:ext uri="{FF2B5EF4-FFF2-40B4-BE49-F238E27FC236}">
-                <a16:creationId xmlns:a16="http://schemas.microsoft.com/office/drawing/2014/main" id="{F469474A-C8D2-893C-8016-DF894054655B}"/>
-              </a:ext>
-            </a:extLst>
-          </p:cNvPr>
-          <p:cNvCxnSpPr>
-            <a:cxnSpLocks/>
-          </p:cNvCxnSpPr>
-          <p:nvPr/>
-        </p:nvCxnSpPr>
-        <p:spPr>
-          <a:xfrm>
-            <a:off x="11589091" y="5409210"/>
-            <a:ext cx="2300" cy="898927"/>
-          </a:xfrm>
-          <a:prstGeom prst="line">
-            <a:avLst/>
-          </a:prstGeom>
-          <a:ln w="57150">
-            <a:solidFill>
-              <a:srgbClr val="0070C0"/>
-            </a:solidFill>
-          </a:ln>
-        </p:spPr>
-        <p:style>
-          <a:lnRef idx="1">
-            <a:schemeClr val="accent1"/>
-          </a:lnRef>
-          <a:fillRef idx="0">
-            <a:schemeClr val="accent1"/>
-          </a:fillRef>
-          <a:effectRef idx="0">
-            <a:schemeClr val="accent1"/>
-          </a:effectRef>
-          <a:fontRef idx="minor">
-            <a:schemeClr val="tx1"/>
-          </a:fontRef>
-        </p:style>
-      </p:cxnSp>
-      <p:cxnSp>
-        <p:nvCxnSpPr>
           <p:cNvPr id="120" name="Straight Connector 119">
             <a:extLst>
               <a:ext uri="{FF2B5EF4-FFF2-40B4-BE49-F238E27FC236}">
@@ -3958,7 +3915,7 @@
         <p:spPr>
           <a:xfrm>
             <a:off x="9323658" y="855022"/>
-            <a:ext cx="0" cy="3296904"/>
+            <a:ext cx="0" cy="552028"/>
           </a:xfrm>
           <a:prstGeom prst="line">
             <a:avLst/>
@@ -7080,111 +7037,6 @@
           </p:sp>
         </p:grpSp>
       </p:grpSp>
-      <p:sp>
-        <p:nvSpPr>
-          <p:cNvPr id="17" name="Oval 16">
-            <a:extLst>
-              <a:ext uri="{FF2B5EF4-FFF2-40B4-BE49-F238E27FC236}">
-                <a16:creationId xmlns:a16="http://schemas.microsoft.com/office/drawing/2014/main" id="{DBC6F374-CD07-9C96-4DAD-BB1815FE4356}"/>
-              </a:ext>
-            </a:extLst>
-          </p:cNvPr>
-          <p:cNvSpPr/>
-          <p:nvPr/>
-        </p:nvSpPr>
-        <p:spPr>
-          <a:xfrm>
-            <a:off x="6003464" y="2164966"/>
-            <a:ext cx="849470" cy="806000"/>
-          </a:xfrm>
-          <a:prstGeom prst="ellipse">
-            <a:avLst/>
-          </a:prstGeom>
-          <a:solidFill>
-            <a:schemeClr val="bg1">
-              <a:lumMod val="95000"/>
-            </a:schemeClr>
-          </a:solidFill>
-          <a:ln w="38100"/>
-        </p:spPr>
-        <p:style>
-          <a:lnRef idx="2">
-            <a:schemeClr val="accent1">
-              <a:shade val="50000"/>
-            </a:schemeClr>
-          </a:lnRef>
-          <a:fillRef idx="1">
-            <a:schemeClr val="accent1"/>
-          </a:fillRef>
-          <a:effectRef idx="0">
-            <a:schemeClr val="accent1"/>
-          </a:effectRef>
-          <a:fontRef idx="minor">
-            <a:schemeClr val="lt1"/>
-          </a:fontRef>
-        </p:style>
-        <p:txBody>
-          <a:bodyPr rtlCol="0" anchor="ctr"/>
-          <a:lstStyle/>
-          <a:p>
-            <a:pPr algn="ctr"/>
-            <a:endParaRPr lang="en-IN" sz="4000" dirty="0">
-              <a:solidFill>
-                <a:srgbClr val="FF0000"/>
-              </a:solidFill>
-            </a:endParaRPr>
-          </a:p>
-        </p:txBody>
-      </p:sp>
-      <p:sp>
-        <p:nvSpPr>
-          <p:cNvPr id="18" name="TextBox 17">
-            <a:extLst>
-              <a:ext uri="{FF2B5EF4-FFF2-40B4-BE49-F238E27FC236}">
-                <a16:creationId xmlns:a16="http://schemas.microsoft.com/office/drawing/2014/main" id="{9103FC6C-0A35-A4EF-D5B7-E5F9BEDC2779}"/>
-              </a:ext>
-            </a:extLst>
-          </p:cNvPr>
-          <p:cNvSpPr txBox="1"/>
-          <p:nvPr/>
-        </p:nvSpPr>
-        <p:spPr>
-          <a:xfrm>
-            <a:off x="6217812" y="2234416"/>
-            <a:ext cx="420773" cy="584775"/>
-          </a:xfrm>
-          <a:prstGeom prst="rect">
-            <a:avLst/>
-          </a:prstGeom>
-          <a:noFill/>
-        </p:spPr>
-        <p:txBody>
-          <a:bodyPr wrap="square" rtlCol="0">
-            <a:spAutoFit/>
-          </a:bodyPr>
-          <a:lstStyle/>
-          <a:p>
-            <a:pPr algn="ctr"/>
-            <a:r>
-              <a:rPr lang="en-US" sz="3200" b="1" dirty="0">
-                <a:solidFill>
-                  <a:srgbClr val="FF0000"/>
-                </a:solidFill>
-                <a:latin typeface="Arial" panose="020B0604020202020204" pitchFamily="34" charset="0"/>
-                <a:cs typeface="Arial" panose="020B0604020202020204" pitchFamily="34" charset="0"/>
-              </a:rPr>
-              <a:t>V</a:t>
-            </a:r>
-            <a:endParaRPr lang="en-IN" sz="3200" b="1" dirty="0">
-              <a:solidFill>
-                <a:srgbClr val="FF0000"/>
-              </a:solidFill>
-              <a:latin typeface="Arial" panose="020B0604020202020204" pitchFamily="34" charset="0"/>
-              <a:cs typeface="Arial" panose="020B0604020202020204" pitchFamily="34" charset="0"/>
-            </a:endParaRPr>
-          </a:p>
-        </p:txBody>
-      </p:sp>
       <p:grpSp>
         <p:nvGrpSpPr>
           <p:cNvPr id="13" name="Group 12">
@@ -7310,49 +7162,6 @@
           </p:txBody>
         </p:sp>
       </p:grpSp>
-      <p:cxnSp>
-        <p:nvCxnSpPr>
-          <p:cNvPr id="42" name="Straight Connector 41">
-            <a:extLst>
-              <a:ext uri="{FF2B5EF4-FFF2-40B4-BE49-F238E27FC236}">
-                <a16:creationId xmlns:a16="http://schemas.microsoft.com/office/drawing/2014/main" id="{DA2EE021-FACE-F923-5CC0-D78ECBFFA679}"/>
-              </a:ext>
-            </a:extLst>
-          </p:cNvPr>
-          <p:cNvCxnSpPr>
-            <a:cxnSpLocks/>
-          </p:cNvCxnSpPr>
-          <p:nvPr/>
-        </p:nvCxnSpPr>
-        <p:spPr>
-          <a:xfrm flipH="1">
-            <a:off x="11045332" y="5721482"/>
-            <a:ext cx="7811" cy="227345"/>
-          </a:xfrm>
-          <a:prstGeom prst="line">
-            <a:avLst/>
-          </a:prstGeom>
-          <a:ln w="57150">
-            <a:solidFill>
-              <a:srgbClr val="0070C0"/>
-            </a:solidFill>
-          </a:ln>
-        </p:spPr>
-        <p:style>
-          <a:lnRef idx="1">
-            <a:schemeClr val="accent1"/>
-          </a:lnRef>
-          <a:fillRef idx="0">
-            <a:schemeClr val="accent1"/>
-          </a:fillRef>
-          <a:effectRef idx="0">
-            <a:schemeClr val="accent1"/>
-          </a:effectRef>
-          <a:fontRef idx="minor">
-            <a:schemeClr val="tx1"/>
-          </a:fontRef>
-        </p:style>
-      </p:cxnSp>
       <p:grpSp>
         <p:nvGrpSpPr>
           <p:cNvPr id="45" name="Group 44">
@@ -7367,7 +7176,7 @@
         </p:nvGrpSpPr>
         <p:grpSpPr>
           <a:xfrm>
-            <a:off x="7857079" y="4874249"/>
+            <a:off x="10963909" y="4695368"/>
             <a:ext cx="526643" cy="1746023"/>
             <a:chOff x="6164423" y="1843810"/>
             <a:chExt cx="526643" cy="1746023"/>
@@ -8227,10 +8036,10 @@
       </p:cxnSp>
       <p:grpSp>
         <p:nvGrpSpPr>
-          <p:cNvPr id="182" name="Group 181">
+          <p:cNvPr id="39" name="Group 38">
             <a:extLst>
               <a:ext uri="{FF2B5EF4-FFF2-40B4-BE49-F238E27FC236}">
-                <a16:creationId xmlns:a16="http://schemas.microsoft.com/office/drawing/2014/main" id="{C63BA097-84D0-4271-5CEE-05570CD57909}"/>
+                <a16:creationId xmlns:a16="http://schemas.microsoft.com/office/drawing/2014/main" id="{85CBBB92-8609-E4C2-29B3-37A80A1F8D20}"/>
               </a:ext>
             </a:extLst>
           </p:cNvPr>
@@ -8239,18 +8048,18 @@
         </p:nvGrpSpPr>
         <p:grpSpPr>
           <a:xfrm>
-            <a:off x="3025067" y="602594"/>
-            <a:ext cx="1211294" cy="348272"/>
-            <a:chOff x="3207311" y="599364"/>
-            <a:chExt cx="1211294" cy="348272"/>
+            <a:off x="9048240" y="1308315"/>
+            <a:ext cx="348272" cy="2687596"/>
+            <a:chOff x="7558679" y="1337942"/>
+            <a:chExt cx="348272" cy="2687596"/>
           </a:xfrm>
         </p:grpSpPr>
         <p:cxnSp>
           <p:nvCxnSpPr>
-            <p:cNvPr id="70" name="Straight Connector 69">
+            <p:cNvPr id="74" name="Straight Connector 73">
               <a:extLst>
                 <a:ext uri="{FF2B5EF4-FFF2-40B4-BE49-F238E27FC236}">
-                  <a16:creationId xmlns:a16="http://schemas.microsoft.com/office/drawing/2014/main" id="{D06297FA-010D-932B-3DFB-CD0E33840BE6}"/>
+                  <a16:creationId xmlns:a16="http://schemas.microsoft.com/office/drawing/2014/main" id="{F469474A-C8D2-893C-8016-DF894054655B}"/>
                 </a:ext>
               </a:extLst>
             </p:cNvPr>
@@ -8260,9 +8069,9 @@
             <p:nvPr/>
           </p:nvCxnSpPr>
           <p:spPr>
-            <a:xfrm rot="185876" flipV="1">
-              <a:off x="3839558" y="610178"/>
-              <a:ext cx="99387" cy="308849"/>
+            <a:xfrm>
+              <a:off x="7845457" y="3126611"/>
+              <a:ext cx="2300" cy="898927"/>
             </a:xfrm>
             <a:prstGeom prst="line">
               <a:avLst/>
@@ -8290,10 +8099,10 @@
         </p:cxnSp>
         <p:cxnSp>
           <p:nvCxnSpPr>
-            <p:cNvPr id="67" name="Straight Connector 66">
+            <p:cNvPr id="42" name="Straight Connector 41">
               <a:extLst>
                 <a:ext uri="{FF2B5EF4-FFF2-40B4-BE49-F238E27FC236}">
-                  <a16:creationId xmlns:a16="http://schemas.microsoft.com/office/drawing/2014/main" id="{8D103C26-19B1-E709-A975-96744FB2C52F}"/>
+                  <a16:creationId xmlns:a16="http://schemas.microsoft.com/office/drawing/2014/main" id="{DA2EE021-FACE-F923-5CC0-D78ECBFFA679}"/>
                 </a:ext>
               </a:extLst>
             </p:cNvPr>
@@ -8303,9 +8112,9 @@
             <p:nvPr/>
           </p:nvCxnSpPr>
           <p:spPr>
-            <a:xfrm rot="185876" flipH="1" flipV="1">
-              <a:off x="4137871" y="633416"/>
-              <a:ext cx="99387" cy="308849"/>
+            <a:xfrm>
+              <a:off x="7829040" y="1337942"/>
+              <a:ext cx="0" cy="644085"/>
             </a:xfrm>
             <a:prstGeom prst="line">
               <a:avLst/>
@@ -8331,436 +8140,543 @@
             </a:fontRef>
           </p:style>
         </p:cxnSp>
-        <p:cxnSp>
-          <p:nvCxnSpPr>
-            <p:cNvPr id="68" name="Straight Connector 67">
+        <p:grpSp>
+          <p:nvGrpSpPr>
+            <p:cNvPr id="182" name="Group 181">
               <a:extLst>
                 <a:ext uri="{FF2B5EF4-FFF2-40B4-BE49-F238E27FC236}">
-                  <a16:creationId xmlns:a16="http://schemas.microsoft.com/office/drawing/2014/main" id="{A2F5C1A6-AC32-943F-2D2D-59FCA28625CC}"/>
+                  <a16:creationId xmlns:a16="http://schemas.microsoft.com/office/drawing/2014/main" id="{C63BA097-84D0-4271-5CEE-05570CD57909}"/>
                 </a:ext>
               </a:extLst>
             </p:cNvPr>
-            <p:cNvCxnSpPr>
-              <a:cxnSpLocks/>
-            </p:cNvCxnSpPr>
+            <p:cNvGrpSpPr/>
             <p:nvPr/>
-          </p:nvCxnSpPr>
-          <p:spPr>
-            <a:xfrm rot="185876" flipV="1">
-              <a:off x="4237111" y="638787"/>
-              <a:ext cx="99387" cy="308849"/>
+          </p:nvGrpSpPr>
+          <p:grpSpPr>
+            <a:xfrm rot="16200000">
+              <a:off x="7127168" y="2380424"/>
+              <a:ext cx="1211294" cy="348272"/>
+              <a:chOff x="3207311" y="599364"/>
+              <a:chExt cx="1211294" cy="348272"/>
             </a:xfrm>
-            <a:prstGeom prst="line">
-              <a:avLst/>
-            </a:prstGeom>
-            <a:ln w="57150">
-              <a:solidFill>
-                <a:srgbClr val="0070C0"/>
-              </a:solidFill>
-            </a:ln>
-          </p:spPr>
-          <p:style>
-            <a:lnRef idx="1">
-              <a:schemeClr val="accent1"/>
-            </a:lnRef>
-            <a:fillRef idx="0">
-              <a:schemeClr val="accent1"/>
-            </a:fillRef>
-            <a:effectRef idx="0">
-              <a:schemeClr val="accent1"/>
-            </a:effectRef>
-            <a:fontRef idx="minor">
-              <a:schemeClr val="tx1"/>
-            </a:fontRef>
-          </p:style>
-        </p:cxnSp>
-        <p:cxnSp>
-          <p:nvCxnSpPr>
-            <p:cNvPr id="65" name="Straight Connector 64">
-              <a:extLst>
-                <a:ext uri="{FF2B5EF4-FFF2-40B4-BE49-F238E27FC236}">
-                  <a16:creationId xmlns:a16="http://schemas.microsoft.com/office/drawing/2014/main" id="{D12DF48F-5DF8-5E02-02E2-F226D40F2A8F}"/>
-                </a:ext>
-              </a:extLst>
-            </p:cNvPr>
-            <p:cNvCxnSpPr>
-              <a:cxnSpLocks/>
-            </p:cNvCxnSpPr>
-            <p:nvPr/>
-          </p:nvCxnSpPr>
-          <p:spPr>
-            <a:xfrm rot="185876" flipH="1" flipV="1">
-              <a:off x="3938415" y="622621"/>
-              <a:ext cx="99387" cy="308849"/>
-            </a:xfrm>
-            <a:prstGeom prst="line">
-              <a:avLst/>
-            </a:prstGeom>
-            <a:ln w="57150">
-              <a:solidFill>
-                <a:srgbClr val="0070C0"/>
-              </a:solidFill>
-            </a:ln>
-          </p:spPr>
-          <p:style>
-            <a:lnRef idx="1">
-              <a:schemeClr val="accent1"/>
-            </a:lnRef>
-            <a:fillRef idx="0">
-              <a:schemeClr val="accent1"/>
-            </a:fillRef>
-            <a:effectRef idx="0">
-              <a:schemeClr val="accent1"/>
-            </a:effectRef>
-            <a:fontRef idx="minor">
-              <a:schemeClr val="tx1"/>
-            </a:fontRef>
-          </p:style>
-        </p:cxnSp>
-        <p:cxnSp>
-          <p:nvCxnSpPr>
-            <p:cNvPr id="66" name="Straight Connector 65">
-              <a:extLst>
-                <a:ext uri="{FF2B5EF4-FFF2-40B4-BE49-F238E27FC236}">
-                  <a16:creationId xmlns:a16="http://schemas.microsoft.com/office/drawing/2014/main" id="{787990BD-CC35-8800-77CF-3EFF5F5A20CD}"/>
-                </a:ext>
-              </a:extLst>
-            </p:cNvPr>
-            <p:cNvCxnSpPr>
-              <a:cxnSpLocks/>
-            </p:cNvCxnSpPr>
-            <p:nvPr/>
-          </p:nvCxnSpPr>
-          <p:spPr>
-            <a:xfrm rot="185876" flipV="1">
-              <a:off x="4037656" y="627993"/>
-              <a:ext cx="99387" cy="308849"/>
-            </a:xfrm>
-            <a:prstGeom prst="line">
-              <a:avLst/>
-            </a:prstGeom>
-            <a:ln w="57150">
-              <a:solidFill>
-                <a:srgbClr val="0070C0"/>
-              </a:solidFill>
-            </a:ln>
-          </p:spPr>
-          <p:style>
-            <a:lnRef idx="1">
-              <a:schemeClr val="accent1"/>
-            </a:lnRef>
-            <a:fillRef idx="0">
-              <a:schemeClr val="accent1"/>
-            </a:fillRef>
-            <a:effectRef idx="0">
-              <a:schemeClr val="accent1"/>
-            </a:effectRef>
-            <a:fontRef idx="minor">
-              <a:schemeClr val="tx1"/>
-            </a:fontRef>
-          </p:style>
-        </p:cxnSp>
-        <p:cxnSp>
-          <p:nvCxnSpPr>
-            <p:cNvPr id="63" name="Straight Connector 62">
-              <a:extLst>
-                <a:ext uri="{FF2B5EF4-FFF2-40B4-BE49-F238E27FC236}">
-                  <a16:creationId xmlns:a16="http://schemas.microsoft.com/office/drawing/2014/main" id="{21037A3A-C159-F286-07D2-BC8B1B4ECE41}"/>
-                </a:ext>
-              </a:extLst>
-            </p:cNvPr>
-            <p:cNvCxnSpPr>
-              <a:cxnSpLocks/>
-            </p:cNvCxnSpPr>
-            <p:nvPr/>
-          </p:nvCxnSpPr>
-          <p:spPr>
-            <a:xfrm rot="5585876" flipH="1">
-              <a:off x="4252545" y="722358"/>
-              <a:ext cx="251807" cy="80313"/>
-            </a:xfrm>
-            <a:prstGeom prst="line">
-              <a:avLst/>
-            </a:prstGeom>
-            <a:ln w="57150">
-              <a:solidFill>
-                <a:srgbClr val="0070C0"/>
-              </a:solidFill>
-            </a:ln>
-          </p:spPr>
-          <p:style>
-            <a:lnRef idx="1">
-              <a:schemeClr val="accent1"/>
-            </a:lnRef>
-            <a:fillRef idx="0">
-              <a:schemeClr val="accent1"/>
-            </a:fillRef>
-            <a:effectRef idx="0">
-              <a:schemeClr val="accent1"/>
-            </a:effectRef>
-            <a:fontRef idx="minor">
-              <a:schemeClr val="tx1"/>
-            </a:fontRef>
-          </p:style>
-        </p:cxnSp>
-        <p:cxnSp>
-          <p:nvCxnSpPr>
-            <p:cNvPr id="151" name="Straight Connector 150">
-              <a:extLst>
-                <a:ext uri="{FF2B5EF4-FFF2-40B4-BE49-F238E27FC236}">
-                  <a16:creationId xmlns:a16="http://schemas.microsoft.com/office/drawing/2014/main" id="{923F212D-41F2-0049-E0C0-954F7B6369AA}"/>
-                </a:ext>
-              </a:extLst>
-            </p:cNvPr>
-            <p:cNvCxnSpPr>
-              <a:cxnSpLocks/>
-            </p:cNvCxnSpPr>
-            <p:nvPr/>
-          </p:nvCxnSpPr>
-          <p:spPr>
-            <a:xfrm flipV="1">
-              <a:off x="3207311" y="599364"/>
-              <a:ext cx="115933" cy="303027"/>
-            </a:xfrm>
-            <a:prstGeom prst="line">
-              <a:avLst/>
-            </a:prstGeom>
-            <a:ln w="57150">
-              <a:solidFill>
-                <a:srgbClr val="0070C0"/>
-              </a:solidFill>
-            </a:ln>
-          </p:spPr>
-          <p:style>
-            <a:lnRef idx="1">
-              <a:schemeClr val="accent1"/>
-            </a:lnRef>
-            <a:fillRef idx="0">
-              <a:schemeClr val="accent1"/>
-            </a:fillRef>
-            <a:effectRef idx="0">
-              <a:schemeClr val="accent1"/>
-            </a:effectRef>
-            <a:fontRef idx="minor">
-              <a:schemeClr val="tx1"/>
-            </a:fontRef>
-          </p:style>
-        </p:cxnSp>
-        <p:cxnSp>
-          <p:nvCxnSpPr>
-            <p:cNvPr id="152" name="Straight Connector 151">
-              <a:extLst>
-                <a:ext uri="{FF2B5EF4-FFF2-40B4-BE49-F238E27FC236}">
-                  <a16:creationId xmlns:a16="http://schemas.microsoft.com/office/drawing/2014/main" id="{0067CCB9-74E4-CE46-F7A3-FE489D6C683F}"/>
-                </a:ext>
-              </a:extLst>
-            </p:cNvPr>
-            <p:cNvCxnSpPr>
-              <a:cxnSpLocks/>
-            </p:cNvCxnSpPr>
-            <p:nvPr/>
-          </p:nvCxnSpPr>
-          <p:spPr>
-            <a:xfrm flipH="1" flipV="1">
-              <a:off x="3522315" y="617231"/>
-              <a:ext cx="82551" cy="313769"/>
-            </a:xfrm>
-            <a:prstGeom prst="line">
-              <a:avLst/>
-            </a:prstGeom>
-            <a:ln w="57150">
-              <a:solidFill>
-                <a:srgbClr val="0070C0"/>
-              </a:solidFill>
-            </a:ln>
-          </p:spPr>
-          <p:style>
-            <a:lnRef idx="1">
-              <a:schemeClr val="accent1"/>
-            </a:lnRef>
-            <a:fillRef idx="0">
-              <a:schemeClr val="accent1"/>
-            </a:fillRef>
-            <a:effectRef idx="0">
-              <a:schemeClr val="accent1"/>
-            </a:effectRef>
-            <a:fontRef idx="minor">
-              <a:schemeClr val="tx1"/>
-            </a:fontRef>
-          </p:style>
-        </p:cxnSp>
-        <p:cxnSp>
-          <p:nvCxnSpPr>
-            <p:cNvPr id="153" name="Straight Connector 152">
-              <a:extLst>
-                <a:ext uri="{FF2B5EF4-FFF2-40B4-BE49-F238E27FC236}">
-                  <a16:creationId xmlns:a16="http://schemas.microsoft.com/office/drawing/2014/main" id="{6FC6B883-AD83-8506-7BEF-88D7C01BFC6C}"/>
-                </a:ext>
-              </a:extLst>
-            </p:cNvPr>
-            <p:cNvCxnSpPr>
-              <a:cxnSpLocks/>
-            </p:cNvCxnSpPr>
-            <p:nvPr/>
-          </p:nvCxnSpPr>
-          <p:spPr>
-            <a:xfrm flipV="1">
-              <a:off x="3604864" y="627973"/>
-              <a:ext cx="115933" cy="303027"/>
-            </a:xfrm>
-            <a:prstGeom prst="line">
-              <a:avLst/>
-            </a:prstGeom>
-            <a:ln w="57150">
-              <a:solidFill>
-                <a:srgbClr val="0070C0"/>
-              </a:solidFill>
-            </a:ln>
-          </p:spPr>
-          <p:style>
-            <a:lnRef idx="1">
-              <a:schemeClr val="accent1"/>
-            </a:lnRef>
-            <a:fillRef idx="0">
-              <a:schemeClr val="accent1"/>
-            </a:fillRef>
-            <a:effectRef idx="0">
-              <a:schemeClr val="accent1"/>
-            </a:effectRef>
-            <a:fontRef idx="minor">
-              <a:schemeClr val="tx1"/>
-            </a:fontRef>
-          </p:style>
-        </p:cxnSp>
-        <p:cxnSp>
-          <p:nvCxnSpPr>
-            <p:cNvPr id="154" name="Straight Connector 153">
-              <a:extLst>
-                <a:ext uri="{FF2B5EF4-FFF2-40B4-BE49-F238E27FC236}">
-                  <a16:creationId xmlns:a16="http://schemas.microsoft.com/office/drawing/2014/main" id="{54121B11-ADED-EDF1-7DF7-FB860D3E2671}"/>
-                </a:ext>
-              </a:extLst>
-            </p:cNvPr>
-            <p:cNvCxnSpPr>
-              <a:cxnSpLocks/>
-            </p:cNvCxnSpPr>
-            <p:nvPr/>
-          </p:nvCxnSpPr>
-          <p:spPr>
-            <a:xfrm flipH="1" flipV="1">
-              <a:off x="3322859" y="606436"/>
-              <a:ext cx="82551" cy="313769"/>
-            </a:xfrm>
-            <a:prstGeom prst="line">
-              <a:avLst/>
-            </a:prstGeom>
-            <a:ln w="57150">
-              <a:solidFill>
-                <a:srgbClr val="0070C0"/>
-              </a:solidFill>
-            </a:ln>
-          </p:spPr>
-          <p:style>
-            <a:lnRef idx="1">
-              <a:schemeClr val="accent1"/>
-            </a:lnRef>
-            <a:fillRef idx="0">
-              <a:schemeClr val="accent1"/>
-            </a:fillRef>
-            <a:effectRef idx="0">
-              <a:schemeClr val="accent1"/>
-            </a:effectRef>
-            <a:fontRef idx="minor">
-              <a:schemeClr val="tx1"/>
-            </a:fontRef>
-          </p:style>
-        </p:cxnSp>
-        <p:cxnSp>
-          <p:nvCxnSpPr>
-            <p:cNvPr id="155" name="Straight Connector 154">
-              <a:extLst>
-                <a:ext uri="{FF2B5EF4-FFF2-40B4-BE49-F238E27FC236}">
-                  <a16:creationId xmlns:a16="http://schemas.microsoft.com/office/drawing/2014/main" id="{7BB21D10-6B18-2671-A041-BAD7142A4A09}"/>
-                </a:ext>
-              </a:extLst>
-            </p:cNvPr>
-            <p:cNvCxnSpPr>
-              <a:cxnSpLocks/>
-            </p:cNvCxnSpPr>
-            <p:nvPr/>
-          </p:nvCxnSpPr>
-          <p:spPr>
-            <a:xfrm flipV="1">
-              <a:off x="3405409" y="617179"/>
-              <a:ext cx="115933" cy="303027"/>
-            </a:xfrm>
-            <a:prstGeom prst="line">
-              <a:avLst/>
-            </a:prstGeom>
-            <a:ln w="57150">
-              <a:solidFill>
-                <a:srgbClr val="0070C0"/>
-              </a:solidFill>
-            </a:ln>
-          </p:spPr>
-          <p:style>
-            <a:lnRef idx="1">
-              <a:schemeClr val="accent1"/>
-            </a:lnRef>
-            <a:fillRef idx="0">
-              <a:schemeClr val="accent1"/>
-            </a:fillRef>
-            <a:effectRef idx="0">
-              <a:schemeClr val="accent1"/>
-            </a:effectRef>
-            <a:fontRef idx="minor">
-              <a:schemeClr val="tx1"/>
-            </a:fontRef>
-          </p:style>
-        </p:cxnSp>
-        <p:cxnSp>
-          <p:nvCxnSpPr>
-            <p:cNvPr id="156" name="Straight Connector 155">
-              <a:extLst>
-                <a:ext uri="{FF2B5EF4-FFF2-40B4-BE49-F238E27FC236}">
-                  <a16:creationId xmlns:a16="http://schemas.microsoft.com/office/drawing/2014/main" id="{D2C74002-FA04-91E5-3516-BE96B805FC6A}"/>
-                </a:ext>
-              </a:extLst>
-            </p:cNvPr>
-            <p:cNvCxnSpPr>
-              <a:cxnSpLocks/>
-            </p:cNvCxnSpPr>
-            <p:nvPr/>
-          </p:nvCxnSpPr>
-          <p:spPr>
-            <a:xfrm flipH="1" flipV="1">
-              <a:off x="3721181" y="620901"/>
-              <a:ext cx="114095" cy="294912"/>
-            </a:xfrm>
-            <a:prstGeom prst="line">
-              <a:avLst/>
-            </a:prstGeom>
-            <a:ln w="57150">
-              <a:solidFill>
-                <a:srgbClr val="0070C0"/>
-              </a:solidFill>
-            </a:ln>
-          </p:spPr>
-          <p:style>
-            <a:lnRef idx="1">
-              <a:schemeClr val="accent1"/>
-            </a:lnRef>
-            <a:fillRef idx="0">
-              <a:schemeClr val="accent1"/>
-            </a:fillRef>
-            <a:effectRef idx="0">
-              <a:schemeClr val="accent1"/>
-            </a:effectRef>
-            <a:fontRef idx="minor">
-              <a:schemeClr val="tx1"/>
-            </a:fontRef>
-          </p:style>
-        </p:cxnSp>
+          </p:grpSpPr>
+          <p:cxnSp>
+            <p:nvCxnSpPr>
+              <p:cNvPr id="70" name="Straight Connector 69">
+                <a:extLst>
+                  <a:ext uri="{FF2B5EF4-FFF2-40B4-BE49-F238E27FC236}">
+                    <a16:creationId xmlns:a16="http://schemas.microsoft.com/office/drawing/2014/main" id="{D06297FA-010D-932B-3DFB-CD0E33840BE6}"/>
+                  </a:ext>
+                </a:extLst>
+              </p:cNvPr>
+              <p:cNvCxnSpPr>
+                <a:cxnSpLocks/>
+              </p:cNvCxnSpPr>
+              <p:nvPr/>
+            </p:nvCxnSpPr>
+            <p:spPr>
+              <a:xfrm rot="185876" flipV="1">
+                <a:off x="3839558" y="610178"/>
+                <a:ext cx="99387" cy="308849"/>
+              </a:xfrm>
+              <a:prstGeom prst="line">
+                <a:avLst/>
+              </a:prstGeom>
+              <a:ln w="57150">
+                <a:solidFill>
+                  <a:srgbClr val="0070C0"/>
+                </a:solidFill>
+              </a:ln>
+            </p:spPr>
+            <p:style>
+              <a:lnRef idx="1">
+                <a:schemeClr val="accent1"/>
+              </a:lnRef>
+              <a:fillRef idx="0">
+                <a:schemeClr val="accent1"/>
+              </a:fillRef>
+              <a:effectRef idx="0">
+                <a:schemeClr val="accent1"/>
+              </a:effectRef>
+              <a:fontRef idx="minor">
+                <a:schemeClr val="tx1"/>
+              </a:fontRef>
+            </p:style>
+          </p:cxnSp>
+          <p:cxnSp>
+            <p:nvCxnSpPr>
+              <p:cNvPr id="67" name="Straight Connector 66">
+                <a:extLst>
+                  <a:ext uri="{FF2B5EF4-FFF2-40B4-BE49-F238E27FC236}">
+                    <a16:creationId xmlns:a16="http://schemas.microsoft.com/office/drawing/2014/main" id="{8D103C26-19B1-E709-A975-96744FB2C52F}"/>
+                  </a:ext>
+                </a:extLst>
+              </p:cNvPr>
+              <p:cNvCxnSpPr>
+                <a:cxnSpLocks/>
+              </p:cNvCxnSpPr>
+              <p:nvPr/>
+            </p:nvCxnSpPr>
+            <p:spPr>
+              <a:xfrm rot="185876" flipH="1" flipV="1">
+                <a:off x="4137871" y="633416"/>
+                <a:ext cx="99387" cy="308849"/>
+              </a:xfrm>
+              <a:prstGeom prst="line">
+                <a:avLst/>
+              </a:prstGeom>
+              <a:ln w="57150">
+                <a:solidFill>
+                  <a:srgbClr val="0070C0"/>
+                </a:solidFill>
+              </a:ln>
+            </p:spPr>
+            <p:style>
+              <a:lnRef idx="1">
+                <a:schemeClr val="accent1"/>
+              </a:lnRef>
+              <a:fillRef idx="0">
+                <a:schemeClr val="accent1"/>
+              </a:fillRef>
+              <a:effectRef idx="0">
+                <a:schemeClr val="accent1"/>
+              </a:effectRef>
+              <a:fontRef idx="minor">
+                <a:schemeClr val="tx1"/>
+              </a:fontRef>
+            </p:style>
+          </p:cxnSp>
+          <p:cxnSp>
+            <p:nvCxnSpPr>
+              <p:cNvPr id="68" name="Straight Connector 67">
+                <a:extLst>
+                  <a:ext uri="{FF2B5EF4-FFF2-40B4-BE49-F238E27FC236}">
+                    <a16:creationId xmlns:a16="http://schemas.microsoft.com/office/drawing/2014/main" id="{A2F5C1A6-AC32-943F-2D2D-59FCA28625CC}"/>
+                  </a:ext>
+                </a:extLst>
+              </p:cNvPr>
+              <p:cNvCxnSpPr>
+                <a:cxnSpLocks/>
+              </p:cNvCxnSpPr>
+              <p:nvPr/>
+            </p:nvCxnSpPr>
+            <p:spPr>
+              <a:xfrm rot="185876" flipV="1">
+                <a:off x="4237111" y="638787"/>
+                <a:ext cx="99387" cy="308849"/>
+              </a:xfrm>
+              <a:prstGeom prst="line">
+                <a:avLst/>
+              </a:prstGeom>
+              <a:ln w="57150">
+                <a:solidFill>
+                  <a:srgbClr val="0070C0"/>
+                </a:solidFill>
+              </a:ln>
+            </p:spPr>
+            <p:style>
+              <a:lnRef idx="1">
+                <a:schemeClr val="accent1"/>
+              </a:lnRef>
+              <a:fillRef idx="0">
+                <a:schemeClr val="accent1"/>
+              </a:fillRef>
+              <a:effectRef idx="0">
+                <a:schemeClr val="accent1"/>
+              </a:effectRef>
+              <a:fontRef idx="minor">
+                <a:schemeClr val="tx1"/>
+              </a:fontRef>
+            </p:style>
+          </p:cxnSp>
+          <p:cxnSp>
+            <p:nvCxnSpPr>
+              <p:cNvPr id="65" name="Straight Connector 64">
+                <a:extLst>
+                  <a:ext uri="{FF2B5EF4-FFF2-40B4-BE49-F238E27FC236}">
+                    <a16:creationId xmlns:a16="http://schemas.microsoft.com/office/drawing/2014/main" id="{D12DF48F-5DF8-5E02-02E2-F226D40F2A8F}"/>
+                  </a:ext>
+                </a:extLst>
+              </p:cNvPr>
+              <p:cNvCxnSpPr>
+                <a:cxnSpLocks/>
+              </p:cNvCxnSpPr>
+              <p:nvPr/>
+            </p:nvCxnSpPr>
+            <p:spPr>
+              <a:xfrm rot="185876" flipH="1" flipV="1">
+                <a:off x="3938415" y="622621"/>
+                <a:ext cx="99387" cy="308849"/>
+              </a:xfrm>
+              <a:prstGeom prst="line">
+                <a:avLst/>
+              </a:prstGeom>
+              <a:ln w="57150">
+                <a:solidFill>
+                  <a:srgbClr val="0070C0"/>
+                </a:solidFill>
+              </a:ln>
+            </p:spPr>
+            <p:style>
+              <a:lnRef idx="1">
+                <a:schemeClr val="accent1"/>
+              </a:lnRef>
+              <a:fillRef idx="0">
+                <a:schemeClr val="accent1"/>
+              </a:fillRef>
+              <a:effectRef idx="0">
+                <a:schemeClr val="accent1"/>
+              </a:effectRef>
+              <a:fontRef idx="minor">
+                <a:schemeClr val="tx1"/>
+              </a:fontRef>
+            </p:style>
+          </p:cxnSp>
+          <p:cxnSp>
+            <p:nvCxnSpPr>
+              <p:cNvPr id="66" name="Straight Connector 65">
+                <a:extLst>
+                  <a:ext uri="{FF2B5EF4-FFF2-40B4-BE49-F238E27FC236}">
+                    <a16:creationId xmlns:a16="http://schemas.microsoft.com/office/drawing/2014/main" id="{787990BD-CC35-8800-77CF-3EFF5F5A20CD}"/>
+                  </a:ext>
+                </a:extLst>
+              </p:cNvPr>
+              <p:cNvCxnSpPr>
+                <a:cxnSpLocks/>
+              </p:cNvCxnSpPr>
+              <p:nvPr/>
+            </p:nvCxnSpPr>
+            <p:spPr>
+              <a:xfrm rot="185876" flipV="1">
+                <a:off x="4037656" y="627993"/>
+                <a:ext cx="99387" cy="308849"/>
+              </a:xfrm>
+              <a:prstGeom prst="line">
+                <a:avLst/>
+              </a:prstGeom>
+              <a:ln w="57150">
+                <a:solidFill>
+                  <a:srgbClr val="0070C0"/>
+                </a:solidFill>
+              </a:ln>
+            </p:spPr>
+            <p:style>
+              <a:lnRef idx="1">
+                <a:schemeClr val="accent1"/>
+              </a:lnRef>
+              <a:fillRef idx="0">
+                <a:schemeClr val="accent1"/>
+              </a:fillRef>
+              <a:effectRef idx="0">
+                <a:schemeClr val="accent1"/>
+              </a:effectRef>
+              <a:fontRef idx="minor">
+                <a:schemeClr val="tx1"/>
+              </a:fontRef>
+            </p:style>
+          </p:cxnSp>
+          <p:cxnSp>
+            <p:nvCxnSpPr>
+              <p:cNvPr id="63" name="Straight Connector 62">
+                <a:extLst>
+                  <a:ext uri="{FF2B5EF4-FFF2-40B4-BE49-F238E27FC236}">
+                    <a16:creationId xmlns:a16="http://schemas.microsoft.com/office/drawing/2014/main" id="{21037A3A-C159-F286-07D2-BC8B1B4ECE41}"/>
+                  </a:ext>
+                </a:extLst>
+              </p:cNvPr>
+              <p:cNvCxnSpPr>
+                <a:cxnSpLocks/>
+              </p:cNvCxnSpPr>
+              <p:nvPr/>
+            </p:nvCxnSpPr>
+            <p:spPr>
+              <a:xfrm rot="5585876" flipH="1">
+                <a:off x="4252545" y="722358"/>
+                <a:ext cx="251807" cy="80313"/>
+              </a:xfrm>
+              <a:prstGeom prst="line">
+                <a:avLst/>
+              </a:prstGeom>
+              <a:ln w="57150">
+                <a:solidFill>
+                  <a:srgbClr val="0070C0"/>
+                </a:solidFill>
+              </a:ln>
+            </p:spPr>
+            <p:style>
+              <a:lnRef idx="1">
+                <a:schemeClr val="accent1"/>
+              </a:lnRef>
+              <a:fillRef idx="0">
+                <a:schemeClr val="accent1"/>
+              </a:fillRef>
+              <a:effectRef idx="0">
+                <a:schemeClr val="accent1"/>
+              </a:effectRef>
+              <a:fontRef idx="minor">
+                <a:schemeClr val="tx1"/>
+              </a:fontRef>
+            </p:style>
+          </p:cxnSp>
+          <p:cxnSp>
+            <p:nvCxnSpPr>
+              <p:cNvPr id="151" name="Straight Connector 150">
+                <a:extLst>
+                  <a:ext uri="{FF2B5EF4-FFF2-40B4-BE49-F238E27FC236}">
+                    <a16:creationId xmlns:a16="http://schemas.microsoft.com/office/drawing/2014/main" id="{923F212D-41F2-0049-E0C0-954F7B6369AA}"/>
+                  </a:ext>
+                </a:extLst>
+              </p:cNvPr>
+              <p:cNvCxnSpPr>
+                <a:cxnSpLocks/>
+              </p:cNvCxnSpPr>
+              <p:nvPr/>
+            </p:nvCxnSpPr>
+            <p:spPr>
+              <a:xfrm flipV="1">
+                <a:off x="3207311" y="599364"/>
+                <a:ext cx="115933" cy="303027"/>
+              </a:xfrm>
+              <a:prstGeom prst="line">
+                <a:avLst/>
+              </a:prstGeom>
+              <a:ln w="57150">
+                <a:solidFill>
+                  <a:srgbClr val="0070C0"/>
+                </a:solidFill>
+              </a:ln>
+            </p:spPr>
+            <p:style>
+              <a:lnRef idx="1">
+                <a:schemeClr val="accent1"/>
+              </a:lnRef>
+              <a:fillRef idx="0">
+                <a:schemeClr val="accent1"/>
+              </a:fillRef>
+              <a:effectRef idx="0">
+                <a:schemeClr val="accent1"/>
+              </a:effectRef>
+              <a:fontRef idx="minor">
+                <a:schemeClr val="tx1"/>
+              </a:fontRef>
+            </p:style>
+          </p:cxnSp>
+          <p:cxnSp>
+            <p:nvCxnSpPr>
+              <p:cNvPr id="152" name="Straight Connector 151">
+                <a:extLst>
+                  <a:ext uri="{FF2B5EF4-FFF2-40B4-BE49-F238E27FC236}">
+                    <a16:creationId xmlns:a16="http://schemas.microsoft.com/office/drawing/2014/main" id="{0067CCB9-74E4-CE46-F7A3-FE489D6C683F}"/>
+                  </a:ext>
+                </a:extLst>
+              </p:cNvPr>
+              <p:cNvCxnSpPr>
+                <a:cxnSpLocks/>
+              </p:cNvCxnSpPr>
+              <p:nvPr/>
+            </p:nvCxnSpPr>
+            <p:spPr>
+              <a:xfrm flipH="1" flipV="1">
+                <a:off x="3522315" y="617231"/>
+                <a:ext cx="82551" cy="313769"/>
+              </a:xfrm>
+              <a:prstGeom prst="line">
+                <a:avLst/>
+              </a:prstGeom>
+              <a:ln w="57150">
+                <a:solidFill>
+                  <a:srgbClr val="0070C0"/>
+                </a:solidFill>
+              </a:ln>
+            </p:spPr>
+            <p:style>
+              <a:lnRef idx="1">
+                <a:schemeClr val="accent1"/>
+              </a:lnRef>
+              <a:fillRef idx="0">
+                <a:schemeClr val="accent1"/>
+              </a:fillRef>
+              <a:effectRef idx="0">
+                <a:schemeClr val="accent1"/>
+              </a:effectRef>
+              <a:fontRef idx="minor">
+                <a:schemeClr val="tx1"/>
+              </a:fontRef>
+            </p:style>
+          </p:cxnSp>
+          <p:cxnSp>
+            <p:nvCxnSpPr>
+              <p:cNvPr id="153" name="Straight Connector 152">
+                <a:extLst>
+                  <a:ext uri="{FF2B5EF4-FFF2-40B4-BE49-F238E27FC236}">
+                    <a16:creationId xmlns:a16="http://schemas.microsoft.com/office/drawing/2014/main" id="{6FC6B883-AD83-8506-7BEF-88D7C01BFC6C}"/>
+                  </a:ext>
+                </a:extLst>
+              </p:cNvPr>
+              <p:cNvCxnSpPr>
+                <a:cxnSpLocks/>
+              </p:cNvCxnSpPr>
+              <p:nvPr/>
+            </p:nvCxnSpPr>
+            <p:spPr>
+              <a:xfrm flipV="1">
+                <a:off x="3604864" y="627973"/>
+                <a:ext cx="115933" cy="303027"/>
+              </a:xfrm>
+              <a:prstGeom prst="line">
+                <a:avLst/>
+              </a:prstGeom>
+              <a:ln w="57150">
+                <a:solidFill>
+                  <a:srgbClr val="0070C0"/>
+                </a:solidFill>
+              </a:ln>
+            </p:spPr>
+            <p:style>
+              <a:lnRef idx="1">
+                <a:schemeClr val="accent1"/>
+              </a:lnRef>
+              <a:fillRef idx="0">
+                <a:schemeClr val="accent1"/>
+              </a:fillRef>
+              <a:effectRef idx="0">
+                <a:schemeClr val="accent1"/>
+              </a:effectRef>
+              <a:fontRef idx="minor">
+                <a:schemeClr val="tx1"/>
+              </a:fontRef>
+            </p:style>
+          </p:cxnSp>
+          <p:cxnSp>
+            <p:nvCxnSpPr>
+              <p:cNvPr id="154" name="Straight Connector 153">
+                <a:extLst>
+                  <a:ext uri="{FF2B5EF4-FFF2-40B4-BE49-F238E27FC236}">
+                    <a16:creationId xmlns:a16="http://schemas.microsoft.com/office/drawing/2014/main" id="{54121B11-ADED-EDF1-7DF7-FB860D3E2671}"/>
+                  </a:ext>
+                </a:extLst>
+              </p:cNvPr>
+              <p:cNvCxnSpPr>
+                <a:cxnSpLocks/>
+              </p:cNvCxnSpPr>
+              <p:nvPr/>
+            </p:nvCxnSpPr>
+            <p:spPr>
+              <a:xfrm flipH="1" flipV="1">
+                <a:off x="3322859" y="606436"/>
+                <a:ext cx="82551" cy="313769"/>
+              </a:xfrm>
+              <a:prstGeom prst="line">
+                <a:avLst/>
+              </a:prstGeom>
+              <a:ln w="57150">
+                <a:solidFill>
+                  <a:srgbClr val="0070C0"/>
+                </a:solidFill>
+              </a:ln>
+            </p:spPr>
+            <p:style>
+              <a:lnRef idx="1">
+                <a:schemeClr val="accent1"/>
+              </a:lnRef>
+              <a:fillRef idx="0">
+                <a:schemeClr val="accent1"/>
+              </a:fillRef>
+              <a:effectRef idx="0">
+                <a:schemeClr val="accent1"/>
+              </a:effectRef>
+              <a:fontRef idx="minor">
+                <a:schemeClr val="tx1"/>
+              </a:fontRef>
+            </p:style>
+          </p:cxnSp>
+          <p:cxnSp>
+            <p:nvCxnSpPr>
+              <p:cNvPr id="155" name="Straight Connector 154">
+                <a:extLst>
+                  <a:ext uri="{FF2B5EF4-FFF2-40B4-BE49-F238E27FC236}">
+                    <a16:creationId xmlns:a16="http://schemas.microsoft.com/office/drawing/2014/main" id="{7BB21D10-6B18-2671-A041-BAD7142A4A09}"/>
+                  </a:ext>
+                </a:extLst>
+              </p:cNvPr>
+              <p:cNvCxnSpPr>
+                <a:cxnSpLocks/>
+              </p:cNvCxnSpPr>
+              <p:nvPr/>
+            </p:nvCxnSpPr>
+            <p:spPr>
+              <a:xfrm flipV="1">
+                <a:off x="3405409" y="617179"/>
+                <a:ext cx="115933" cy="303027"/>
+              </a:xfrm>
+              <a:prstGeom prst="line">
+                <a:avLst/>
+              </a:prstGeom>
+              <a:ln w="57150">
+                <a:solidFill>
+                  <a:srgbClr val="0070C0"/>
+                </a:solidFill>
+              </a:ln>
+            </p:spPr>
+            <p:style>
+              <a:lnRef idx="1">
+                <a:schemeClr val="accent1"/>
+              </a:lnRef>
+              <a:fillRef idx="0">
+                <a:schemeClr val="accent1"/>
+              </a:fillRef>
+              <a:effectRef idx="0">
+                <a:schemeClr val="accent1"/>
+              </a:effectRef>
+              <a:fontRef idx="minor">
+                <a:schemeClr val="tx1"/>
+              </a:fontRef>
+            </p:style>
+          </p:cxnSp>
+          <p:cxnSp>
+            <p:nvCxnSpPr>
+              <p:cNvPr id="156" name="Straight Connector 155">
+                <a:extLst>
+                  <a:ext uri="{FF2B5EF4-FFF2-40B4-BE49-F238E27FC236}">
+                    <a16:creationId xmlns:a16="http://schemas.microsoft.com/office/drawing/2014/main" id="{D2C74002-FA04-91E5-3516-BE96B805FC6A}"/>
+                  </a:ext>
+                </a:extLst>
+              </p:cNvPr>
+              <p:cNvCxnSpPr>
+                <a:cxnSpLocks/>
+              </p:cNvCxnSpPr>
+              <p:nvPr/>
+            </p:nvCxnSpPr>
+            <p:spPr>
+              <a:xfrm flipH="1" flipV="1">
+                <a:off x="3721181" y="620901"/>
+                <a:ext cx="114095" cy="294912"/>
+              </a:xfrm>
+              <a:prstGeom prst="line">
+                <a:avLst/>
+              </a:prstGeom>
+              <a:ln w="57150">
+                <a:solidFill>
+                  <a:srgbClr val="0070C0"/>
+                </a:solidFill>
+              </a:ln>
+            </p:spPr>
+            <p:style>
+              <a:lnRef idx="1">
+                <a:schemeClr val="accent1"/>
+              </a:lnRef>
+              <a:fillRef idx="0">
+                <a:schemeClr val="accent1"/>
+              </a:fillRef>
+              <a:effectRef idx="0">
+                <a:schemeClr val="accent1"/>
+              </a:effectRef>
+              <a:fontRef idx="minor">
+                <a:schemeClr val="tx1"/>
+              </a:fontRef>
+            </p:style>
+          </p:cxnSp>
+        </p:grpSp>
       </p:grpSp>
       <p:grpSp>
         <p:nvGrpSpPr>
@@ -9006,391 +8922,49 @@
           </p:sp>
         </p:grpSp>
       </p:grpSp>
-      <p:sp>
-        <p:nvSpPr>
-          <p:cNvPr id="56" name="Oval 55">
+      <p:cxnSp>
+        <p:nvCxnSpPr>
+          <p:cNvPr id="23" name="Straight Connector 22">
             <a:extLst>
               <a:ext uri="{FF2B5EF4-FFF2-40B4-BE49-F238E27FC236}">
-                <a16:creationId xmlns:a16="http://schemas.microsoft.com/office/drawing/2014/main" id="{52CF07DF-B166-A580-6BC6-71AA3BADCCFB}"/>
+                <a16:creationId xmlns:a16="http://schemas.microsoft.com/office/drawing/2014/main" id="{201645CC-2ADE-227E-CB2B-E681FD3B13E5}"/>
               </a:ext>
             </a:extLst>
           </p:cNvPr>
-          <p:cNvSpPr/>
+          <p:cNvCxnSpPr>
+            <a:cxnSpLocks/>
+          </p:cNvCxnSpPr>
           <p:nvPr/>
-        </p:nvSpPr>
+        </p:nvCxnSpPr>
         <p:spPr>
           <a:xfrm>
-            <a:off x="7371958" y="2150319"/>
-            <a:ext cx="849470" cy="806000"/>
+            <a:off x="7829040" y="858431"/>
+            <a:ext cx="0" cy="548619"/>
           </a:xfrm>
-          <a:prstGeom prst="ellipse">
+          <a:prstGeom prst="line">
             <a:avLst/>
           </a:prstGeom>
-          <a:solidFill>
-            <a:schemeClr val="bg1">
-              <a:lumMod val="95000"/>
-            </a:schemeClr>
-          </a:solidFill>
-          <a:ln w="38100"/>
-        </p:spPr>
-        <p:style>
-          <a:lnRef idx="2">
-            <a:schemeClr val="accent1">
-              <a:shade val="50000"/>
-            </a:schemeClr>
-          </a:lnRef>
-          <a:fillRef idx="1">
-            <a:schemeClr val="accent1"/>
-          </a:fillRef>
-          <a:effectRef idx="0">
-            <a:schemeClr val="accent1"/>
-          </a:effectRef>
-          <a:fontRef idx="minor">
-            <a:schemeClr val="lt1"/>
-          </a:fontRef>
-        </p:style>
-        <p:txBody>
-          <a:bodyPr rtlCol="0" anchor="ctr"/>
-          <a:lstStyle/>
-          <a:p>
-            <a:pPr algn="ctr"/>
-            <a:endParaRPr lang="en-IN" sz="4000" dirty="0">
-              <a:solidFill>
-                <a:srgbClr val="FF0000"/>
-              </a:solidFill>
-            </a:endParaRPr>
-          </a:p>
-        </p:txBody>
-      </p:sp>
-      <p:sp>
-        <p:nvSpPr>
-          <p:cNvPr id="57" name="TextBox 56">
-            <a:extLst>
-              <a:ext uri="{FF2B5EF4-FFF2-40B4-BE49-F238E27FC236}">
-                <a16:creationId xmlns:a16="http://schemas.microsoft.com/office/drawing/2014/main" id="{8BA57E40-1394-BC24-4530-ECF3319D3872}"/>
-              </a:ext>
-            </a:extLst>
-          </p:cNvPr>
-          <p:cNvSpPr txBox="1"/>
-          <p:nvPr/>
-        </p:nvSpPr>
-        <p:spPr>
-          <a:xfrm>
-            <a:off x="7586306" y="2219769"/>
-            <a:ext cx="420773" cy="584775"/>
-          </a:xfrm>
-          <a:prstGeom prst="rect">
-            <a:avLst/>
-          </a:prstGeom>
-          <a:noFill/>
-        </p:spPr>
-        <p:txBody>
-          <a:bodyPr wrap="square" rtlCol="0">
-            <a:spAutoFit/>
-          </a:bodyPr>
-          <a:lstStyle/>
-          <a:p>
-            <a:pPr algn="ctr"/>
-            <a:r>
-              <a:rPr lang="en-US" sz="3200" b="1" dirty="0">
-                <a:solidFill>
-                  <a:srgbClr val="FF0000"/>
-                </a:solidFill>
-                <a:latin typeface="Arial" panose="020B0604020202020204" pitchFamily="34" charset="0"/>
-                <a:cs typeface="Arial" panose="020B0604020202020204" pitchFamily="34" charset="0"/>
-              </a:rPr>
-              <a:t>V</a:t>
-            </a:r>
-            <a:endParaRPr lang="en-IN" sz="3200" b="1" dirty="0">
-              <a:solidFill>
-                <a:srgbClr val="FF0000"/>
-              </a:solidFill>
-              <a:latin typeface="Arial" panose="020B0604020202020204" pitchFamily="34" charset="0"/>
-              <a:cs typeface="Arial" panose="020B0604020202020204" pitchFamily="34" charset="0"/>
-            </a:endParaRPr>
-          </a:p>
-        </p:txBody>
-      </p:sp>
-      <p:sp>
-        <p:nvSpPr>
-          <p:cNvPr id="11" name="Rectangle 10">
-            <a:extLst>
-              <a:ext uri="{FF2B5EF4-FFF2-40B4-BE49-F238E27FC236}">
-                <a16:creationId xmlns:a16="http://schemas.microsoft.com/office/drawing/2014/main" id="{B6930E61-AE4E-C192-C193-A722836F27D8}"/>
-              </a:ext>
-            </a:extLst>
-          </p:cNvPr>
-          <p:cNvSpPr/>
-          <p:nvPr/>
-        </p:nvSpPr>
-        <p:spPr>
-          <a:xfrm>
-            <a:off x="6261315" y="2733043"/>
-            <a:ext cx="325797" cy="71501"/>
-          </a:xfrm>
-          <a:prstGeom prst="rect">
-            <a:avLst/>
-          </a:prstGeom>
-          <a:solidFill>
-            <a:srgbClr val="FF0000"/>
-          </a:solidFill>
-          <a:ln>
-            <a:noFill/>
+          <a:ln w="57150">
+            <a:solidFill>
+              <a:schemeClr val="tx1"/>
+            </a:solidFill>
           </a:ln>
         </p:spPr>
         <p:style>
-          <a:lnRef idx="2">
-            <a:schemeClr val="accent1">
-              <a:shade val="50000"/>
-            </a:schemeClr>
+          <a:lnRef idx="1">
+            <a:schemeClr val="accent1"/>
           </a:lnRef>
-          <a:fillRef idx="1">
+          <a:fillRef idx="0">
             <a:schemeClr val="accent1"/>
           </a:fillRef>
           <a:effectRef idx="0">
             <a:schemeClr val="accent1"/>
           </a:effectRef>
           <a:fontRef idx="minor">
-            <a:schemeClr val="lt1"/>
+            <a:schemeClr val="tx1"/>
           </a:fontRef>
         </p:style>
-        <p:txBody>
-          <a:bodyPr rtlCol="0" anchor="ctr"/>
-          <a:lstStyle/>
-          <a:p>
-            <a:pPr algn="ctr"/>
-            <a:endParaRPr lang="en-IN"/>
-          </a:p>
-        </p:txBody>
-      </p:sp>
-      <p:sp>
-        <p:nvSpPr>
-          <p:cNvPr id="58" name="Rectangle 57">
-            <a:extLst>
-              <a:ext uri="{FF2B5EF4-FFF2-40B4-BE49-F238E27FC236}">
-                <a16:creationId xmlns:a16="http://schemas.microsoft.com/office/drawing/2014/main" id="{5D7BB52D-90C2-EE35-497B-C425C4C0D890}"/>
-              </a:ext>
-            </a:extLst>
-          </p:cNvPr>
-          <p:cNvSpPr/>
-          <p:nvPr/>
-        </p:nvSpPr>
-        <p:spPr>
-          <a:xfrm>
-            <a:off x="7629569" y="2733426"/>
-            <a:ext cx="325797" cy="71501"/>
-          </a:xfrm>
-          <a:prstGeom prst="rect">
-            <a:avLst/>
-          </a:prstGeom>
-          <a:solidFill>
-            <a:srgbClr val="FF0000"/>
-          </a:solidFill>
-          <a:ln>
-            <a:noFill/>
-          </a:ln>
-        </p:spPr>
-        <p:style>
-          <a:lnRef idx="2">
-            <a:schemeClr val="accent1">
-              <a:shade val="50000"/>
-            </a:schemeClr>
-          </a:lnRef>
-          <a:fillRef idx="1">
-            <a:schemeClr val="accent1"/>
-          </a:fillRef>
-          <a:effectRef idx="0">
-            <a:schemeClr val="accent1"/>
-          </a:effectRef>
-          <a:fontRef idx="minor">
-            <a:schemeClr val="lt1"/>
-          </a:fontRef>
-        </p:style>
-        <p:txBody>
-          <a:bodyPr rtlCol="0" anchor="ctr"/>
-          <a:lstStyle/>
-          <a:p>
-            <a:pPr algn="ctr"/>
-            <a:endParaRPr lang="en-IN"/>
-          </a:p>
-        </p:txBody>
-      </p:sp>
-      <p:sp>
-        <p:nvSpPr>
-          <p:cNvPr id="69" name="TextBox 68">
-            <a:extLst>
-              <a:ext uri="{FF2B5EF4-FFF2-40B4-BE49-F238E27FC236}">
-                <a16:creationId xmlns:a16="http://schemas.microsoft.com/office/drawing/2014/main" id="{67ADCA89-0222-AC01-76AD-765EEF9B34C7}"/>
-              </a:ext>
-            </a:extLst>
-          </p:cNvPr>
-          <p:cNvSpPr txBox="1"/>
-          <p:nvPr/>
-        </p:nvSpPr>
-        <p:spPr>
-          <a:xfrm>
-            <a:off x="5970757" y="1917845"/>
-            <a:ext cx="272828" cy="400110"/>
-          </a:xfrm>
-          <a:prstGeom prst="rect">
-            <a:avLst/>
-          </a:prstGeom>
-          <a:noFill/>
-        </p:spPr>
-        <p:txBody>
-          <a:bodyPr wrap="square" rtlCol="0">
-            <a:spAutoFit/>
-          </a:bodyPr>
-          <a:lstStyle/>
-          <a:p>
-            <a:r>
-              <a:rPr lang="en-US" sz="2000" b="1" dirty="0">
-                <a:solidFill>
-                  <a:srgbClr val="FF0000"/>
-                </a:solidFill>
-              </a:rPr>
-              <a:t>+</a:t>
-            </a:r>
-            <a:endParaRPr lang="en-IN" sz="2000" b="1" dirty="0">
-              <a:solidFill>
-                <a:srgbClr val="FF0000"/>
-              </a:solidFill>
-            </a:endParaRPr>
-          </a:p>
-        </p:txBody>
-      </p:sp>
-      <p:sp>
-        <p:nvSpPr>
-          <p:cNvPr id="71" name="TextBox 70">
-            <a:extLst>
-              <a:ext uri="{FF2B5EF4-FFF2-40B4-BE49-F238E27FC236}">
-                <a16:creationId xmlns:a16="http://schemas.microsoft.com/office/drawing/2014/main" id="{8FB05540-C04D-4AC8-9783-977AA758B117}"/>
-              </a:ext>
-            </a:extLst>
-          </p:cNvPr>
-          <p:cNvSpPr txBox="1"/>
-          <p:nvPr/>
-        </p:nvSpPr>
-        <p:spPr>
-          <a:xfrm>
-            <a:off x="7356741" y="1876543"/>
-            <a:ext cx="272828" cy="400110"/>
-          </a:xfrm>
-          <a:prstGeom prst="rect">
-            <a:avLst/>
-          </a:prstGeom>
-          <a:noFill/>
-        </p:spPr>
-        <p:txBody>
-          <a:bodyPr wrap="square" rtlCol="0">
-            <a:spAutoFit/>
-          </a:bodyPr>
-          <a:lstStyle/>
-          <a:p>
-            <a:r>
-              <a:rPr lang="en-US" sz="2000" b="1" dirty="0">
-                <a:solidFill>
-                  <a:srgbClr val="FF0000"/>
-                </a:solidFill>
-              </a:rPr>
-              <a:t>+</a:t>
-            </a:r>
-            <a:endParaRPr lang="en-IN" sz="2000" b="1" dirty="0">
-              <a:solidFill>
-                <a:srgbClr val="FF0000"/>
-              </a:solidFill>
-            </a:endParaRPr>
-          </a:p>
-        </p:txBody>
-      </p:sp>
-      <p:sp>
-        <p:nvSpPr>
-          <p:cNvPr id="72" name="TextBox 71">
-            <a:extLst>
-              <a:ext uri="{FF2B5EF4-FFF2-40B4-BE49-F238E27FC236}">
-                <a16:creationId xmlns:a16="http://schemas.microsoft.com/office/drawing/2014/main" id="{F600A541-A97C-7ABB-6692-83D2CBE4B866}"/>
-              </a:ext>
-            </a:extLst>
-          </p:cNvPr>
-          <p:cNvSpPr txBox="1"/>
-          <p:nvPr/>
-        </p:nvSpPr>
-        <p:spPr>
-          <a:xfrm>
-            <a:off x="5970757" y="2902097"/>
-            <a:ext cx="272828" cy="400110"/>
-          </a:xfrm>
-          <a:prstGeom prst="rect">
-            <a:avLst/>
-          </a:prstGeom>
-          <a:noFill/>
-        </p:spPr>
-        <p:txBody>
-          <a:bodyPr wrap="square" rtlCol="0">
-            <a:spAutoFit/>
-          </a:bodyPr>
-          <a:lstStyle/>
-          <a:p>
-            <a:r>
-              <a:rPr lang="en-US" sz="2000" b="1" dirty="0">
-                <a:solidFill>
-                  <a:srgbClr val="FF0000"/>
-                </a:solidFill>
-              </a:rPr>
-              <a:t>-</a:t>
-            </a:r>
-            <a:endParaRPr lang="en-IN" sz="2000" b="1" dirty="0">
-              <a:solidFill>
-                <a:srgbClr val="FF0000"/>
-              </a:solidFill>
-            </a:endParaRPr>
-          </a:p>
-        </p:txBody>
-      </p:sp>
-      <p:sp>
-        <p:nvSpPr>
-          <p:cNvPr id="77" name="TextBox 76">
-            <a:extLst>
-              <a:ext uri="{FF2B5EF4-FFF2-40B4-BE49-F238E27FC236}">
-                <a16:creationId xmlns:a16="http://schemas.microsoft.com/office/drawing/2014/main" id="{610124ED-7700-538D-0A84-FFBF5042129F}"/>
-              </a:ext>
-            </a:extLst>
-          </p:cNvPr>
-          <p:cNvSpPr txBox="1"/>
-          <p:nvPr/>
-        </p:nvSpPr>
-        <p:spPr>
-          <a:xfrm>
-            <a:off x="7366181" y="2833046"/>
-            <a:ext cx="272828" cy="400110"/>
-          </a:xfrm>
-          <a:prstGeom prst="rect">
-            <a:avLst/>
-          </a:prstGeom>
-          <a:noFill/>
-        </p:spPr>
-        <p:txBody>
-          <a:bodyPr wrap="square" rtlCol="0">
-            <a:spAutoFit/>
-          </a:bodyPr>
-          <a:lstStyle/>
-          <a:p>
-            <a:r>
-              <a:rPr lang="en-US" sz="2000" b="1" dirty="0">
-                <a:solidFill>
-                  <a:srgbClr val="FF0000"/>
-                </a:solidFill>
-              </a:rPr>
-              <a:t>-</a:t>
-            </a:r>
-            <a:endParaRPr lang="en-IN" sz="2000" b="1" dirty="0">
-              <a:solidFill>
-                <a:srgbClr val="FF0000"/>
-              </a:solidFill>
-            </a:endParaRPr>
-          </a:p>
-        </p:txBody>
-      </p:sp>
+      </p:cxnSp>
     </p:spTree>
     <p:extLst>
       <p:ext uri="{BB962C8B-B14F-4D97-AF65-F5344CB8AC3E}">

</xml_diff>

<commit_message>
Linked more page with all other pages
</commit_message>
<xml_diff>
--- a/Assets/Powerpoints/DC Chopper.pptx
+++ b/Assets/Powerpoints/DC Chopper.pptx
@@ -25111,8 +25111,8 @@
             </a:p>
           </p:txBody>
         </p:sp>
-        <mc:AlternateContent xmlns:mc="http://schemas.openxmlformats.org/markup-compatibility/2006">
-          <mc:Choice xmlns:a14="http://schemas.microsoft.com/office/drawing/2010/main" Requires="a14">
+        <mc:AlternateContent xmlns:mc="http://schemas.openxmlformats.org/markup-compatibility/2006" xmlns:a14="http://schemas.microsoft.com/office/drawing/2010/main">
+          <mc:Choice Requires="a14">
             <p:sp>
               <p:nvSpPr>
                 <p:cNvPr id="7" name="TextBox 6">
@@ -25247,7 +25247,7 @@
               </p:txBody>
             </p:sp>
           </mc:Choice>
-          <mc:Fallback>
+          <mc:Fallback xmlns="">
             <p:sp>
               <p:nvSpPr>
                 <p:cNvPr id="7" name="TextBox 6">

</xml_diff>